<commit_message>
definicja MSP, statystyki w polsce i z innymi krajami
</commit_message>
<xml_diff>
--- a/WPSG_INF_K4m_Prezentacja_temat_3.pptx
+++ b/WPSG_INF_K4m_Prezentacja_temat_3.pptx
@@ -4,46 +4,51 @@
   <p:sldMasterIdLst>
     <p:sldMasterId id="2147483648" r:id="rId1"/>
   </p:sldMasterIdLst>
+  <p:notesMasterIdLst>
+    <p:notesMasterId r:id="rId43"/>
+  </p:notesMasterIdLst>
   <p:sldIdLst>
     <p:sldId id="256" r:id="rId2"/>
     <p:sldId id="257" r:id="rId3"/>
     <p:sldId id="258" r:id="rId4"/>
     <p:sldId id="259" r:id="rId5"/>
     <p:sldId id="260" r:id="rId6"/>
-    <p:sldId id="261" r:id="rId7"/>
-    <p:sldId id="262" r:id="rId8"/>
-    <p:sldId id="263" r:id="rId9"/>
-    <p:sldId id="264" r:id="rId10"/>
-    <p:sldId id="265" r:id="rId11"/>
-    <p:sldId id="266" r:id="rId12"/>
-    <p:sldId id="267" r:id="rId13"/>
-    <p:sldId id="268" r:id="rId14"/>
-    <p:sldId id="269" r:id="rId15"/>
-    <p:sldId id="270" r:id="rId16"/>
-    <p:sldId id="271" r:id="rId17"/>
-    <p:sldId id="272" r:id="rId18"/>
-    <p:sldId id="273" r:id="rId19"/>
-    <p:sldId id="274" r:id="rId20"/>
-    <p:sldId id="275" r:id="rId21"/>
-    <p:sldId id="276" r:id="rId22"/>
-    <p:sldId id="277" r:id="rId23"/>
-    <p:sldId id="278" r:id="rId24"/>
-    <p:sldId id="279" r:id="rId25"/>
-    <p:sldId id="280" r:id="rId26"/>
-    <p:sldId id="281" r:id="rId27"/>
-    <p:sldId id="282" r:id="rId28"/>
-    <p:sldId id="283" r:id="rId29"/>
-    <p:sldId id="284" r:id="rId30"/>
-    <p:sldId id="285" r:id="rId31"/>
-    <p:sldId id="286" r:id="rId32"/>
-    <p:sldId id="287" r:id="rId33"/>
-    <p:sldId id="288" r:id="rId34"/>
-    <p:sldId id="289" r:id="rId35"/>
-    <p:sldId id="290" r:id="rId36"/>
-    <p:sldId id="291" r:id="rId37"/>
-    <p:sldId id="292" r:id="rId38"/>
-    <p:sldId id="293" r:id="rId39"/>
-    <p:sldId id="294" r:id="rId40"/>
+    <p:sldId id="295" r:id="rId7"/>
+    <p:sldId id="261" r:id="rId8"/>
+    <p:sldId id="296" r:id="rId9"/>
+    <p:sldId id="262" r:id="rId10"/>
+    <p:sldId id="263" r:id="rId11"/>
+    <p:sldId id="264" r:id="rId12"/>
+    <p:sldId id="265" r:id="rId13"/>
+    <p:sldId id="266" r:id="rId14"/>
+    <p:sldId id="267" r:id="rId15"/>
+    <p:sldId id="268" r:id="rId16"/>
+    <p:sldId id="269" r:id="rId17"/>
+    <p:sldId id="270" r:id="rId18"/>
+    <p:sldId id="271" r:id="rId19"/>
+    <p:sldId id="272" r:id="rId20"/>
+    <p:sldId id="273" r:id="rId21"/>
+    <p:sldId id="274" r:id="rId22"/>
+    <p:sldId id="275" r:id="rId23"/>
+    <p:sldId id="276" r:id="rId24"/>
+    <p:sldId id="277" r:id="rId25"/>
+    <p:sldId id="278" r:id="rId26"/>
+    <p:sldId id="279" r:id="rId27"/>
+    <p:sldId id="280" r:id="rId28"/>
+    <p:sldId id="281" r:id="rId29"/>
+    <p:sldId id="282" r:id="rId30"/>
+    <p:sldId id="283" r:id="rId31"/>
+    <p:sldId id="284" r:id="rId32"/>
+    <p:sldId id="285" r:id="rId33"/>
+    <p:sldId id="286" r:id="rId34"/>
+    <p:sldId id="287" r:id="rId35"/>
+    <p:sldId id="288" r:id="rId36"/>
+    <p:sldId id="289" r:id="rId37"/>
+    <p:sldId id="290" r:id="rId38"/>
+    <p:sldId id="291" r:id="rId39"/>
+    <p:sldId id="292" r:id="rId40"/>
+    <p:sldId id="293" r:id="rId41"/>
+    <p:sldId id="294" r:id="rId42"/>
   </p:sldIdLst>
   <p:sldSz cx="12192000" cy="6858000"/>
   <p:notesSz cx="6858000" cy="9144000"/>
@@ -142,7 +147,800 @@
       </a:defRPr>
     </a:lvl9pPr>
   </p:defaultTextStyle>
+  <p:extLst>
+    <p:ext uri="{EFAFB233-063F-42B5-8137-9DF3F51BA10A}">
+      <p15:sldGuideLst xmlns:p15="http://schemas.microsoft.com/office/powerpoint/2012/main"/>
+    </p:ext>
+  </p:extLst>
 </p:presentation>
+</file>
+
+<file path=ppt/notesMasters/notesMaster1.xml><?xml version="1.0" encoding="utf-8"?>
+<p:notesMaster xmlns:a="http://schemas.openxmlformats.org/drawingml/2006/main" xmlns:r="http://schemas.openxmlformats.org/officeDocument/2006/relationships" xmlns:p="http://schemas.openxmlformats.org/presentationml/2006/main">
+  <p:cSld>
+    <p:bg>
+      <p:bgRef idx="1001">
+        <a:schemeClr val="bg1"/>
+      </p:bgRef>
+    </p:bg>
+    <p:spTree>
+      <p:nvGrpSpPr>
+        <p:cNvPr id="1" name=""/>
+        <p:cNvGrpSpPr/>
+        <p:nvPr/>
+      </p:nvGrpSpPr>
+      <p:grpSpPr>
+        <a:xfrm>
+          <a:off x="0" y="0"/>
+          <a:ext cx="0" cy="0"/>
+          <a:chOff x="0" y="0"/>
+          <a:chExt cx="0" cy="0"/>
+        </a:xfrm>
+      </p:grpSpPr>
+      <p:sp>
+        <p:nvSpPr>
+          <p:cNvPr id="2" name="Symbol zastępczy nagłówka 1"/>
+          <p:cNvSpPr>
+            <a:spLocks noGrp="1"/>
+          </p:cNvSpPr>
+          <p:nvPr>
+            <p:ph type="hdr" sz="quarter"/>
+          </p:nvPr>
+        </p:nvSpPr>
+        <p:spPr>
+          <a:xfrm>
+            <a:off x="0" y="0"/>
+            <a:ext cx="2971800" cy="458788"/>
+          </a:xfrm>
+          <a:prstGeom prst="rect">
+            <a:avLst/>
+          </a:prstGeom>
+        </p:spPr>
+        <p:txBody>
+          <a:bodyPr vert="horz" lIns="91440" tIns="45720" rIns="91440" bIns="45720" rtlCol="0"/>
+          <a:lstStyle>
+            <a:lvl1pPr algn="l">
+              <a:defRPr sz="1200"/>
+            </a:lvl1pPr>
+          </a:lstStyle>
+          <a:p>
+            <a:endParaRPr lang="pl-PL"/>
+          </a:p>
+        </p:txBody>
+      </p:sp>
+      <p:sp>
+        <p:nvSpPr>
+          <p:cNvPr id="3" name="Symbol zastępczy daty 2"/>
+          <p:cNvSpPr>
+            <a:spLocks noGrp="1"/>
+          </p:cNvSpPr>
+          <p:nvPr>
+            <p:ph type="dt" idx="1"/>
+          </p:nvPr>
+        </p:nvSpPr>
+        <p:spPr>
+          <a:xfrm>
+            <a:off x="3884613" y="0"/>
+            <a:ext cx="2971800" cy="458788"/>
+          </a:xfrm>
+          <a:prstGeom prst="rect">
+            <a:avLst/>
+          </a:prstGeom>
+        </p:spPr>
+        <p:txBody>
+          <a:bodyPr vert="horz" lIns="91440" tIns="45720" rIns="91440" bIns="45720" rtlCol="0"/>
+          <a:lstStyle>
+            <a:lvl1pPr algn="r">
+              <a:defRPr sz="1200"/>
+            </a:lvl1pPr>
+          </a:lstStyle>
+          <a:p>
+            <a:fld id="{FDFAE622-8C56-4731-9D34-899558E94A45}" type="datetimeFigureOut">
+              <a:rPr lang="pl-PL" smtClean="0"/>
+              <a:t>31.03.2024</a:t>
+            </a:fld>
+            <a:endParaRPr lang="pl-PL"/>
+          </a:p>
+        </p:txBody>
+      </p:sp>
+      <p:sp>
+        <p:nvSpPr>
+          <p:cNvPr id="4" name="Symbol zastępczy obrazu slajdu 3"/>
+          <p:cNvSpPr>
+            <a:spLocks noGrp="1" noRot="1" noChangeAspect="1"/>
+          </p:cNvSpPr>
+          <p:nvPr>
+            <p:ph type="sldImg" idx="2"/>
+          </p:nvPr>
+        </p:nvSpPr>
+        <p:spPr>
+          <a:xfrm>
+            <a:off x="685800" y="1143000"/>
+            <a:ext cx="5486400" cy="3086100"/>
+          </a:xfrm>
+          <a:prstGeom prst="rect">
+            <a:avLst/>
+          </a:prstGeom>
+          <a:noFill/>
+          <a:ln w="12700">
+            <a:solidFill>
+              <a:prstClr val="black"/>
+            </a:solidFill>
+          </a:ln>
+        </p:spPr>
+        <p:txBody>
+          <a:bodyPr vert="horz" lIns="91440" tIns="45720" rIns="91440" bIns="45720" rtlCol="0" anchor="ctr"/>
+          <a:lstStyle/>
+          <a:p>
+            <a:endParaRPr lang="pl-PL"/>
+          </a:p>
+        </p:txBody>
+      </p:sp>
+      <p:sp>
+        <p:nvSpPr>
+          <p:cNvPr id="5" name="Symbol zastępczy notatek 4"/>
+          <p:cNvSpPr>
+            <a:spLocks noGrp="1"/>
+          </p:cNvSpPr>
+          <p:nvPr>
+            <p:ph type="body" sz="quarter" idx="3"/>
+          </p:nvPr>
+        </p:nvSpPr>
+        <p:spPr>
+          <a:xfrm>
+            <a:off x="685800" y="4400550"/>
+            <a:ext cx="5486400" cy="3600450"/>
+          </a:xfrm>
+          <a:prstGeom prst="rect">
+            <a:avLst/>
+          </a:prstGeom>
+        </p:spPr>
+        <p:txBody>
+          <a:bodyPr vert="horz" lIns="91440" tIns="45720" rIns="91440" bIns="45720" rtlCol="0"/>
+          <a:lstStyle/>
+          <a:p>
+            <a:pPr lvl="0"/>
+            <a:r>
+              <a:rPr lang="pl-PL"/>
+              <a:t>Kliknij, aby edytować style wzorca tekstu</a:t>
+            </a:r>
+          </a:p>
+          <a:p>
+            <a:pPr lvl="1"/>
+            <a:r>
+              <a:rPr lang="pl-PL"/>
+              <a:t>Drugi poziom</a:t>
+            </a:r>
+          </a:p>
+          <a:p>
+            <a:pPr lvl="2"/>
+            <a:r>
+              <a:rPr lang="pl-PL"/>
+              <a:t>Trzeci poziom</a:t>
+            </a:r>
+          </a:p>
+          <a:p>
+            <a:pPr lvl="3"/>
+            <a:r>
+              <a:rPr lang="pl-PL"/>
+              <a:t>Czwarty poziom</a:t>
+            </a:r>
+          </a:p>
+          <a:p>
+            <a:pPr lvl="4"/>
+            <a:r>
+              <a:rPr lang="pl-PL"/>
+              <a:t>Piąty poziom</a:t>
+            </a:r>
+          </a:p>
+        </p:txBody>
+      </p:sp>
+      <p:sp>
+        <p:nvSpPr>
+          <p:cNvPr id="6" name="Symbol zastępczy stopki 5"/>
+          <p:cNvSpPr>
+            <a:spLocks noGrp="1"/>
+          </p:cNvSpPr>
+          <p:nvPr>
+            <p:ph type="ftr" sz="quarter" idx="4"/>
+          </p:nvPr>
+        </p:nvSpPr>
+        <p:spPr>
+          <a:xfrm>
+            <a:off x="0" y="8685213"/>
+            <a:ext cx="2971800" cy="458787"/>
+          </a:xfrm>
+          <a:prstGeom prst="rect">
+            <a:avLst/>
+          </a:prstGeom>
+        </p:spPr>
+        <p:txBody>
+          <a:bodyPr vert="horz" lIns="91440" tIns="45720" rIns="91440" bIns="45720" rtlCol="0" anchor="b"/>
+          <a:lstStyle>
+            <a:lvl1pPr algn="l">
+              <a:defRPr sz="1200"/>
+            </a:lvl1pPr>
+          </a:lstStyle>
+          <a:p>
+            <a:endParaRPr lang="pl-PL"/>
+          </a:p>
+        </p:txBody>
+      </p:sp>
+      <p:sp>
+        <p:nvSpPr>
+          <p:cNvPr id="7" name="Symbol zastępczy numeru slajdu 6"/>
+          <p:cNvSpPr>
+            <a:spLocks noGrp="1"/>
+          </p:cNvSpPr>
+          <p:nvPr>
+            <p:ph type="sldNum" sz="quarter" idx="5"/>
+          </p:nvPr>
+        </p:nvSpPr>
+        <p:spPr>
+          <a:xfrm>
+            <a:off x="3884613" y="8685213"/>
+            <a:ext cx="2971800" cy="458787"/>
+          </a:xfrm>
+          <a:prstGeom prst="rect">
+            <a:avLst/>
+          </a:prstGeom>
+        </p:spPr>
+        <p:txBody>
+          <a:bodyPr vert="horz" lIns="91440" tIns="45720" rIns="91440" bIns="45720" rtlCol="0" anchor="b"/>
+          <a:lstStyle>
+            <a:lvl1pPr algn="r">
+              <a:defRPr sz="1200"/>
+            </a:lvl1pPr>
+          </a:lstStyle>
+          <a:p>
+            <a:fld id="{2AC13549-AA33-4E14-83CF-9CF2FE6802EB}" type="slidenum">
+              <a:rPr lang="pl-PL" smtClean="0"/>
+              <a:t>‹#›</a:t>
+            </a:fld>
+            <a:endParaRPr lang="pl-PL"/>
+          </a:p>
+        </p:txBody>
+      </p:sp>
+    </p:spTree>
+    <p:extLst>
+      <p:ext uri="{BB962C8B-B14F-4D97-AF65-F5344CB8AC3E}">
+        <p14:creationId xmlns:p14="http://schemas.microsoft.com/office/powerpoint/2010/main" val="1750257850"/>
+      </p:ext>
+    </p:extLst>
+  </p:cSld>
+  <p:clrMap bg1="lt1" tx1="dk1" bg2="lt2" tx2="dk2" accent1="accent1" accent2="accent2" accent3="accent3" accent4="accent4" accent5="accent5" accent6="accent6" hlink="hlink" folHlink="folHlink"/>
+  <p:notesStyle>
+    <a:lvl1pPr marL="0" algn="l" defTabSz="914400" rtl="0" eaLnBrk="1" latinLnBrk="0" hangingPunct="1">
+      <a:defRPr sz="1200" kern="1200">
+        <a:solidFill>
+          <a:schemeClr val="tx1"/>
+        </a:solidFill>
+        <a:latin typeface="+mn-lt"/>
+        <a:ea typeface="+mn-ea"/>
+        <a:cs typeface="+mn-cs"/>
+      </a:defRPr>
+    </a:lvl1pPr>
+    <a:lvl2pPr marL="457200" algn="l" defTabSz="914400" rtl="0" eaLnBrk="1" latinLnBrk="0" hangingPunct="1">
+      <a:defRPr sz="1200" kern="1200">
+        <a:solidFill>
+          <a:schemeClr val="tx1"/>
+        </a:solidFill>
+        <a:latin typeface="+mn-lt"/>
+        <a:ea typeface="+mn-ea"/>
+        <a:cs typeface="+mn-cs"/>
+      </a:defRPr>
+    </a:lvl2pPr>
+    <a:lvl3pPr marL="914400" algn="l" defTabSz="914400" rtl="0" eaLnBrk="1" latinLnBrk="0" hangingPunct="1">
+      <a:defRPr sz="1200" kern="1200">
+        <a:solidFill>
+          <a:schemeClr val="tx1"/>
+        </a:solidFill>
+        <a:latin typeface="+mn-lt"/>
+        <a:ea typeface="+mn-ea"/>
+        <a:cs typeface="+mn-cs"/>
+      </a:defRPr>
+    </a:lvl3pPr>
+    <a:lvl4pPr marL="1371600" algn="l" defTabSz="914400" rtl="0" eaLnBrk="1" latinLnBrk="0" hangingPunct="1">
+      <a:defRPr sz="1200" kern="1200">
+        <a:solidFill>
+          <a:schemeClr val="tx1"/>
+        </a:solidFill>
+        <a:latin typeface="+mn-lt"/>
+        <a:ea typeface="+mn-ea"/>
+        <a:cs typeface="+mn-cs"/>
+      </a:defRPr>
+    </a:lvl4pPr>
+    <a:lvl5pPr marL="1828800" algn="l" defTabSz="914400" rtl="0" eaLnBrk="1" latinLnBrk="0" hangingPunct="1">
+      <a:defRPr sz="1200" kern="1200">
+        <a:solidFill>
+          <a:schemeClr val="tx1"/>
+        </a:solidFill>
+        <a:latin typeface="+mn-lt"/>
+        <a:ea typeface="+mn-ea"/>
+        <a:cs typeface="+mn-cs"/>
+      </a:defRPr>
+    </a:lvl5pPr>
+    <a:lvl6pPr marL="2286000" algn="l" defTabSz="914400" rtl="0" eaLnBrk="1" latinLnBrk="0" hangingPunct="1">
+      <a:defRPr sz="1200" kern="1200">
+        <a:solidFill>
+          <a:schemeClr val="tx1"/>
+        </a:solidFill>
+        <a:latin typeface="+mn-lt"/>
+        <a:ea typeface="+mn-ea"/>
+        <a:cs typeface="+mn-cs"/>
+      </a:defRPr>
+    </a:lvl6pPr>
+    <a:lvl7pPr marL="2743200" algn="l" defTabSz="914400" rtl="0" eaLnBrk="1" latinLnBrk="0" hangingPunct="1">
+      <a:defRPr sz="1200" kern="1200">
+        <a:solidFill>
+          <a:schemeClr val="tx1"/>
+        </a:solidFill>
+        <a:latin typeface="+mn-lt"/>
+        <a:ea typeface="+mn-ea"/>
+        <a:cs typeface="+mn-cs"/>
+      </a:defRPr>
+    </a:lvl7pPr>
+    <a:lvl8pPr marL="3200400" algn="l" defTabSz="914400" rtl="0" eaLnBrk="1" latinLnBrk="0" hangingPunct="1">
+      <a:defRPr sz="1200" kern="1200">
+        <a:solidFill>
+          <a:schemeClr val="tx1"/>
+        </a:solidFill>
+        <a:latin typeface="+mn-lt"/>
+        <a:ea typeface="+mn-ea"/>
+        <a:cs typeface="+mn-cs"/>
+      </a:defRPr>
+    </a:lvl8pPr>
+    <a:lvl9pPr marL="3657600" algn="l" defTabSz="914400" rtl="0" eaLnBrk="1" latinLnBrk="0" hangingPunct="1">
+      <a:defRPr sz="1200" kern="1200">
+        <a:solidFill>
+          <a:schemeClr val="tx1"/>
+        </a:solidFill>
+        <a:latin typeface="+mn-lt"/>
+        <a:ea typeface="+mn-ea"/>
+        <a:cs typeface="+mn-cs"/>
+      </a:defRPr>
+    </a:lvl9pPr>
+  </p:notesStyle>
+</p:notesMaster>
+</file>
+
+<file path=ppt/notesSlides/notesSlide1.xml><?xml version="1.0" encoding="utf-8"?>
+<p:notes xmlns:a="http://schemas.openxmlformats.org/drawingml/2006/main" xmlns:r="http://schemas.openxmlformats.org/officeDocument/2006/relationships" xmlns:p="http://schemas.openxmlformats.org/presentationml/2006/main">
+  <p:cSld>
+    <p:spTree>
+      <p:nvGrpSpPr>
+        <p:cNvPr id="1" name=""/>
+        <p:cNvGrpSpPr/>
+        <p:nvPr/>
+      </p:nvGrpSpPr>
+      <p:grpSpPr>
+        <a:xfrm>
+          <a:off x="0" y="0"/>
+          <a:ext cx="0" cy="0"/>
+          <a:chOff x="0" y="0"/>
+          <a:chExt cx="0" cy="0"/>
+        </a:xfrm>
+      </p:grpSpPr>
+      <p:sp>
+        <p:nvSpPr>
+          <p:cNvPr id="2" name="Symbol zastępczy obrazu slajdu 1"/>
+          <p:cNvSpPr>
+            <a:spLocks noGrp="1" noRot="1" noChangeAspect="1"/>
+          </p:cNvSpPr>
+          <p:nvPr>
+            <p:ph type="sldImg"/>
+          </p:nvPr>
+        </p:nvSpPr>
+        <p:spPr/>
+      </p:sp>
+      <p:sp>
+        <p:nvSpPr>
+          <p:cNvPr id="3" name="Symbol zastępczy notatek 2"/>
+          <p:cNvSpPr>
+            <a:spLocks noGrp="1"/>
+          </p:cNvSpPr>
+          <p:nvPr>
+            <p:ph type="body" idx="1"/>
+          </p:nvPr>
+        </p:nvSpPr>
+        <p:spPr/>
+        <p:txBody>
+          <a:bodyPr/>
+          <a:lstStyle/>
+          <a:p>
+            <a:r>
+              <a:rPr lang="pl-PL" dirty="0"/>
+              <a:t>http://www.pih.org.pl/images/definicja_msp.pdf</a:t>
+            </a:r>
+            <a:br>
+              <a:rPr lang="pl-PL" dirty="0"/>
+            </a:br>
+            <a:r>
+              <a:rPr lang="pl-PL" dirty="0"/>
+              <a:t>https://pl.wikipedia.org/wiki/Przedsi%C4%99biorstwo</a:t>
+            </a:r>
+          </a:p>
+        </p:txBody>
+      </p:sp>
+      <p:sp>
+        <p:nvSpPr>
+          <p:cNvPr id="4" name="Symbol zastępczy numeru slajdu 3"/>
+          <p:cNvSpPr>
+            <a:spLocks noGrp="1"/>
+          </p:cNvSpPr>
+          <p:nvPr>
+            <p:ph type="sldNum" sz="quarter" idx="5"/>
+          </p:nvPr>
+        </p:nvSpPr>
+        <p:spPr/>
+        <p:txBody>
+          <a:bodyPr/>
+          <a:lstStyle/>
+          <a:p>
+            <a:fld id="{2AC13549-AA33-4E14-83CF-9CF2FE6802EB}" type="slidenum">
+              <a:rPr lang="pl-PL" smtClean="0"/>
+              <a:t>4</a:t>
+            </a:fld>
+            <a:endParaRPr lang="pl-PL"/>
+          </a:p>
+        </p:txBody>
+      </p:sp>
+    </p:spTree>
+    <p:extLst>
+      <p:ext uri="{BB962C8B-B14F-4D97-AF65-F5344CB8AC3E}">
+        <p14:creationId xmlns:p14="http://schemas.microsoft.com/office/powerpoint/2010/main" val="2273366301"/>
+      </p:ext>
+    </p:extLst>
+  </p:cSld>
+  <p:clrMapOvr>
+    <a:masterClrMapping/>
+  </p:clrMapOvr>
+</p:notes>
+</file>
+
+<file path=ppt/notesSlides/notesSlide2.xml><?xml version="1.0" encoding="utf-8"?>
+<p:notes xmlns:a="http://schemas.openxmlformats.org/drawingml/2006/main" xmlns:r="http://schemas.openxmlformats.org/officeDocument/2006/relationships" xmlns:p="http://schemas.openxmlformats.org/presentationml/2006/main">
+  <p:cSld>
+    <p:spTree>
+      <p:nvGrpSpPr>
+        <p:cNvPr id="1" name=""/>
+        <p:cNvGrpSpPr/>
+        <p:nvPr/>
+      </p:nvGrpSpPr>
+      <p:grpSpPr>
+        <a:xfrm>
+          <a:off x="0" y="0"/>
+          <a:ext cx="0" cy="0"/>
+          <a:chOff x="0" y="0"/>
+          <a:chExt cx="0" cy="0"/>
+        </a:xfrm>
+      </p:grpSpPr>
+      <p:sp>
+        <p:nvSpPr>
+          <p:cNvPr id="2" name="Symbol zastępczy obrazu slajdu 1"/>
+          <p:cNvSpPr>
+            <a:spLocks noGrp="1" noRot="1" noChangeAspect="1"/>
+          </p:cNvSpPr>
+          <p:nvPr>
+            <p:ph type="sldImg"/>
+          </p:nvPr>
+        </p:nvSpPr>
+        <p:spPr/>
+      </p:sp>
+      <p:sp>
+        <p:nvSpPr>
+          <p:cNvPr id="3" name="Symbol zastępczy notatek 2"/>
+          <p:cNvSpPr>
+            <a:spLocks noGrp="1"/>
+          </p:cNvSpPr>
+          <p:nvPr>
+            <p:ph type="body" idx="1"/>
+          </p:nvPr>
+        </p:nvSpPr>
+        <p:spPr/>
+        <p:txBody>
+          <a:bodyPr/>
+          <a:lstStyle/>
+          <a:p>
+            <a:endParaRPr lang="pl-PL" dirty="0"/>
+          </a:p>
+        </p:txBody>
+      </p:sp>
+      <p:sp>
+        <p:nvSpPr>
+          <p:cNvPr id="4" name="Symbol zastępczy numeru slajdu 3"/>
+          <p:cNvSpPr>
+            <a:spLocks noGrp="1"/>
+          </p:cNvSpPr>
+          <p:nvPr>
+            <p:ph type="sldNum" sz="quarter" idx="5"/>
+          </p:nvPr>
+        </p:nvSpPr>
+        <p:spPr/>
+        <p:txBody>
+          <a:bodyPr/>
+          <a:lstStyle/>
+          <a:p>
+            <a:fld id="{2AC13549-AA33-4E14-83CF-9CF2FE6802EB}" type="slidenum">
+              <a:rPr lang="pl-PL" smtClean="0"/>
+              <a:t>5</a:t>
+            </a:fld>
+            <a:endParaRPr lang="pl-PL"/>
+          </a:p>
+        </p:txBody>
+      </p:sp>
+    </p:spTree>
+    <p:extLst>
+      <p:ext uri="{BB962C8B-B14F-4D97-AF65-F5344CB8AC3E}">
+        <p14:creationId xmlns:p14="http://schemas.microsoft.com/office/powerpoint/2010/main" val="2427805483"/>
+      </p:ext>
+    </p:extLst>
+  </p:cSld>
+  <p:clrMapOvr>
+    <a:masterClrMapping/>
+  </p:clrMapOvr>
+</p:notes>
+</file>
+
+<file path=ppt/notesSlides/notesSlide3.xml><?xml version="1.0" encoding="utf-8"?>
+<p:notes xmlns:a="http://schemas.openxmlformats.org/drawingml/2006/main" xmlns:r="http://schemas.openxmlformats.org/officeDocument/2006/relationships" xmlns:p="http://schemas.openxmlformats.org/presentationml/2006/main">
+  <p:cSld>
+    <p:spTree>
+      <p:nvGrpSpPr>
+        <p:cNvPr id="1" name=""/>
+        <p:cNvGrpSpPr/>
+        <p:nvPr/>
+      </p:nvGrpSpPr>
+      <p:grpSpPr>
+        <a:xfrm>
+          <a:off x="0" y="0"/>
+          <a:ext cx="0" cy="0"/>
+          <a:chOff x="0" y="0"/>
+          <a:chExt cx="0" cy="0"/>
+        </a:xfrm>
+      </p:grpSpPr>
+      <p:sp>
+        <p:nvSpPr>
+          <p:cNvPr id="2" name="Symbol zastępczy obrazu slajdu 1"/>
+          <p:cNvSpPr>
+            <a:spLocks noGrp="1" noRot="1" noChangeAspect="1"/>
+          </p:cNvSpPr>
+          <p:nvPr>
+            <p:ph type="sldImg"/>
+          </p:nvPr>
+        </p:nvSpPr>
+        <p:spPr/>
+      </p:sp>
+      <p:sp>
+        <p:nvSpPr>
+          <p:cNvPr id="3" name="Symbol zastępczy notatek 2"/>
+          <p:cNvSpPr>
+            <a:spLocks noGrp="1"/>
+          </p:cNvSpPr>
+          <p:nvPr>
+            <p:ph type="body" idx="1"/>
+          </p:nvPr>
+        </p:nvSpPr>
+        <p:spPr/>
+        <p:txBody>
+          <a:bodyPr/>
+          <a:lstStyle/>
+          <a:p>
+            <a:r>
+              <a:rPr lang="pl-PL" dirty="0"/>
+              <a:t>https://www.parp.gov.pl/storage/publications/pdf/ROSS_2023_scalony_ost_popr.pdf</a:t>
+            </a:r>
+          </a:p>
+        </p:txBody>
+      </p:sp>
+      <p:sp>
+        <p:nvSpPr>
+          <p:cNvPr id="4" name="Symbol zastępczy numeru slajdu 3"/>
+          <p:cNvSpPr>
+            <a:spLocks noGrp="1"/>
+          </p:cNvSpPr>
+          <p:nvPr>
+            <p:ph type="sldNum" sz="quarter" idx="5"/>
+          </p:nvPr>
+        </p:nvSpPr>
+        <p:spPr/>
+        <p:txBody>
+          <a:bodyPr/>
+          <a:lstStyle/>
+          <a:p>
+            <a:fld id="{2AC13549-AA33-4E14-83CF-9CF2FE6802EB}" type="slidenum">
+              <a:rPr lang="pl-PL" smtClean="0"/>
+              <a:t>6</a:t>
+            </a:fld>
+            <a:endParaRPr lang="pl-PL"/>
+          </a:p>
+        </p:txBody>
+      </p:sp>
+    </p:spTree>
+    <p:extLst>
+      <p:ext uri="{BB962C8B-B14F-4D97-AF65-F5344CB8AC3E}">
+        <p14:creationId xmlns:p14="http://schemas.microsoft.com/office/powerpoint/2010/main" val="178929904"/>
+      </p:ext>
+    </p:extLst>
+  </p:cSld>
+  <p:clrMapOvr>
+    <a:masterClrMapping/>
+  </p:clrMapOvr>
+</p:notes>
+</file>
+
+<file path=ppt/notesSlides/notesSlide4.xml><?xml version="1.0" encoding="utf-8"?>
+<p:notes xmlns:a="http://schemas.openxmlformats.org/drawingml/2006/main" xmlns:r="http://schemas.openxmlformats.org/officeDocument/2006/relationships" xmlns:p="http://schemas.openxmlformats.org/presentationml/2006/main">
+  <p:cSld>
+    <p:spTree>
+      <p:nvGrpSpPr>
+        <p:cNvPr id="1" name=""/>
+        <p:cNvGrpSpPr/>
+        <p:nvPr/>
+      </p:nvGrpSpPr>
+      <p:grpSpPr>
+        <a:xfrm>
+          <a:off x="0" y="0"/>
+          <a:ext cx="0" cy="0"/>
+          <a:chOff x="0" y="0"/>
+          <a:chExt cx="0" cy="0"/>
+        </a:xfrm>
+      </p:grpSpPr>
+      <p:sp>
+        <p:nvSpPr>
+          <p:cNvPr id="2" name="Symbol zastępczy obrazu slajdu 1"/>
+          <p:cNvSpPr>
+            <a:spLocks noGrp="1" noRot="1" noChangeAspect="1"/>
+          </p:cNvSpPr>
+          <p:nvPr>
+            <p:ph type="sldImg"/>
+          </p:nvPr>
+        </p:nvSpPr>
+        <p:spPr/>
+      </p:sp>
+      <p:sp>
+        <p:nvSpPr>
+          <p:cNvPr id="3" name="Symbol zastępczy notatek 2"/>
+          <p:cNvSpPr>
+            <a:spLocks noGrp="1"/>
+          </p:cNvSpPr>
+          <p:nvPr>
+            <p:ph type="body" idx="1"/>
+          </p:nvPr>
+        </p:nvSpPr>
+        <p:spPr/>
+        <p:txBody>
+          <a:bodyPr/>
+          <a:lstStyle/>
+          <a:p>
+            <a:r>
+              <a:rPr lang="pl-PL" dirty="0"/>
+              <a:t>https://www.parp.gov.pl/storage/publications/pdf/ROSS_2023_scalony_ost_popr.pdf</a:t>
+            </a:r>
+          </a:p>
+        </p:txBody>
+      </p:sp>
+      <p:sp>
+        <p:nvSpPr>
+          <p:cNvPr id="4" name="Symbol zastępczy numeru slajdu 3"/>
+          <p:cNvSpPr>
+            <a:spLocks noGrp="1"/>
+          </p:cNvSpPr>
+          <p:nvPr>
+            <p:ph type="sldNum" sz="quarter" idx="5"/>
+          </p:nvPr>
+        </p:nvSpPr>
+        <p:spPr/>
+        <p:txBody>
+          <a:bodyPr/>
+          <a:lstStyle/>
+          <a:p>
+            <a:fld id="{2AC13549-AA33-4E14-83CF-9CF2FE6802EB}" type="slidenum">
+              <a:rPr lang="pl-PL" smtClean="0"/>
+              <a:t>7</a:t>
+            </a:fld>
+            <a:endParaRPr lang="pl-PL"/>
+          </a:p>
+        </p:txBody>
+      </p:sp>
+    </p:spTree>
+    <p:extLst>
+      <p:ext uri="{BB962C8B-B14F-4D97-AF65-F5344CB8AC3E}">
+        <p14:creationId xmlns:p14="http://schemas.microsoft.com/office/powerpoint/2010/main" val="3963329673"/>
+      </p:ext>
+    </p:extLst>
+  </p:cSld>
+  <p:clrMapOvr>
+    <a:masterClrMapping/>
+  </p:clrMapOvr>
+</p:notes>
+</file>
+
+<file path=ppt/notesSlides/notesSlide5.xml><?xml version="1.0" encoding="utf-8"?>
+<p:notes xmlns:a="http://schemas.openxmlformats.org/drawingml/2006/main" xmlns:r="http://schemas.openxmlformats.org/officeDocument/2006/relationships" xmlns:p="http://schemas.openxmlformats.org/presentationml/2006/main">
+  <p:cSld>
+    <p:spTree>
+      <p:nvGrpSpPr>
+        <p:cNvPr id="1" name=""/>
+        <p:cNvGrpSpPr/>
+        <p:nvPr/>
+      </p:nvGrpSpPr>
+      <p:grpSpPr>
+        <a:xfrm>
+          <a:off x="0" y="0"/>
+          <a:ext cx="0" cy="0"/>
+          <a:chOff x="0" y="0"/>
+          <a:chExt cx="0" cy="0"/>
+        </a:xfrm>
+      </p:grpSpPr>
+      <p:sp>
+        <p:nvSpPr>
+          <p:cNvPr id="2" name="Symbol zastępczy obrazu slajdu 1"/>
+          <p:cNvSpPr>
+            <a:spLocks noGrp="1" noRot="1" noChangeAspect="1"/>
+          </p:cNvSpPr>
+          <p:nvPr>
+            <p:ph type="sldImg"/>
+          </p:nvPr>
+        </p:nvSpPr>
+        <p:spPr/>
+      </p:sp>
+      <p:sp>
+        <p:nvSpPr>
+          <p:cNvPr id="3" name="Symbol zastępczy notatek 2"/>
+          <p:cNvSpPr>
+            <a:spLocks noGrp="1"/>
+          </p:cNvSpPr>
+          <p:nvPr>
+            <p:ph type="body" idx="1"/>
+          </p:nvPr>
+        </p:nvSpPr>
+        <p:spPr/>
+        <p:txBody>
+          <a:bodyPr/>
+          <a:lstStyle/>
+          <a:p>
+            <a:r>
+              <a:rPr lang="pl-PL" dirty="0"/>
+              <a:t>https://www.parp.gov.pl/storage/publications/pdf/ROSS_2023_scalony_ost_popr.pdf</a:t>
+            </a:r>
+          </a:p>
+        </p:txBody>
+      </p:sp>
+      <p:sp>
+        <p:nvSpPr>
+          <p:cNvPr id="4" name="Symbol zastępczy numeru slajdu 3"/>
+          <p:cNvSpPr>
+            <a:spLocks noGrp="1"/>
+          </p:cNvSpPr>
+          <p:nvPr>
+            <p:ph type="sldNum" sz="quarter" idx="5"/>
+          </p:nvPr>
+        </p:nvSpPr>
+        <p:spPr/>
+        <p:txBody>
+          <a:bodyPr/>
+          <a:lstStyle/>
+          <a:p>
+            <a:fld id="{2AC13549-AA33-4E14-83CF-9CF2FE6802EB}" type="slidenum">
+              <a:rPr lang="pl-PL" smtClean="0"/>
+              <a:t>8</a:t>
+            </a:fld>
+            <a:endParaRPr lang="pl-PL"/>
+          </a:p>
+        </p:txBody>
+      </p:sp>
+    </p:spTree>
+    <p:extLst>
+      <p:ext uri="{BB962C8B-B14F-4D97-AF65-F5344CB8AC3E}">
+        <p14:creationId xmlns:p14="http://schemas.microsoft.com/office/powerpoint/2010/main" val="3783768304"/>
+      </p:ext>
+    </p:extLst>
+  </p:cSld>
+  <p:clrMapOvr>
+    <a:masterClrMapping/>
+  </p:clrMapOvr>
+</p:notes>
 </file>
 
 <file path=ppt/slideLayouts/slideLayout1.xml><?xml version="1.0" encoding="utf-8"?>
@@ -1440,7 +2238,7 @@
           <p:cNvPr id="2" name="Tytuł 1">
             <a:extLst>
               <a:ext uri="{FF2B5EF4-FFF2-40B4-BE49-F238E27FC236}">
-                <a16:creationId xmlns:a16="http://schemas.microsoft.com/office/drawing/2014/main" id="{21147321-0FF6-68B2-B522-C20D8EE8CC92}"/>
+                <a16:creationId xmlns:a16="http://schemas.microsoft.com/office/drawing/2014/main" id="{BAB67E54-BB9E-A0AA-5DE2-4E193C126B98}"/>
               </a:ext>
             </a:extLst>
           </p:cNvPr>
@@ -1453,8 +2251,8 @@
         </p:nvSpPr>
         <p:spPr>
           <a:xfrm>
-            <a:off x="-63500" y="-7937"/>
-            <a:ext cx="8001000" cy="1608137"/>
+            <a:off x="0" y="0"/>
+            <a:ext cx="8426450" cy="1655762"/>
           </a:xfrm>
         </p:spPr>
         <p:txBody>
@@ -1468,7 +2266,7 @@
                 <a:ea typeface="Aptos" panose="020B0004020202020204" pitchFamily="34" charset="0"/>
                 <a:cs typeface="Arial" panose="020B0604020202020204" pitchFamily="34" charset="0"/>
               </a:rPr>
-              <a:t>Innowacyjność i rozwój technologiczny w MSP</a:t>
+              <a:t>Znaczenie MSP dla rynku pracy</a:t>
             </a:r>
             <a:endParaRPr lang="pl-PL" dirty="0"/>
           </a:p>
@@ -1479,7 +2277,7 @@
           <p:cNvPr id="3" name="Podtytuł 2">
             <a:extLst>
               <a:ext uri="{FF2B5EF4-FFF2-40B4-BE49-F238E27FC236}">
-                <a16:creationId xmlns:a16="http://schemas.microsoft.com/office/drawing/2014/main" id="{A9CED6C1-E64B-FCC3-B9C5-134661BF8683}"/>
+                <a16:creationId xmlns:a16="http://schemas.microsoft.com/office/drawing/2014/main" id="{CF1D6111-8DA6-7059-9817-B31D4C66DE6C}"/>
               </a:ext>
             </a:extLst>
           </p:cNvPr>
@@ -1502,8 +2300,10 @@
                 <a:ea typeface="Aptos" panose="020B0004020202020204" pitchFamily="34" charset="0"/>
                 <a:cs typeface="Arial" panose="020B0604020202020204" pitchFamily="34" charset="0"/>
               </a:rPr>
-              <a:t>Przykłady innowacyjności w MSP.</a:t>
-            </a:r>
+              <a:t>Udział MSP w tworzeniu miejsc pracy.</a:t>
+            </a:r>
+          </a:p>
+          <a:p>
             <a:endParaRPr lang="pl-PL" dirty="0"/>
           </a:p>
         </p:txBody>
@@ -1511,7 +2311,7 @@
     </p:spTree>
     <p:extLst>
       <p:ext uri="{BB962C8B-B14F-4D97-AF65-F5344CB8AC3E}">
-        <p14:creationId xmlns:p14="http://schemas.microsoft.com/office/powerpoint/2010/main" val="1120071684"/>
+        <p14:creationId xmlns:p14="http://schemas.microsoft.com/office/powerpoint/2010/main" val="3318273911"/>
       </p:ext>
     </p:extLst>
   </p:cSld>
@@ -1543,7 +2343,7 @@
           <p:cNvPr id="2" name="Tytuł 1">
             <a:extLst>
               <a:ext uri="{FF2B5EF4-FFF2-40B4-BE49-F238E27FC236}">
-                <a16:creationId xmlns:a16="http://schemas.microsoft.com/office/drawing/2014/main" id="{29B0DEFA-2957-1FEB-3FE0-8D29E77A2301}"/>
+                <a16:creationId xmlns:a16="http://schemas.microsoft.com/office/drawing/2014/main" id="{FF3927BD-F6AC-6437-AF66-B488ACCFE5FF}"/>
               </a:ext>
             </a:extLst>
           </p:cNvPr>
@@ -1556,8 +2356,8 @@
         </p:nvSpPr>
         <p:spPr>
           <a:xfrm>
-            <a:off x="82550" y="61913"/>
-            <a:ext cx="7581900" cy="884237"/>
+            <a:off x="0" y="0"/>
+            <a:ext cx="4572000" cy="966787"/>
           </a:xfrm>
         </p:spPr>
         <p:txBody>
@@ -1571,7 +2371,7 @@
                 <a:ea typeface="Aptos" panose="020B0004020202020204" pitchFamily="34" charset="0"/>
                 <a:cs typeface="Arial" panose="020B0604020202020204" pitchFamily="34" charset="0"/>
               </a:rPr>
-              <a:t>Rola MSP w eksporcie</a:t>
+              <a:t>Wkład w PKB</a:t>
             </a:r>
             <a:endParaRPr lang="pl-PL" dirty="0"/>
           </a:p>
@@ -1582,7 +2382,7 @@
           <p:cNvPr id="3" name="Podtytuł 2">
             <a:extLst>
               <a:ext uri="{FF2B5EF4-FFF2-40B4-BE49-F238E27FC236}">
-                <a16:creationId xmlns:a16="http://schemas.microsoft.com/office/drawing/2014/main" id="{2964D8E1-046F-A8EC-1A89-C3CCC13CE1B7}"/>
+                <a16:creationId xmlns:a16="http://schemas.microsoft.com/office/drawing/2014/main" id="{74F40F42-DB84-9D9C-4F28-635C23E5FEF3}"/>
               </a:ext>
             </a:extLst>
           </p:cNvPr>
@@ -1605,7 +2405,7 @@
                 <a:ea typeface="Aptos" panose="020B0004020202020204" pitchFamily="34" charset="0"/>
                 <a:cs typeface="Arial" panose="020B0604020202020204" pitchFamily="34" charset="0"/>
               </a:rPr>
-              <a:t>Udział MSP w eksporcie towarów i usług.</a:t>
+              <a:t>Procentowy udział MSP w PKB Polski.</a:t>
             </a:r>
             <a:endParaRPr lang="pl-PL" dirty="0"/>
           </a:p>
@@ -1614,7 +2414,7 @@
     </p:spTree>
     <p:extLst>
       <p:ext uri="{BB962C8B-B14F-4D97-AF65-F5344CB8AC3E}">
-        <p14:creationId xmlns:p14="http://schemas.microsoft.com/office/powerpoint/2010/main" val="427917576"/>
+        <p14:creationId xmlns:p14="http://schemas.microsoft.com/office/powerpoint/2010/main" val="3353865456"/>
       </p:ext>
     </p:extLst>
   </p:cSld>
@@ -1646,7 +2446,7 @@
           <p:cNvPr id="2" name="Tytuł 1">
             <a:extLst>
               <a:ext uri="{FF2B5EF4-FFF2-40B4-BE49-F238E27FC236}">
-                <a16:creationId xmlns:a16="http://schemas.microsoft.com/office/drawing/2014/main" id="{18361370-871F-BE6D-DED4-6E7C65C87DD9}"/>
+                <a16:creationId xmlns:a16="http://schemas.microsoft.com/office/drawing/2014/main" id="{21147321-0FF6-68B2-B522-C20D8EE8CC92}"/>
               </a:ext>
             </a:extLst>
           </p:cNvPr>
@@ -1659,8 +2459,8 @@
         </p:nvSpPr>
         <p:spPr>
           <a:xfrm>
-            <a:off x="50800" y="30163"/>
-            <a:ext cx="6921500" cy="1655762"/>
+            <a:off x="-63500" y="-7937"/>
+            <a:ext cx="8001000" cy="1608137"/>
           </a:xfrm>
         </p:spPr>
         <p:txBody>
@@ -1674,7 +2474,7 @@
                 <a:ea typeface="Aptos" panose="020B0004020202020204" pitchFamily="34" charset="0"/>
                 <a:cs typeface="Arial" panose="020B0604020202020204" pitchFamily="34" charset="0"/>
               </a:rPr>
-              <a:t>Przedsiębiorczość w Polsce</a:t>
+              <a:t>Innowacyjność i rozwój technologiczny w MSP</a:t>
             </a:r>
             <a:endParaRPr lang="pl-PL" dirty="0"/>
           </a:p>
@@ -1685,7 +2485,7 @@
           <p:cNvPr id="3" name="Podtytuł 2">
             <a:extLst>
               <a:ext uri="{FF2B5EF4-FFF2-40B4-BE49-F238E27FC236}">
-                <a16:creationId xmlns:a16="http://schemas.microsoft.com/office/drawing/2014/main" id="{CC9FB858-C4FA-2AEC-F406-D0FD34B3C8C8}"/>
+                <a16:creationId xmlns:a16="http://schemas.microsoft.com/office/drawing/2014/main" id="{A9CED6C1-E64B-FCC3-B9C5-134661BF8683}"/>
               </a:ext>
             </a:extLst>
           </p:cNvPr>
@@ -1708,10 +2508,8 @@
                 <a:ea typeface="Aptos" panose="020B0004020202020204" pitchFamily="34" charset="0"/>
                 <a:cs typeface="Arial" panose="020B0604020202020204" pitchFamily="34" charset="0"/>
               </a:rPr>
-              <a:t>Analiza kultury przedsiębiorczości wśród Polaków.</a:t>
-            </a:r>
-          </a:p>
-          <a:p>
+              <a:t>Przykłady innowacyjności w MSP.</a:t>
+            </a:r>
             <a:endParaRPr lang="pl-PL" dirty="0"/>
           </a:p>
         </p:txBody>
@@ -1719,7 +2517,7 @@
     </p:spTree>
     <p:extLst>
       <p:ext uri="{BB962C8B-B14F-4D97-AF65-F5344CB8AC3E}">
-        <p14:creationId xmlns:p14="http://schemas.microsoft.com/office/powerpoint/2010/main" val="1759806381"/>
+        <p14:creationId xmlns:p14="http://schemas.microsoft.com/office/powerpoint/2010/main" val="1120071684"/>
       </p:ext>
     </p:extLst>
   </p:cSld>
@@ -1751,7 +2549,7 @@
           <p:cNvPr id="2" name="Tytuł 1">
             <a:extLst>
               <a:ext uri="{FF2B5EF4-FFF2-40B4-BE49-F238E27FC236}">
-                <a16:creationId xmlns:a16="http://schemas.microsoft.com/office/drawing/2014/main" id="{9D9D4F82-07B9-972A-5A8D-DF413C15A48B}"/>
+                <a16:creationId xmlns:a16="http://schemas.microsoft.com/office/drawing/2014/main" id="{29B0DEFA-2957-1FEB-3FE0-8D29E77A2301}"/>
               </a:ext>
             </a:extLst>
           </p:cNvPr>
@@ -1764,8 +2562,8 @@
         </p:nvSpPr>
         <p:spPr>
           <a:xfrm>
-            <a:off x="0" y="0"/>
-            <a:ext cx="9144000" cy="922337"/>
+            <a:off x="82550" y="61913"/>
+            <a:ext cx="7581900" cy="884237"/>
           </a:xfrm>
         </p:spPr>
         <p:txBody>
@@ -1779,7 +2577,7 @@
                 <a:ea typeface="Aptos" panose="020B0004020202020204" pitchFamily="34" charset="0"/>
                 <a:cs typeface="Arial" panose="020B0604020202020204" pitchFamily="34" charset="0"/>
               </a:rPr>
-              <a:t>Wsparcie państwa dla MSP</a:t>
+              <a:t>Rola MSP w eksporcie</a:t>
             </a:r>
             <a:endParaRPr lang="pl-PL" dirty="0"/>
           </a:p>
@@ -1790,7 +2588,7 @@
           <p:cNvPr id="3" name="Podtytuł 2">
             <a:extLst>
               <a:ext uri="{FF2B5EF4-FFF2-40B4-BE49-F238E27FC236}">
-                <a16:creationId xmlns:a16="http://schemas.microsoft.com/office/drawing/2014/main" id="{91CA8BAF-B783-ECD1-F8E8-CAFD1D0833F0}"/>
+                <a16:creationId xmlns:a16="http://schemas.microsoft.com/office/drawing/2014/main" id="{2964D8E1-046F-A8EC-1A89-C3CCC13CE1B7}"/>
               </a:ext>
             </a:extLst>
           </p:cNvPr>
@@ -1813,10 +2611,8 @@
                 <a:ea typeface="Aptos" panose="020B0004020202020204" pitchFamily="34" charset="0"/>
                 <a:cs typeface="Arial" panose="020B0604020202020204" pitchFamily="34" charset="0"/>
               </a:rPr>
-              <a:t>Przegląd programów wsparcia i finansowania dostępnych dla MSP.</a:t>
-            </a:r>
-          </a:p>
-          <a:p>
+              <a:t>Udział MSP w eksporcie towarów i usług.</a:t>
+            </a:r>
             <a:endParaRPr lang="pl-PL" dirty="0"/>
           </a:p>
         </p:txBody>
@@ -1824,7 +2620,7 @@
     </p:spTree>
     <p:extLst>
       <p:ext uri="{BB962C8B-B14F-4D97-AF65-F5344CB8AC3E}">
-        <p14:creationId xmlns:p14="http://schemas.microsoft.com/office/powerpoint/2010/main" val="2923317697"/>
+        <p14:creationId xmlns:p14="http://schemas.microsoft.com/office/powerpoint/2010/main" val="427917576"/>
       </p:ext>
     </p:extLst>
   </p:cSld>
@@ -1856,7 +2652,7 @@
           <p:cNvPr id="2" name="Tytuł 1">
             <a:extLst>
               <a:ext uri="{FF2B5EF4-FFF2-40B4-BE49-F238E27FC236}">
-                <a16:creationId xmlns:a16="http://schemas.microsoft.com/office/drawing/2014/main" id="{9D21D8A6-4564-60A9-5146-2E22608D16D5}"/>
+                <a16:creationId xmlns:a16="http://schemas.microsoft.com/office/drawing/2014/main" id="{18361370-871F-BE6D-DED4-6E7C65C87DD9}"/>
               </a:ext>
             </a:extLst>
           </p:cNvPr>
@@ -1869,8 +2665,8 @@
         </p:nvSpPr>
         <p:spPr>
           <a:xfrm>
-            <a:off x="0" y="0"/>
-            <a:ext cx="8032750" cy="1655762"/>
+            <a:off x="50800" y="30163"/>
+            <a:ext cx="6921500" cy="1655762"/>
           </a:xfrm>
         </p:spPr>
         <p:txBody>
@@ -1884,7 +2680,7 @@
                 <a:ea typeface="Aptos" panose="020B0004020202020204" pitchFamily="34" charset="0"/>
                 <a:cs typeface="Arial" panose="020B0604020202020204" pitchFamily="34" charset="0"/>
               </a:rPr>
-              <a:t>Środowisko biznesowe dla MSP</a:t>
+              <a:t>Przedsiębiorczość w Polsce</a:t>
             </a:r>
             <a:endParaRPr lang="pl-PL" dirty="0"/>
           </a:p>
@@ -1895,7 +2691,7 @@
           <p:cNvPr id="3" name="Podtytuł 2">
             <a:extLst>
               <a:ext uri="{FF2B5EF4-FFF2-40B4-BE49-F238E27FC236}">
-                <a16:creationId xmlns:a16="http://schemas.microsoft.com/office/drawing/2014/main" id="{CAD0EB4F-5B22-1A62-ED2A-F691A57CAF36}"/>
+                <a16:creationId xmlns:a16="http://schemas.microsoft.com/office/drawing/2014/main" id="{CC9FB858-C4FA-2AEC-F406-D0FD34B3C8C8}"/>
               </a:ext>
             </a:extLst>
           </p:cNvPr>
@@ -1918,7 +2714,7 @@
                 <a:ea typeface="Aptos" panose="020B0004020202020204" pitchFamily="34" charset="0"/>
                 <a:cs typeface="Arial" panose="020B0604020202020204" pitchFamily="34" charset="0"/>
               </a:rPr>
-              <a:t>Analiza warunków prowadzenia działalności gospodarczej przez MSP w Polsce.</a:t>
+              <a:t>Analiza kultury przedsiębiorczości wśród Polaków.</a:t>
             </a:r>
           </a:p>
           <a:p>
@@ -1929,7 +2725,7 @@
     </p:spTree>
     <p:extLst>
       <p:ext uri="{BB962C8B-B14F-4D97-AF65-F5344CB8AC3E}">
-        <p14:creationId xmlns:p14="http://schemas.microsoft.com/office/powerpoint/2010/main" val="1440715858"/>
+        <p14:creationId xmlns:p14="http://schemas.microsoft.com/office/powerpoint/2010/main" val="1759806381"/>
       </p:ext>
     </p:extLst>
   </p:cSld>
@@ -1961,7 +2757,7 @@
           <p:cNvPr id="2" name="Tytuł 1">
             <a:extLst>
               <a:ext uri="{FF2B5EF4-FFF2-40B4-BE49-F238E27FC236}">
-                <a16:creationId xmlns:a16="http://schemas.microsoft.com/office/drawing/2014/main" id="{32015324-B709-8A9C-43E1-F6133EB01806}"/>
+                <a16:creationId xmlns:a16="http://schemas.microsoft.com/office/drawing/2014/main" id="{9D9D4F82-07B9-972A-5A8D-DF413C15A48B}"/>
               </a:ext>
             </a:extLst>
           </p:cNvPr>
@@ -1975,7 +2771,7 @@
         <p:spPr>
           <a:xfrm>
             <a:off x="0" y="0"/>
-            <a:ext cx="6731000" cy="1741487"/>
+            <a:ext cx="9144000" cy="922337"/>
           </a:xfrm>
         </p:spPr>
         <p:txBody>
@@ -1989,7 +2785,7 @@
                 <a:ea typeface="Aptos" panose="020B0004020202020204" pitchFamily="34" charset="0"/>
                 <a:cs typeface="Arial" panose="020B0604020202020204" pitchFamily="34" charset="0"/>
               </a:rPr>
-              <a:t>Przykłady sukcesów polskich MSP</a:t>
+              <a:t>Wsparcie państwa dla MSP</a:t>
             </a:r>
             <a:endParaRPr lang="pl-PL" dirty="0"/>
           </a:p>
@@ -2000,7 +2796,7 @@
           <p:cNvPr id="3" name="Podtytuł 2">
             <a:extLst>
               <a:ext uri="{FF2B5EF4-FFF2-40B4-BE49-F238E27FC236}">
-                <a16:creationId xmlns:a16="http://schemas.microsoft.com/office/drawing/2014/main" id="{E404257C-630E-0D8C-4E0E-DF5C77306C6D}"/>
+                <a16:creationId xmlns:a16="http://schemas.microsoft.com/office/drawing/2014/main" id="{91CA8BAF-B783-ECD1-F8E8-CAFD1D0833F0}"/>
               </a:ext>
             </a:extLst>
           </p:cNvPr>
@@ -2023,26 +2819,10 @@
                 <a:ea typeface="Aptos" panose="020B0004020202020204" pitchFamily="34" charset="0"/>
                 <a:cs typeface="Arial" panose="020B0604020202020204" pitchFamily="34" charset="0"/>
               </a:rPr>
-              <a:t>Case </a:t>
-            </a:r>
-            <a:r>
-              <a:rPr lang="pl-PL" sz="1800" dirty="0" err="1">
-                <a:effectLst/>
-                <a:latin typeface="Aptos" panose="020B0004020202020204" pitchFamily="34" charset="0"/>
-                <a:ea typeface="Aptos" panose="020B0004020202020204" pitchFamily="34" charset="0"/>
-                <a:cs typeface="Arial" panose="020B0604020202020204" pitchFamily="34" charset="0"/>
-              </a:rPr>
-              <a:t>studies</a:t>
-            </a:r>
-            <a:r>
-              <a:rPr lang="pl-PL" sz="1800" dirty="0">
-                <a:effectLst/>
-                <a:latin typeface="Aptos" panose="020B0004020202020204" pitchFamily="34" charset="0"/>
-                <a:ea typeface="Aptos" panose="020B0004020202020204" pitchFamily="34" charset="0"/>
-                <a:cs typeface="Arial" panose="020B0604020202020204" pitchFamily="34" charset="0"/>
-              </a:rPr>
-              <a:t> kilku udanych polskich MSP.</a:t>
-            </a:r>
+              <a:t>Przegląd programów wsparcia i finansowania dostępnych dla MSP.</a:t>
+            </a:r>
+          </a:p>
+          <a:p>
             <a:endParaRPr lang="pl-PL" dirty="0"/>
           </a:p>
         </p:txBody>
@@ -2050,7 +2830,7 @@
     </p:spTree>
     <p:extLst>
       <p:ext uri="{BB962C8B-B14F-4D97-AF65-F5344CB8AC3E}">
-        <p14:creationId xmlns:p14="http://schemas.microsoft.com/office/powerpoint/2010/main" val="1496790492"/>
+        <p14:creationId xmlns:p14="http://schemas.microsoft.com/office/powerpoint/2010/main" val="2923317697"/>
       </p:ext>
     </p:extLst>
   </p:cSld>
@@ -2082,7 +2862,7 @@
           <p:cNvPr id="2" name="Tytuł 1">
             <a:extLst>
               <a:ext uri="{FF2B5EF4-FFF2-40B4-BE49-F238E27FC236}">
-                <a16:creationId xmlns:a16="http://schemas.microsoft.com/office/drawing/2014/main" id="{26A91C5F-4473-5D0A-79E1-98A6DB1A74D3}"/>
+                <a16:creationId xmlns:a16="http://schemas.microsoft.com/office/drawing/2014/main" id="{9D21D8A6-4564-60A9-5146-2E22608D16D5}"/>
               </a:ext>
             </a:extLst>
           </p:cNvPr>
@@ -2096,7 +2876,7 @@
         <p:spPr>
           <a:xfrm>
             <a:off x="0" y="0"/>
-            <a:ext cx="8147050" cy="871537"/>
+            <a:ext cx="8032750" cy="1655762"/>
           </a:xfrm>
         </p:spPr>
         <p:txBody>
@@ -2110,7 +2890,7 @@
                 <a:ea typeface="Aptos" panose="020B0004020202020204" pitchFamily="34" charset="0"/>
                 <a:cs typeface="Arial" panose="020B0604020202020204" pitchFamily="34" charset="0"/>
               </a:rPr>
-              <a:t>Bariery dla rozwoju MSP</a:t>
+              <a:t>Środowisko biznesowe dla MSP</a:t>
             </a:r>
             <a:endParaRPr lang="pl-PL" dirty="0"/>
           </a:p>
@@ -2121,7 +2901,7 @@
           <p:cNvPr id="3" name="Podtytuł 2">
             <a:extLst>
               <a:ext uri="{FF2B5EF4-FFF2-40B4-BE49-F238E27FC236}">
-                <a16:creationId xmlns:a16="http://schemas.microsoft.com/office/drawing/2014/main" id="{2F110BA2-D73B-5DB5-994E-0A647A3D4C7B}"/>
+                <a16:creationId xmlns:a16="http://schemas.microsoft.com/office/drawing/2014/main" id="{CAD0EB4F-5B22-1A62-ED2A-F691A57CAF36}"/>
               </a:ext>
             </a:extLst>
           </p:cNvPr>
@@ -2144,7 +2924,7 @@
                 <a:ea typeface="Aptos" panose="020B0004020202020204" pitchFamily="34" charset="0"/>
                 <a:cs typeface="Arial" panose="020B0604020202020204" pitchFamily="34" charset="0"/>
               </a:rPr>
-              <a:t>- Największe wyzwania i bariery.</a:t>
+              <a:t>Analiza warunków prowadzenia działalności gospodarczej przez MSP w Polsce.</a:t>
             </a:r>
           </a:p>
           <a:p>
@@ -2155,7 +2935,7 @@
     </p:spTree>
     <p:extLst>
       <p:ext uri="{BB962C8B-B14F-4D97-AF65-F5344CB8AC3E}">
-        <p14:creationId xmlns:p14="http://schemas.microsoft.com/office/powerpoint/2010/main" val="25845646"/>
+        <p14:creationId xmlns:p14="http://schemas.microsoft.com/office/powerpoint/2010/main" val="1440715858"/>
       </p:ext>
     </p:extLst>
   </p:cSld>
@@ -2187,7 +2967,7 @@
           <p:cNvPr id="2" name="Tytuł 1">
             <a:extLst>
               <a:ext uri="{FF2B5EF4-FFF2-40B4-BE49-F238E27FC236}">
-                <a16:creationId xmlns:a16="http://schemas.microsoft.com/office/drawing/2014/main" id="{A3128464-802A-7318-FDCE-939978970B1F}"/>
+                <a16:creationId xmlns:a16="http://schemas.microsoft.com/office/drawing/2014/main" id="{32015324-B709-8A9C-43E1-F6133EB01806}"/>
               </a:ext>
             </a:extLst>
           </p:cNvPr>
@@ -2201,7 +2981,7 @@
         <p:spPr>
           <a:xfrm>
             <a:off x="0" y="0"/>
-            <a:ext cx="8191500" cy="909637"/>
+            <a:ext cx="6731000" cy="1741487"/>
           </a:xfrm>
         </p:spPr>
         <p:txBody>
@@ -2215,7 +2995,7 @@
                 <a:ea typeface="Aptos" panose="020B0004020202020204" pitchFamily="34" charset="0"/>
                 <a:cs typeface="Arial" panose="020B0604020202020204" pitchFamily="34" charset="0"/>
               </a:rPr>
-              <a:t>Dostęp do finansowania</a:t>
+              <a:t>Przykłady sukcesów polskich MSP</a:t>
             </a:r>
             <a:endParaRPr lang="pl-PL" dirty="0"/>
           </a:p>
@@ -2226,7 +3006,7 @@
           <p:cNvPr id="3" name="Podtytuł 2">
             <a:extLst>
               <a:ext uri="{FF2B5EF4-FFF2-40B4-BE49-F238E27FC236}">
-                <a16:creationId xmlns:a16="http://schemas.microsoft.com/office/drawing/2014/main" id="{E4984015-99FB-3AF4-FBFF-B60EF36FE0D2}"/>
+                <a16:creationId xmlns:a16="http://schemas.microsoft.com/office/drawing/2014/main" id="{E404257C-630E-0D8C-4E0E-DF5C77306C6D}"/>
               </a:ext>
             </a:extLst>
           </p:cNvPr>
@@ -2249,7 +3029,25 @@
                 <a:ea typeface="Aptos" panose="020B0004020202020204" pitchFamily="34" charset="0"/>
                 <a:cs typeface="Arial" panose="020B0604020202020204" pitchFamily="34" charset="0"/>
               </a:rPr>
-              <a:t>Omówienie dostępnych źródeł finansowania dla MSP.</a:t>
+              <a:t>Case </a:t>
+            </a:r>
+            <a:r>
+              <a:rPr lang="pl-PL" sz="1800" dirty="0" err="1">
+                <a:effectLst/>
+                <a:latin typeface="Aptos" panose="020B0004020202020204" pitchFamily="34" charset="0"/>
+                <a:ea typeface="Aptos" panose="020B0004020202020204" pitchFamily="34" charset="0"/>
+                <a:cs typeface="Arial" panose="020B0604020202020204" pitchFamily="34" charset="0"/>
+              </a:rPr>
+              <a:t>studies</a:t>
+            </a:r>
+            <a:r>
+              <a:rPr lang="pl-PL" sz="1800" dirty="0">
+                <a:effectLst/>
+                <a:latin typeface="Aptos" panose="020B0004020202020204" pitchFamily="34" charset="0"/>
+                <a:ea typeface="Aptos" panose="020B0004020202020204" pitchFamily="34" charset="0"/>
+                <a:cs typeface="Arial" panose="020B0604020202020204" pitchFamily="34" charset="0"/>
+              </a:rPr>
+              <a:t> kilku udanych polskich MSP.</a:t>
             </a:r>
             <a:endParaRPr lang="pl-PL" dirty="0"/>
           </a:p>
@@ -2258,7 +3056,7 @@
     </p:spTree>
     <p:extLst>
       <p:ext uri="{BB962C8B-B14F-4D97-AF65-F5344CB8AC3E}">
-        <p14:creationId xmlns:p14="http://schemas.microsoft.com/office/powerpoint/2010/main" val="3033105106"/>
+        <p14:creationId xmlns:p14="http://schemas.microsoft.com/office/powerpoint/2010/main" val="1496790492"/>
       </p:ext>
     </p:extLst>
   </p:cSld>
@@ -2290,7 +3088,7 @@
           <p:cNvPr id="2" name="Tytuł 1">
             <a:extLst>
               <a:ext uri="{FF2B5EF4-FFF2-40B4-BE49-F238E27FC236}">
-                <a16:creationId xmlns:a16="http://schemas.microsoft.com/office/drawing/2014/main" id="{1F6F3566-6B95-A30A-5F3B-DCC07A48B7F9}"/>
+                <a16:creationId xmlns:a16="http://schemas.microsoft.com/office/drawing/2014/main" id="{26A91C5F-4473-5D0A-79E1-98A6DB1A74D3}"/>
               </a:ext>
             </a:extLst>
           </p:cNvPr>
@@ -2304,7 +3102,7 @@
         <p:spPr>
           <a:xfrm>
             <a:off x="0" y="0"/>
-            <a:ext cx="6642100" cy="871537"/>
+            <a:ext cx="8147050" cy="871537"/>
           </a:xfrm>
         </p:spPr>
         <p:txBody>
@@ -2318,7 +3116,7 @@
                 <a:ea typeface="Aptos" panose="020B0004020202020204" pitchFamily="34" charset="0"/>
                 <a:cs typeface="Arial" panose="020B0604020202020204" pitchFamily="34" charset="0"/>
               </a:rPr>
-              <a:t>Technologie w MSP</a:t>
+              <a:t>Bariery dla rozwoju MSP</a:t>
             </a:r>
             <a:endParaRPr lang="pl-PL" dirty="0"/>
           </a:p>
@@ -2329,7 +3127,7 @@
           <p:cNvPr id="3" name="Podtytuł 2">
             <a:extLst>
               <a:ext uri="{FF2B5EF4-FFF2-40B4-BE49-F238E27FC236}">
-                <a16:creationId xmlns:a16="http://schemas.microsoft.com/office/drawing/2014/main" id="{BC5074C2-F5B8-FC2E-CE2B-84DD20D23762}"/>
+                <a16:creationId xmlns:a16="http://schemas.microsoft.com/office/drawing/2014/main" id="{2F110BA2-D73B-5DB5-994E-0A647A3D4C7B}"/>
               </a:ext>
             </a:extLst>
           </p:cNvPr>
@@ -2352,8 +3150,10 @@
                 <a:ea typeface="Aptos" panose="020B0004020202020204" pitchFamily="34" charset="0"/>
                 <a:cs typeface="Arial" panose="020B0604020202020204" pitchFamily="34" charset="0"/>
               </a:rPr>
-              <a:t>Jak MSP wykorzystują nowoczesne technologie.</a:t>
-            </a:r>
+              <a:t>- Największe wyzwania i bariery.</a:t>
+            </a:r>
+          </a:p>
+          <a:p>
             <a:endParaRPr lang="pl-PL" dirty="0"/>
           </a:p>
         </p:txBody>
@@ -2361,7 +3161,7 @@
     </p:spTree>
     <p:extLst>
       <p:ext uri="{BB962C8B-B14F-4D97-AF65-F5344CB8AC3E}">
-        <p14:creationId xmlns:p14="http://schemas.microsoft.com/office/powerpoint/2010/main" val="2821777114"/>
+        <p14:creationId xmlns:p14="http://schemas.microsoft.com/office/powerpoint/2010/main" val="25845646"/>
       </p:ext>
     </p:extLst>
   </p:cSld>
@@ -2393,7 +3193,7 @@
           <p:cNvPr id="2" name="Tytuł 1">
             <a:extLst>
               <a:ext uri="{FF2B5EF4-FFF2-40B4-BE49-F238E27FC236}">
-                <a16:creationId xmlns:a16="http://schemas.microsoft.com/office/drawing/2014/main" id="{CCE06549-DBE1-1A47-5D1A-F68E32DEF9BD}"/>
+                <a16:creationId xmlns:a16="http://schemas.microsoft.com/office/drawing/2014/main" id="{A3128464-802A-7318-FDCE-939978970B1F}"/>
               </a:ext>
             </a:extLst>
           </p:cNvPr>
@@ -2407,7 +3207,7 @@
         <p:spPr>
           <a:xfrm>
             <a:off x="0" y="0"/>
-            <a:ext cx="7613650" cy="858837"/>
+            <a:ext cx="8191500" cy="909637"/>
           </a:xfrm>
         </p:spPr>
         <p:txBody>
@@ -2421,7 +3221,7 @@
                 <a:ea typeface="Aptos" panose="020B0004020202020204" pitchFamily="34" charset="0"/>
                 <a:cs typeface="Arial" panose="020B0604020202020204" pitchFamily="34" charset="0"/>
               </a:rPr>
-              <a:t>Cyfryzacja i innowacje</a:t>
+              <a:t>Dostęp do finansowania</a:t>
             </a:r>
             <a:endParaRPr lang="pl-PL" dirty="0"/>
           </a:p>
@@ -2432,7 +3232,7 @@
           <p:cNvPr id="3" name="Podtytuł 2">
             <a:extLst>
               <a:ext uri="{FF2B5EF4-FFF2-40B4-BE49-F238E27FC236}">
-                <a16:creationId xmlns:a16="http://schemas.microsoft.com/office/drawing/2014/main" id="{ABBDA4C5-C2B6-68AB-A9AD-2E5773DB0E7D}"/>
+                <a16:creationId xmlns:a16="http://schemas.microsoft.com/office/drawing/2014/main" id="{E4984015-99FB-3AF4-FBFF-B60EF36FE0D2}"/>
               </a:ext>
             </a:extLst>
           </p:cNvPr>
@@ -2455,10 +3255,8 @@
                 <a:ea typeface="Aptos" panose="020B0004020202020204" pitchFamily="34" charset="0"/>
                 <a:cs typeface="Arial" panose="020B0604020202020204" pitchFamily="34" charset="0"/>
               </a:rPr>
-              <a:t>Wpływ cyfryzacji na rozwój MSP.</a:t>
-            </a:r>
-          </a:p>
-          <a:p>
+              <a:t>Omówienie dostępnych źródeł finansowania dla MSP.</a:t>
+            </a:r>
             <a:endParaRPr lang="pl-PL" dirty="0"/>
           </a:p>
         </p:txBody>
@@ -2466,7 +3264,7 @@
     </p:spTree>
     <p:extLst>
       <p:ext uri="{BB962C8B-B14F-4D97-AF65-F5344CB8AC3E}">
-        <p14:creationId xmlns:p14="http://schemas.microsoft.com/office/powerpoint/2010/main" val="1285695118"/>
+        <p14:creationId xmlns:p14="http://schemas.microsoft.com/office/powerpoint/2010/main" val="3033105106"/>
       </p:ext>
     </p:extLst>
   </p:cSld>
@@ -3268,7 +4066,7 @@
           <p:cNvPr id="2" name="Tytuł 1">
             <a:extLst>
               <a:ext uri="{FF2B5EF4-FFF2-40B4-BE49-F238E27FC236}">
-                <a16:creationId xmlns:a16="http://schemas.microsoft.com/office/drawing/2014/main" id="{F8A666CD-FAEF-999B-6420-E2491B67BD5F}"/>
+                <a16:creationId xmlns:a16="http://schemas.microsoft.com/office/drawing/2014/main" id="{1F6F3566-6B95-A30A-5F3B-DCC07A48B7F9}"/>
               </a:ext>
             </a:extLst>
           </p:cNvPr>
@@ -3282,7 +4080,7 @@
         <p:spPr>
           <a:xfrm>
             <a:off x="0" y="0"/>
-            <a:ext cx="10052050" cy="1655762"/>
+            <a:ext cx="6642100" cy="871537"/>
           </a:xfrm>
         </p:spPr>
         <p:txBody>
@@ -3296,7 +4094,7 @@
                 <a:ea typeface="Aptos" panose="020B0004020202020204" pitchFamily="34" charset="0"/>
                 <a:cs typeface="Arial" panose="020B0604020202020204" pitchFamily="34" charset="0"/>
               </a:rPr>
-              <a:t>Znaczenie edukacji i rozwoju kompetencji</a:t>
+              <a:t>Technologie w MSP</a:t>
             </a:r>
             <a:endParaRPr lang="pl-PL" dirty="0"/>
           </a:p>
@@ -3307,7 +4105,7 @@
           <p:cNvPr id="3" name="Podtytuł 2">
             <a:extLst>
               <a:ext uri="{FF2B5EF4-FFF2-40B4-BE49-F238E27FC236}">
-                <a16:creationId xmlns:a16="http://schemas.microsoft.com/office/drawing/2014/main" id="{08FCDCC6-68DB-1A5D-8F9D-E9896E7CE109}"/>
+                <a16:creationId xmlns:a16="http://schemas.microsoft.com/office/drawing/2014/main" id="{BC5074C2-F5B8-FC2E-CE2B-84DD20D23762}"/>
               </a:ext>
             </a:extLst>
           </p:cNvPr>
@@ -3330,10 +4128,8 @@
                 <a:ea typeface="Aptos" panose="020B0004020202020204" pitchFamily="34" charset="0"/>
                 <a:cs typeface="Arial" panose="020B0604020202020204" pitchFamily="34" charset="0"/>
               </a:rPr>
-              <a:t>Rola szkoleń i podnoszenia kwalifikacji w MSP.</a:t>
-            </a:r>
-          </a:p>
-          <a:p>
+              <a:t>Jak MSP wykorzystują nowoczesne technologie.</a:t>
+            </a:r>
             <a:endParaRPr lang="pl-PL" dirty="0"/>
           </a:p>
         </p:txBody>
@@ -3341,7 +4137,7 @@
     </p:spTree>
     <p:extLst>
       <p:ext uri="{BB962C8B-B14F-4D97-AF65-F5344CB8AC3E}">
-        <p14:creationId xmlns:p14="http://schemas.microsoft.com/office/powerpoint/2010/main" val="1424773706"/>
+        <p14:creationId xmlns:p14="http://schemas.microsoft.com/office/powerpoint/2010/main" val="2821777114"/>
       </p:ext>
     </p:extLst>
   </p:cSld>
@@ -3373,7 +4169,7 @@
           <p:cNvPr id="2" name="Tytuł 1">
             <a:extLst>
               <a:ext uri="{FF2B5EF4-FFF2-40B4-BE49-F238E27FC236}">
-                <a16:creationId xmlns:a16="http://schemas.microsoft.com/office/drawing/2014/main" id="{C3CB12CA-BBA4-9F7A-3999-527C4358A7EA}"/>
+                <a16:creationId xmlns:a16="http://schemas.microsoft.com/office/drawing/2014/main" id="{CCE06549-DBE1-1A47-5D1A-F68E32DEF9BD}"/>
               </a:ext>
             </a:extLst>
           </p:cNvPr>
@@ -3387,7 +4183,7 @@
         <p:spPr>
           <a:xfrm>
             <a:off x="0" y="0"/>
-            <a:ext cx="9144000" cy="1655762"/>
+            <a:ext cx="7613650" cy="858837"/>
           </a:xfrm>
         </p:spPr>
         <p:txBody>
@@ -3401,7 +4197,7 @@
                 <a:ea typeface="Aptos" panose="020B0004020202020204" pitchFamily="34" charset="0"/>
                 <a:cs typeface="Arial" panose="020B0604020202020204" pitchFamily="34" charset="0"/>
               </a:rPr>
-              <a:t>Wpływ pandemii COVID-19 na MSP</a:t>
+              <a:t>Cyfryzacja i innowacje</a:t>
             </a:r>
             <a:endParaRPr lang="pl-PL" dirty="0"/>
           </a:p>
@@ -3412,7 +4208,7 @@
           <p:cNvPr id="3" name="Podtytuł 2">
             <a:extLst>
               <a:ext uri="{FF2B5EF4-FFF2-40B4-BE49-F238E27FC236}">
-                <a16:creationId xmlns:a16="http://schemas.microsoft.com/office/drawing/2014/main" id="{37909995-A5AE-1B15-A818-5F4B581BEACF}"/>
+                <a16:creationId xmlns:a16="http://schemas.microsoft.com/office/drawing/2014/main" id="{ABBDA4C5-C2B6-68AB-A9AD-2E5773DB0E7D}"/>
               </a:ext>
             </a:extLst>
           </p:cNvPr>
@@ -3435,7 +4231,7 @@
                 <a:ea typeface="Aptos" panose="020B0004020202020204" pitchFamily="34" charset="0"/>
                 <a:cs typeface="Arial" panose="020B0604020202020204" pitchFamily="34" charset="0"/>
               </a:rPr>
-              <a:t>Jak pandemia zmieniła funkcjonowanie MSP.</a:t>
+              <a:t>Wpływ cyfryzacji na rozwój MSP.</a:t>
             </a:r>
           </a:p>
           <a:p>
@@ -3446,7 +4242,7 @@
     </p:spTree>
     <p:extLst>
       <p:ext uri="{BB962C8B-B14F-4D97-AF65-F5344CB8AC3E}">
-        <p14:creationId xmlns:p14="http://schemas.microsoft.com/office/powerpoint/2010/main" val="2019547443"/>
+        <p14:creationId xmlns:p14="http://schemas.microsoft.com/office/powerpoint/2010/main" val="1285695118"/>
       </p:ext>
     </p:extLst>
   </p:cSld>
@@ -3478,7 +4274,7 @@
           <p:cNvPr id="2" name="Tytuł 1">
             <a:extLst>
               <a:ext uri="{FF2B5EF4-FFF2-40B4-BE49-F238E27FC236}">
-                <a16:creationId xmlns:a16="http://schemas.microsoft.com/office/drawing/2014/main" id="{53BAA494-A207-4FE5-0D89-56FB59D2CD6D}"/>
+                <a16:creationId xmlns:a16="http://schemas.microsoft.com/office/drawing/2014/main" id="{F8A666CD-FAEF-999B-6420-E2491B67BD5F}"/>
               </a:ext>
             </a:extLst>
           </p:cNvPr>
@@ -3492,7 +4288,7 @@
         <p:spPr>
           <a:xfrm>
             <a:off x="0" y="0"/>
-            <a:ext cx="10864850" cy="858837"/>
+            <a:ext cx="10052050" cy="1655762"/>
           </a:xfrm>
         </p:spPr>
         <p:txBody>
@@ -3506,7 +4302,7 @@
                 <a:ea typeface="Aptos" panose="020B0004020202020204" pitchFamily="34" charset="0"/>
                 <a:cs typeface="Arial" panose="020B0604020202020204" pitchFamily="34" charset="0"/>
               </a:rPr>
-              <a:t>Transformacja ekologiczna MSP</a:t>
+              <a:t>Znaczenie edukacji i rozwoju kompetencji</a:t>
             </a:r>
             <a:endParaRPr lang="pl-PL" dirty="0"/>
           </a:p>
@@ -3517,7 +4313,7 @@
           <p:cNvPr id="3" name="Podtytuł 2">
             <a:extLst>
               <a:ext uri="{FF2B5EF4-FFF2-40B4-BE49-F238E27FC236}">
-                <a16:creationId xmlns:a16="http://schemas.microsoft.com/office/drawing/2014/main" id="{7C1885A0-1771-5BAA-07C0-A3C00C3FE448}"/>
+                <a16:creationId xmlns:a16="http://schemas.microsoft.com/office/drawing/2014/main" id="{08FCDCC6-68DB-1A5D-8F9D-E9896E7CE109}"/>
               </a:ext>
             </a:extLst>
           </p:cNvPr>
@@ -3540,7 +4336,7 @@
                 <a:ea typeface="Aptos" panose="020B0004020202020204" pitchFamily="34" charset="0"/>
                 <a:cs typeface="Arial" panose="020B0604020202020204" pitchFamily="34" charset="0"/>
               </a:rPr>
-              <a:t>Wdrażanie zasad zrównoważonego rozwoju.</a:t>
+              <a:t>Rola szkoleń i podnoszenia kwalifikacji w MSP.</a:t>
             </a:r>
           </a:p>
           <a:p>
@@ -3551,7 +4347,7 @@
     </p:spTree>
     <p:extLst>
       <p:ext uri="{BB962C8B-B14F-4D97-AF65-F5344CB8AC3E}">
-        <p14:creationId xmlns:p14="http://schemas.microsoft.com/office/powerpoint/2010/main" val="3922128850"/>
+        <p14:creationId xmlns:p14="http://schemas.microsoft.com/office/powerpoint/2010/main" val="1424773706"/>
       </p:ext>
     </p:extLst>
   </p:cSld>
@@ -3583,7 +4379,7 @@
           <p:cNvPr id="2" name="Tytuł 1">
             <a:extLst>
               <a:ext uri="{FF2B5EF4-FFF2-40B4-BE49-F238E27FC236}">
-                <a16:creationId xmlns:a16="http://schemas.microsoft.com/office/drawing/2014/main" id="{ABED585B-DBAB-943D-1ED1-37B6803F859F}"/>
+                <a16:creationId xmlns:a16="http://schemas.microsoft.com/office/drawing/2014/main" id="{C3CB12CA-BBA4-9F7A-3999-527C4358A7EA}"/>
               </a:ext>
             </a:extLst>
           </p:cNvPr>
@@ -3597,7 +4393,7 @@
         <p:spPr>
           <a:xfrm>
             <a:off x="0" y="0"/>
-            <a:ext cx="9144000" cy="1773237"/>
+            <a:ext cx="9144000" cy="1655762"/>
           </a:xfrm>
         </p:spPr>
         <p:txBody>
@@ -3611,7 +4407,7 @@
                 <a:ea typeface="Aptos" panose="020B0004020202020204" pitchFamily="34" charset="0"/>
                 <a:cs typeface="Arial" panose="020B0604020202020204" pitchFamily="34" charset="0"/>
               </a:rPr>
-              <a:t>Współpraca MSP z dużymi przedsiębiorstwami</a:t>
+              <a:t>Wpływ pandemii COVID-19 na MSP</a:t>
             </a:r>
             <a:endParaRPr lang="pl-PL" dirty="0"/>
           </a:p>
@@ -3622,7 +4418,7 @@
           <p:cNvPr id="3" name="Podtytuł 2">
             <a:extLst>
               <a:ext uri="{FF2B5EF4-FFF2-40B4-BE49-F238E27FC236}">
-                <a16:creationId xmlns:a16="http://schemas.microsoft.com/office/drawing/2014/main" id="{9454C0FD-E333-4BD7-14F6-FE18A9E11912}"/>
+                <a16:creationId xmlns:a16="http://schemas.microsoft.com/office/drawing/2014/main" id="{37909995-A5AE-1B15-A818-5F4B581BEACF}"/>
               </a:ext>
             </a:extLst>
           </p:cNvPr>
@@ -3645,7 +4441,7 @@
                 <a:ea typeface="Aptos" panose="020B0004020202020204" pitchFamily="34" charset="0"/>
                 <a:cs typeface="Arial" panose="020B0604020202020204" pitchFamily="34" charset="0"/>
               </a:rPr>
-              <a:t>Przykłady i korzyści z partnerstw biznesowych.</a:t>
+              <a:t>Jak pandemia zmieniła funkcjonowanie MSP.</a:t>
             </a:r>
           </a:p>
           <a:p>
@@ -3656,7 +4452,7 @@
     </p:spTree>
     <p:extLst>
       <p:ext uri="{BB962C8B-B14F-4D97-AF65-F5344CB8AC3E}">
-        <p14:creationId xmlns:p14="http://schemas.microsoft.com/office/powerpoint/2010/main" val="629173540"/>
+        <p14:creationId xmlns:p14="http://schemas.microsoft.com/office/powerpoint/2010/main" val="2019547443"/>
       </p:ext>
     </p:extLst>
   </p:cSld>
@@ -3688,7 +4484,7 @@
           <p:cNvPr id="2" name="Tytuł 1">
             <a:extLst>
               <a:ext uri="{FF2B5EF4-FFF2-40B4-BE49-F238E27FC236}">
-                <a16:creationId xmlns:a16="http://schemas.microsoft.com/office/drawing/2014/main" id="{90E642AB-BDDD-0E89-7D8D-D27FDA070107}"/>
+                <a16:creationId xmlns:a16="http://schemas.microsoft.com/office/drawing/2014/main" id="{53BAA494-A207-4FE5-0D89-56FB59D2CD6D}"/>
               </a:ext>
             </a:extLst>
           </p:cNvPr>
@@ -3702,7 +4498,7 @@
         <p:spPr>
           <a:xfrm>
             <a:off x="0" y="0"/>
-            <a:ext cx="11093450" cy="1655762"/>
+            <a:ext cx="10864850" cy="858837"/>
           </a:xfrm>
         </p:spPr>
         <p:txBody>
@@ -3716,7 +4512,7 @@
                 <a:ea typeface="Aptos" panose="020B0004020202020204" pitchFamily="34" charset="0"/>
                 <a:cs typeface="Arial" panose="020B0604020202020204" pitchFamily="34" charset="0"/>
               </a:rPr>
-              <a:t>Internacjonalizacja działalności MSP</a:t>
+              <a:t>Transformacja ekologiczna MSP</a:t>
             </a:r>
             <a:endParaRPr lang="pl-PL" dirty="0"/>
           </a:p>
@@ -3727,7 +4523,7 @@
           <p:cNvPr id="3" name="Podtytuł 2">
             <a:extLst>
               <a:ext uri="{FF2B5EF4-FFF2-40B4-BE49-F238E27FC236}">
-                <a16:creationId xmlns:a16="http://schemas.microsoft.com/office/drawing/2014/main" id="{8F163BF6-010E-285F-6418-3BA286CE0682}"/>
+                <a16:creationId xmlns:a16="http://schemas.microsoft.com/office/drawing/2014/main" id="{7C1885A0-1771-5BAA-07C0-A3C00C3FE448}"/>
               </a:ext>
             </a:extLst>
           </p:cNvPr>
@@ -3750,7 +4546,7 @@
                 <a:ea typeface="Aptos" panose="020B0004020202020204" pitchFamily="34" charset="0"/>
                 <a:cs typeface="Arial" panose="020B0604020202020204" pitchFamily="34" charset="0"/>
               </a:rPr>
-              <a:t>Wyzwania i możliwości dla MSP na rynkach zagranicznych.</a:t>
+              <a:t>Wdrażanie zasad zrównoważonego rozwoju.</a:t>
             </a:r>
           </a:p>
           <a:p>
@@ -3761,7 +4557,7 @@
     </p:spTree>
     <p:extLst>
       <p:ext uri="{BB962C8B-B14F-4D97-AF65-F5344CB8AC3E}">
-        <p14:creationId xmlns:p14="http://schemas.microsoft.com/office/powerpoint/2010/main" val="2956489639"/>
+        <p14:creationId xmlns:p14="http://schemas.microsoft.com/office/powerpoint/2010/main" val="3922128850"/>
       </p:ext>
     </p:extLst>
   </p:cSld>
@@ -3793,7 +4589,7 @@
           <p:cNvPr id="2" name="Tytuł 1">
             <a:extLst>
               <a:ext uri="{FF2B5EF4-FFF2-40B4-BE49-F238E27FC236}">
-                <a16:creationId xmlns:a16="http://schemas.microsoft.com/office/drawing/2014/main" id="{5355E167-AB31-2622-16BA-6949C56343C9}"/>
+                <a16:creationId xmlns:a16="http://schemas.microsoft.com/office/drawing/2014/main" id="{ABED585B-DBAB-943D-1ED1-37B6803F859F}"/>
               </a:ext>
             </a:extLst>
           </p:cNvPr>
@@ -3807,7 +4603,7 @@
         <p:spPr>
           <a:xfrm>
             <a:off x="0" y="0"/>
-            <a:ext cx="6216650" cy="896937"/>
+            <a:ext cx="9144000" cy="1773237"/>
           </a:xfrm>
         </p:spPr>
         <p:txBody>
@@ -3821,7 +4617,7 @@
                 <a:ea typeface="Aptos" panose="020B0004020202020204" pitchFamily="34" charset="0"/>
                 <a:cs typeface="Arial" panose="020B0604020202020204" pitchFamily="34" charset="0"/>
               </a:rPr>
-              <a:t>Rola kobiet w MSP</a:t>
+              <a:t>Współpraca MSP z dużymi przedsiębiorstwami</a:t>
             </a:r>
             <a:endParaRPr lang="pl-PL" dirty="0"/>
           </a:p>
@@ -3832,7 +4628,7 @@
           <p:cNvPr id="3" name="Podtytuł 2">
             <a:extLst>
               <a:ext uri="{FF2B5EF4-FFF2-40B4-BE49-F238E27FC236}">
-                <a16:creationId xmlns:a16="http://schemas.microsoft.com/office/drawing/2014/main" id="{F1FBAE18-A4DD-2153-F4BC-5458115E10E8}"/>
+                <a16:creationId xmlns:a16="http://schemas.microsoft.com/office/drawing/2014/main" id="{9454C0FD-E333-4BD7-14F6-FE18A9E11912}"/>
               </a:ext>
             </a:extLst>
           </p:cNvPr>
@@ -3855,7 +4651,7 @@
                 <a:ea typeface="Aptos" panose="020B0004020202020204" pitchFamily="34" charset="0"/>
                 <a:cs typeface="Arial" panose="020B0604020202020204" pitchFamily="34" charset="0"/>
               </a:rPr>
-              <a:t>Wkład kobiet w rozwój małych i średnich przedsiębiorstw.</a:t>
+              <a:t>Przykłady i korzyści z partnerstw biznesowych.</a:t>
             </a:r>
           </a:p>
           <a:p>
@@ -3866,7 +4662,7 @@
     </p:spTree>
     <p:extLst>
       <p:ext uri="{BB962C8B-B14F-4D97-AF65-F5344CB8AC3E}">
-        <p14:creationId xmlns:p14="http://schemas.microsoft.com/office/powerpoint/2010/main" val="968428259"/>
+        <p14:creationId xmlns:p14="http://schemas.microsoft.com/office/powerpoint/2010/main" val="629173540"/>
       </p:ext>
     </p:extLst>
   </p:cSld>
@@ -3898,7 +4694,7 @@
           <p:cNvPr id="2" name="Tytuł 1">
             <a:extLst>
               <a:ext uri="{FF2B5EF4-FFF2-40B4-BE49-F238E27FC236}">
-                <a16:creationId xmlns:a16="http://schemas.microsoft.com/office/drawing/2014/main" id="{A29402F0-559D-988E-CD81-6657D9463EF2}"/>
+                <a16:creationId xmlns:a16="http://schemas.microsoft.com/office/drawing/2014/main" id="{90E642AB-BDDD-0E89-7D8D-D27FDA070107}"/>
               </a:ext>
             </a:extLst>
           </p:cNvPr>
@@ -3911,8 +4707,8 @@
         </p:nvSpPr>
         <p:spPr>
           <a:xfrm>
-            <a:off x="0" y="-7937"/>
-            <a:ext cx="10617200" cy="1655762"/>
+            <a:off x="0" y="0"/>
+            <a:ext cx="11093450" cy="1655762"/>
           </a:xfrm>
         </p:spPr>
         <p:txBody>
@@ -3926,7 +4722,7 @@
                 <a:ea typeface="Aptos" panose="020B0004020202020204" pitchFamily="34" charset="0"/>
                 <a:cs typeface="Arial" panose="020B0604020202020204" pitchFamily="34" charset="0"/>
               </a:rPr>
-              <a:t>Wsparcie dla innowacyjności w MSP</a:t>
+              <a:t>Internacjonalizacja działalności MSP</a:t>
             </a:r>
             <a:endParaRPr lang="pl-PL" dirty="0"/>
           </a:p>
@@ -3937,7 +4733,7 @@
           <p:cNvPr id="3" name="Podtytuł 2">
             <a:extLst>
               <a:ext uri="{FF2B5EF4-FFF2-40B4-BE49-F238E27FC236}">
-                <a16:creationId xmlns:a16="http://schemas.microsoft.com/office/drawing/2014/main" id="{9F216867-1A8C-6050-EDBF-83BECC4F23DC}"/>
+                <a16:creationId xmlns:a16="http://schemas.microsoft.com/office/drawing/2014/main" id="{8F163BF6-010E-285F-6418-3BA286CE0682}"/>
               </a:ext>
             </a:extLst>
           </p:cNvPr>
@@ -3960,7 +4756,7 @@
                 <a:ea typeface="Aptos" panose="020B0004020202020204" pitchFamily="34" charset="0"/>
                 <a:cs typeface="Arial" panose="020B0604020202020204" pitchFamily="34" charset="0"/>
               </a:rPr>
-              <a:t>Programy i inicjatywy wspierające innowacyjność.</a:t>
+              <a:t>Wyzwania i możliwości dla MSP na rynkach zagranicznych.</a:t>
             </a:r>
           </a:p>
           <a:p>
@@ -3971,7 +4767,7 @@
     </p:spTree>
     <p:extLst>
       <p:ext uri="{BB962C8B-B14F-4D97-AF65-F5344CB8AC3E}">
-        <p14:creationId xmlns:p14="http://schemas.microsoft.com/office/powerpoint/2010/main" val="2621513051"/>
+        <p14:creationId xmlns:p14="http://schemas.microsoft.com/office/powerpoint/2010/main" val="2956489639"/>
       </p:ext>
     </p:extLst>
   </p:cSld>
@@ -4003,7 +4799,7 @@
           <p:cNvPr id="2" name="Tytuł 1">
             <a:extLst>
               <a:ext uri="{FF2B5EF4-FFF2-40B4-BE49-F238E27FC236}">
-                <a16:creationId xmlns:a16="http://schemas.microsoft.com/office/drawing/2014/main" id="{21BF122B-BA55-807F-04FE-D8C5046182F3}"/>
+                <a16:creationId xmlns:a16="http://schemas.microsoft.com/office/drawing/2014/main" id="{5355E167-AB31-2622-16BA-6949C56343C9}"/>
               </a:ext>
             </a:extLst>
           </p:cNvPr>
@@ -4017,7 +4813,7 @@
         <p:spPr>
           <a:xfrm>
             <a:off x="0" y="0"/>
-            <a:ext cx="9575800" cy="1655762"/>
+            <a:ext cx="6216650" cy="896937"/>
           </a:xfrm>
         </p:spPr>
         <p:txBody>
@@ -4031,7 +4827,7 @@
                 <a:ea typeface="Aptos" panose="020B0004020202020204" pitchFamily="34" charset="0"/>
                 <a:cs typeface="Arial" panose="020B0604020202020204" pitchFamily="34" charset="0"/>
               </a:rPr>
-              <a:t>Przykłady wsparcia unijnego dla MSP</a:t>
+              <a:t>Rola kobiet w MSP</a:t>
             </a:r>
             <a:endParaRPr lang="pl-PL" dirty="0"/>
           </a:p>
@@ -4042,7 +4838,7 @@
           <p:cNvPr id="3" name="Podtytuł 2">
             <a:extLst>
               <a:ext uri="{FF2B5EF4-FFF2-40B4-BE49-F238E27FC236}">
-                <a16:creationId xmlns:a16="http://schemas.microsoft.com/office/drawing/2014/main" id="{F1E62837-E435-F4A8-8A0F-873FA4517422}"/>
+                <a16:creationId xmlns:a16="http://schemas.microsoft.com/office/drawing/2014/main" id="{F1FBAE18-A4DD-2153-F4BC-5458115E10E8}"/>
               </a:ext>
             </a:extLst>
           </p:cNvPr>
@@ -4065,7 +4861,7 @@
                 <a:ea typeface="Aptos" panose="020B0004020202020204" pitchFamily="34" charset="0"/>
                 <a:cs typeface="Arial" panose="020B0604020202020204" pitchFamily="34" charset="0"/>
               </a:rPr>
-              <a:t>Jak MSP mogą korzystać z funduszy UE.</a:t>
+              <a:t>Wkład kobiet w rozwój małych i średnich przedsiębiorstw.</a:t>
             </a:r>
           </a:p>
           <a:p>
@@ -4076,7 +4872,7 @@
     </p:spTree>
     <p:extLst>
       <p:ext uri="{BB962C8B-B14F-4D97-AF65-F5344CB8AC3E}">
-        <p14:creationId xmlns:p14="http://schemas.microsoft.com/office/powerpoint/2010/main" val="1820265832"/>
+        <p14:creationId xmlns:p14="http://schemas.microsoft.com/office/powerpoint/2010/main" val="968428259"/>
       </p:ext>
     </p:extLst>
   </p:cSld>
@@ -4108,7 +4904,7 @@
           <p:cNvPr id="2" name="Tytuł 1">
             <a:extLst>
               <a:ext uri="{FF2B5EF4-FFF2-40B4-BE49-F238E27FC236}">
-                <a16:creationId xmlns:a16="http://schemas.microsoft.com/office/drawing/2014/main" id="{14A27EA1-839C-8FAD-6E5F-25A8E527F528}"/>
+                <a16:creationId xmlns:a16="http://schemas.microsoft.com/office/drawing/2014/main" id="{A29402F0-559D-988E-CD81-6657D9463EF2}"/>
               </a:ext>
             </a:extLst>
           </p:cNvPr>
@@ -4121,8 +4917,8 @@
         </p:nvSpPr>
         <p:spPr>
           <a:xfrm>
-            <a:off x="0" y="17463"/>
-            <a:ext cx="9817100" cy="1655762"/>
+            <a:off x="0" y="-7937"/>
+            <a:ext cx="10617200" cy="1655762"/>
           </a:xfrm>
         </p:spPr>
         <p:txBody>
@@ -4136,7 +4932,7 @@
                 <a:ea typeface="Aptos" panose="020B0004020202020204" pitchFamily="34" charset="0"/>
                 <a:cs typeface="Arial" panose="020B0604020202020204" pitchFamily="34" charset="0"/>
               </a:rPr>
-              <a:t>Wpływ prawny na działalność MSP</a:t>
+              <a:t>Wsparcie dla innowacyjności w MSP</a:t>
             </a:r>
             <a:endParaRPr lang="pl-PL" dirty="0"/>
           </a:p>
@@ -4147,7 +4943,7 @@
           <p:cNvPr id="3" name="Podtytuł 2">
             <a:extLst>
               <a:ext uri="{FF2B5EF4-FFF2-40B4-BE49-F238E27FC236}">
-                <a16:creationId xmlns:a16="http://schemas.microsoft.com/office/drawing/2014/main" id="{DC8D59A5-8973-11E5-2A44-FA5393A320D1}"/>
+                <a16:creationId xmlns:a16="http://schemas.microsoft.com/office/drawing/2014/main" id="{9F216867-1A8C-6050-EDBF-83BECC4F23DC}"/>
               </a:ext>
             </a:extLst>
           </p:cNvPr>
@@ -4170,7 +4966,7 @@
                 <a:ea typeface="Aptos" panose="020B0004020202020204" pitchFamily="34" charset="0"/>
                 <a:cs typeface="Arial" panose="020B0604020202020204" pitchFamily="34" charset="0"/>
               </a:rPr>
-              <a:t>Przegląd najważniejszych regulacji prawnych.</a:t>
+              <a:t>Programy i inicjatywy wspierające innowacyjność.</a:t>
             </a:r>
           </a:p>
           <a:p>
@@ -4181,7 +4977,7 @@
     </p:spTree>
     <p:extLst>
       <p:ext uri="{BB962C8B-B14F-4D97-AF65-F5344CB8AC3E}">
-        <p14:creationId xmlns:p14="http://schemas.microsoft.com/office/powerpoint/2010/main" val="2368274704"/>
+        <p14:creationId xmlns:p14="http://schemas.microsoft.com/office/powerpoint/2010/main" val="2621513051"/>
       </p:ext>
     </p:extLst>
   </p:cSld>
@@ -4213,7 +5009,7 @@
           <p:cNvPr id="2" name="Tytuł 1">
             <a:extLst>
               <a:ext uri="{FF2B5EF4-FFF2-40B4-BE49-F238E27FC236}">
-                <a16:creationId xmlns:a16="http://schemas.microsoft.com/office/drawing/2014/main" id="{801D8C9E-1B84-F384-3CBD-2C6B4D62501E}"/>
+                <a16:creationId xmlns:a16="http://schemas.microsoft.com/office/drawing/2014/main" id="{21BF122B-BA55-807F-04FE-D8C5046182F3}"/>
               </a:ext>
             </a:extLst>
           </p:cNvPr>
@@ -4227,7 +5023,7 @@
         <p:spPr>
           <a:xfrm>
             <a:off x="0" y="0"/>
-            <a:ext cx="8801100" cy="1655762"/>
+            <a:ext cx="9575800" cy="1655762"/>
           </a:xfrm>
         </p:spPr>
         <p:txBody>
@@ -4241,7 +5037,7 @@
                 <a:ea typeface="Aptos" panose="020B0004020202020204" pitchFamily="34" charset="0"/>
                 <a:cs typeface="Arial" panose="020B0604020202020204" pitchFamily="34" charset="0"/>
               </a:rPr>
-              <a:t>Podsumowanie roli MSP w gospodarce</a:t>
+              <a:t>Przykłady wsparcia unijnego dla MSP</a:t>
             </a:r>
             <a:endParaRPr lang="pl-PL" dirty="0"/>
           </a:p>
@@ -4252,7 +5048,7 @@
           <p:cNvPr id="3" name="Podtytuł 2">
             <a:extLst>
               <a:ext uri="{FF2B5EF4-FFF2-40B4-BE49-F238E27FC236}">
-                <a16:creationId xmlns:a16="http://schemas.microsoft.com/office/drawing/2014/main" id="{7D9596A3-67C0-0A05-3818-22067A265B83}"/>
+                <a16:creationId xmlns:a16="http://schemas.microsoft.com/office/drawing/2014/main" id="{F1E62837-E435-F4A8-8A0F-873FA4517422}"/>
               </a:ext>
             </a:extLst>
           </p:cNvPr>
@@ -4275,7 +5071,7 @@
                 <a:ea typeface="Aptos" panose="020B0004020202020204" pitchFamily="34" charset="0"/>
                 <a:cs typeface="Arial" panose="020B0604020202020204" pitchFamily="34" charset="0"/>
               </a:rPr>
-              <a:t>Kluczowe punkty dotyczące znaczenia MSP.</a:t>
+              <a:t>Jak MSP mogą korzystać z funduszy UE.</a:t>
             </a:r>
           </a:p>
           <a:p>
@@ -4286,7 +5082,7 @@
     </p:spTree>
     <p:extLst>
       <p:ext uri="{BB962C8B-B14F-4D97-AF65-F5344CB8AC3E}">
-        <p14:creationId xmlns:p14="http://schemas.microsoft.com/office/powerpoint/2010/main" val="954608238"/>
+        <p14:creationId xmlns:p14="http://schemas.microsoft.com/office/powerpoint/2010/main" val="1820265832"/>
       </p:ext>
     </p:extLst>
   </p:cSld>
@@ -4445,7 +5241,7 @@
           <p:cNvPr id="2" name="Tytuł 1">
             <a:extLst>
               <a:ext uri="{FF2B5EF4-FFF2-40B4-BE49-F238E27FC236}">
-                <a16:creationId xmlns:a16="http://schemas.microsoft.com/office/drawing/2014/main" id="{2680D1FD-37DE-756F-502E-F303EB6232C7}"/>
+                <a16:creationId xmlns:a16="http://schemas.microsoft.com/office/drawing/2014/main" id="{14A27EA1-839C-8FAD-6E5F-25A8E527F528}"/>
               </a:ext>
             </a:extLst>
           </p:cNvPr>
@@ -4458,8 +5254,8 @@
         </p:nvSpPr>
         <p:spPr>
           <a:xfrm>
-            <a:off x="0" y="0"/>
-            <a:ext cx="10134600" cy="858837"/>
+            <a:off x="0" y="17463"/>
+            <a:ext cx="9817100" cy="1655762"/>
           </a:xfrm>
         </p:spPr>
         <p:txBody>
@@ -4473,7 +5269,7 @@
                 <a:ea typeface="Aptos" panose="020B0004020202020204" pitchFamily="34" charset="0"/>
                 <a:cs typeface="Arial" panose="020B0604020202020204" pitchFamily="34" charset="0"/>
               </a:rPr>
-              <a:t>Wyzwania przyszłości dla MSP</a:t>
+              <a:t>Wpływ prawny na działalność MSP</a:t>
             </a:r>
             <a:endParaRPr lang="pl-PL" dirty="0"/>
           </a:p>
@@ -4484,7 +5280,7 @@
           <p:cNvPr id="3" name="Podtytuł 2">
             <a:extLst>
               <a:ext uri="{FF2B5EF4-FFF2-40B4-BE49-F238E27FC236}">
-                <a16:creationId xmlns:a16="http://schemas.microsoft.com/office/drawing/2014/main" id="{583F4A0C-AAF5-61AD-5F29-A26E4F2F319B}"/>
+                <a16:creationId xmlns:a16="http://schemas.microsoft.com/office/drawing/2014/main" id="{DC8D59A5-8973-11E5-2A44-FA5393A320D1}"/>
               </a:ext>
             </a:extLst>
           </p:cNvPr>
@@ -4507,7 +5303,7 @@
                 <a:ea typeface="Aptos" panose="020B0004020202020204" pitchFamily="34" charset="0"/>
                 <a:cs typeface="Arial" panose="020B0604020202020204" pitchFamily="34" charset="0"/>
               </a:rPr>
-              <a:t>Przyszłe trendy i wyzwania.</a:t>
+              <a:t>Przegląd najważniejszych regulacji prawnych.</a:t>
             </a:r>
           </a:p>
           <a:p>
@@ -4518,7 +5314,7 @@
     </p:spTree>
     <p:extLst>
       <p:ext uri="{BB962C8B-B14F-4D97-AF65-F5344CB8AC3E}">
-        <p14:creationId xmlns:p14="http://schemas.microsoft.com/office/powerpoint/2010/main" val="2481009243"/>
+        <p14:creationId xmlns:p14="http://schemas.microsoft.com/office/powerpoint/2010/main" val="2368274704"/>
       </p:ext>
     </p:extLst>
   </p:cSld>
@@ -4550,7 +5346,7 @@
           <p:cNvPr id="2" name="Tytuł 1">
             <a:extLst>
               <a:ext uri="{FF2B5EF4-FFF2-40B4-BE49-F238E27FC236}">
-                <a16:creationId xmlns:a16="http://schemas.microsoft.com/office/drawing/2014/main" id="{FD763A98-C732-F10F-4AD1-E900C4911935}"/>
+                <a16:creationId xmlns:a16="http://schemas.microsoft.com/office/drawing/2014/main" id="{801D8C9E-1B84-F384-3CBD-2C6B4D62501E}"/>
               </a:ext>
             </a:extLst>
           </p:cNvPr>
@@ -4564,7 +5360,7 @@
         <p:spPr>
           <a:xfrm>
             <a:off x="0" y="0"/>
-            <a:ext cx="8756650" cy="1655762"/>
+            <a:ext cx="8801100" cy="1655762"/>
           </a:xfrm>
         </p:spPr>
         <p:txBody>
@@ -4578,7 +5374,7 @@
                 <a:ea typeface="Aptos" panose="020B0004020202020204" pitchFamily="34" charset="0"/>
                 <a:cs typeface="Arial" panose="020B0604020202020204" pitchFamily="34" charset="0"/>
               </a:rPr>
-              <a:t>Perspektywy rozwoju MSP w Polsce</a:t>
+              <a:t>Podsumowanie roli MSP w gospodarce</a:t>
             </a:r>
             <a:endParaRPr lang="pl-PL" dirty="0"/>
           </a:p>
@@ -4589,7 +5385,7 @@
           <p:cNvPr id="3" name="Podtytuł 2">
             <a:extLst>
               <a:ext uri="{FF2B5EF4-FFF2-40B4-BE49-F238E27FC236}">
-                <a16:creationId xmlns:a16="http://schemas.microsoft.com/office/drawing/2014/main" id="{5910BDC3-D246-0489-9DA5-B9B506919B0B}"/>
+                <a16:creationId xmlns:a16="http://schemas.microsoft.com/office/drawing/2014/main" id="{7D9596A3-67C0-0A05-3818-22067A265B83}"/>
               </a:ext>
             </a:extLst>
           </p:cNvPr>
@@ -4612,8 +5408,10 @@
                 <a:ea typeface="Aptos" panose="020B0004020202020204" pitchFamily="34" charset="0"/>
                 <a:cs typeface="Arial" panose="020B0604020202020204" pitchFamily="34" charset="0"/>
               </a:rPr>
-              <a:t>Jakie są perspektywy dla MSP w najbliższych latach.</a:t>
-            </a:r>
+              <a:t>Kluczowe punkty dotyczące znaczenia MSP.</a:t>
+            </a:r>
+          </a:p>
+          <a:p>
             <a:endParaRPr lang="pl-PL" dirty="0"/>
           </a:p>
         </p:txBody>
@@ -4621,7 +5419,7 @@
     </p:spTree>
     <p:extLst>
       <p:ext uri="{BB962C8B-B14F-4D97-AF65-F5344CB8AC3E}">
-        <p14:creationId xmlns:p14="http://schemas.microsoft.com/office/powerpoint/2010/main" val="2473335318"/>
+        <p14:creationId xmlns:p14="http://schemas.microsoft.com/office/powerpoint/2010/main" val="954608238"/>
       </p:ext>
     </p:extLst>
   </p:cSld>
@@ -4653,7 +5451,7 @@
           <p:cNvPr id="2" name="Tytuł 1">
             <a:extLst>
               <a:ext uri="{FF2B5EF4-FFF2-40B4-BE49-F238E27FC236}">
-                <a16:creationId xmlns:a16="http://schemas.microsoft.com/office/drawing/2014/main" id="{B381D744-2968-AF9F-3C2E-B5DBC435249C}"/>
+                <a16:creationId xmlns:a16="http://schemas.microsoft.com/office/drawing/2014/main" id="{2680D1FD-37DE-756F-502E-F303EB6232C7}"/>
               </a:ext>
             </a:extLst>
           </p:cNvPr>
@@ -4666,8 +5464,8 @@
         </p:nvSpPr>
         <p:spPr>
           <a:xfrm>
-            <a:off x="0" y="68263"/>
-            <a:ext cx="8883650" cy="1655762"/>
+            <a:off x="0" y="0"/>
+            <a:ext cx="10134600" cy="858837"/>
           </a:xfrm>
         </p:spPr>
         <p:txBody>
@@ -4681,7 +5479,7 @@
                 <a:ea typeface="Aptos" panose="020B0004020202020204" pitchFamily="34" charset="0"/>
                 <a:cs typeface="Arial" panose="020B0604020202020204" pitchFamily="34" charset="0"/>
               </a:rPr>
-              <a:t>Rekomendacje dla polityki gospodarczej</a:t>
+              <a:t>Wyzwania przyszłości dla MSP</a:t>
             </a:r>
             <a:endParaRPr lang="pl-PL" dirty="0"/>
           </a:p>
@@ -4692,7 +5490,7 @@
           <p:cNvPr id="3" name="Podtytuł 2">
             <a:extLst>
               <a:ext uri="{FF2B5EF4-FFF2-40B4-BE49-F238E27FC236}">
-                <a16:creationId xmlns:a16="http://schemas.microsoft.com/office/drawing/2014/main" id="{886C80A6-1C06-F1A4-A1B1-1241F83E6792}"/>
+                <a16:creationId xmlns:a16="http://schemas.microsoft.com/office/drawing/2014/main" id="{583F4A0C-AAF5-61AD-5F29-A26E4F2F319B}"/>
               </a:ext>
             </a:extLst>
           </p:cNvPr>
@@ -4715,7 +5513,7 @@
                 <a:ea typeface="Aptos" panose="020B0004020202020204" pitchFamily="34" charset="0"/>
                 <a:cs typeface="Arial" panose="020B0604020202020204" pitchFamily="34" charset="0"/>
               </a:rPr>
-              <a:t>Propozycje działań wspierających MSP.</a:t>
+              <a:t>Przyszłe trendy i wyzwania.</a:t>
             </a:r>
           </a:p>
           <a:p>
@@ -4726,7 +5524,7 @@
     </p:spTree>
     <p:extLst>
       <p:ext uri="{BB962C8B-B14F-4D97-AF65-F5344CB8AC3E}">
-        <p14:creationId xmlns:p14="http://schemas.microsoft.com/office/powerpoint/2010/main" val="3568010618"/>
+        <p14:creationId xmlns:p14="http://schemas.microsoft.com/office/powerpoint/2010/main" val="2481009243"/>
       </p:ext>
     </p:extLst>
   </p:cSld>
@@ -4758,7 +5556,7 @@
           <p:cNvPr id="2" name="Tytuł 1">
             <a:extLst>
               <a:ext uri="{FF2B5EF4-FFF2-40B4-BE49-F238E27FC236}">
-                <a16:creationId xmlns:a16="http://schemas.microsoft.com/office/drawing/2014/main" id="{9CE1ED27-A993-3C8B-C8B8-667A5F8BE776}"/>
+                <a16:creationId xmlns:a16="http://schemas.microsoft.com/office/drawing/2014/main" id="{FD763A98-C732-F10F-4AD1-E900C4911935}"/>
               </a:ext>
             </a:extLst>
           </p:cNvPr>
@@ -4772,7 +5570,7 @@
         <p:spPr>
           <a:xfrm>
             <a:off x="0" y="0"/>
-            <a:ext cx="11233150" cy="922337"/>
+            <a:ext cx="8756650" cy="1655762"/>
           </a:xfrm>
         </p:spPr>
         <p:txBody>
@@ -4786,7 +5584,7 @@
                 <a:ea typeface="Aptos" panose="020B0004020202020204" pitchFamily="34" charset="0"/>
                 <a:cs typeface="Arial" panose="020B0604020202020204" pitchFamily="34" charset="0"/>
               </a:rPr>
-              <a:t>Znaczenie edukacji ekonomicznej</a:t>
+              <a:t>Perspektywy rozwoju MSP w Polsce</a:t>
             </a:r>
             <a:endParaRPr lang="pl-PL" dirty="0"/>
           </a:p>
@@ -4797,7 +5595,7 @@
           <p:cNvPr id="3" name="Podtytuł 2">
             <a:extLst>
               <a:ext uri="{FF2B5EF4-FFF2-40B4-BE49-F238E27FC236}">
-                <a16:creationId xmlns:a16="http://schemas.microsoft.com/office/drawing/2014/main" id="{0B6C0515-4DCC-3B1F-66C6-B0224FBBAB60}"/>
+                <a16:creationId xmlns:a16="http://schemas.microsoft.com/office/drawing/2014/main" id="{5910BDC3-D246-0489-9DA5-B9B506919B0B}"/>
               </a:ext>
             </a:extLst>
           </p:cNvPr>
@@ -4820,7 +5618,7 @@
                 <a:ea typeface="Aptos" panose="020B0004020202020204" pitchFamily="34" charset="0"/>
                 <a:cs typeface="Arial" panose="020B0604020202020204" pitchFamily="34" charset="0"/>
               </a:rPr>
-              <a:t>Jak edukacja wpływa na rozwój przedsiębiorczości.</a:t>
+              <a:t>Jakie są perspektywy dla MSP w najbliższych latach.</a:t>
             </a:r>
             <a:endParaRPr lang="pl-PL" dirty="0"/>
           </a:p>
@@ -4829,7 +5627,7 @@
     </p:spTree>
     <p:extLst>
       <p:ext uri="{BB962C8B-B14F-4D97-AF65-F5344CB8AC3E}">
-        <p14:creationId xmlns:p14="http://schemas.microsoft.com/office/powerpoint/2010/main" val="3311894841"/>
+        <p14:creationId xmlns:p14="http://schemas.microsoft.com/office/powerpoint/2010/main" val="2473335318"/>
       </p:ext>
     </p:extLst>
   </p:cSld>
@@ -4861,7 +5659,7 @@
           <p:cNvPr id="2" name="Tytuł 1">
             <a:extLst>
               <a:ext uri="{FF2B5EF4-FFF2-40B4-BE49-F238E27FC236}">
-                <a16:creationId xmlns:a16="http://schemas.microsoft.com/office/drawing/2014/main" id="{93FCB974-477A-30E4-EFA7-FB73BF1EA048}"/>
+                <a16:creationId xmlns:a16="http://schemas.microsoft.com/office/drawing/2014/main" id="{B381D744-2968-AF9F-3C2E-B5DBC435249C}"/>
               </a:ext>
             </a:extLst>
           </p:cNvPr>
@@ -4874,8 +5672,8 @@
         </p:nvSpPr>
         <p:spPr>
           <a:xfrm>
-            <a:off x="0" y="0"/>
-            <a:ext cx="10623550" cy="814387"/>
+            <a:off x="0" y="68263"/>
+            <a:ext cx="8883650" cy="1655762"/>
           </a:xfrm>
         </p:spPr>
         <p:txBody>
@@ -4889,7 +5687,7 @@
                 <a:ea typeface="Aptos" panose="020B0004020202020204" pitchFamily="34" charset="0"/>
                 <a:cs typeface="Arial" panose="020B0604020202020204" pitchFamily="34" charset="0"/>
               </a:rPr>
-              <a:t>Rola organizacji pozarządowych</a:t>
+              <a:t>Rekomendacje dla polityki gospodarczej</a:t>
             </a:r>
             <a:endParaRPr lang="pl-PL" dirty="0"/>
           </a:p>
@@ -4900,7 +5698,7 @@
           <p:cNvPr id="3" name="Podtytuł 2">
             <a:extLst>
               <a:ext uri="{FF2B5EF4-FFF2-40B4-BE49-F238E27FC236}">
-                <a16:creationId xmlns:a16="http://schemas.microsoft.com/office/drawing/2014/main" id="{0D9FED86-0910-814F-A420-711A3C269779}"/>
+                <a16:creationId xmlns:a16="http://schemas.microsoft.com/office/drawing/2014/main" id="{886C80A6-1C06-F1A4-A1B1-1241F83E6792}"/>
               </a:ext>
             </a:extLst>
           </p:cNvPr>
@@ -4923,7 +5721,7 @@
                 <a:ea typeface="Aptos" panose="020B0004020202020204" pitchFamily="34" charset="0"/>
                 <a:cs typeface="Arial" panose="020B0604020202020204" pitchFamily="34" charset="0"/>
               </a:rPr>
-              <a:t>Wsparcie dla MSP ze strony NGO.</a:t>
+              <a:t>Propozycje działań wspierających MSP.</a:t>
             </a:r>
           </a:p>
           <a:p>
@@ -4934,7 +5732,7 @@
     </p:spTree>
     <p:extLst>
       <p:ext uri="{BB962C8B-B14F-4D97-AF65-F5344CB8AC3E}">
-        <p14:creationId xmlns:p14="http://schemas.microsoft.com/office/powerpoint/2010/main" val="2913440133"/>
+        <p14:creationId xmlns:p14="http://schemas.microsoft.com/office/powerpoint/2010/main" val="3568010618"/>
       </p:ext>
     </p:extLst>
   </p:cSld>
@@ -4966,7 +5764,7 @@
           <p:cNvPr id="2" name="Tytuł 1">
             <a:extLst>
               <a:ext uri="{FF2B5EF4-FFF2-40B4-BE49-F238E27FC236}">
-                <a16:creationId xmlns:a16="http://schemas.microsoft.com/office/drawing/2014/main" id="{F2EA8395-92A0-5270-979F-654F2EA6C616}"/>
+                <a16:creationId xmlns:a16="http://schemas.microsoft.com/office/drawing/2014/main" id="{9CE1ED27-A993-3C8B-C8B8-667A5F8BE776}"/>
               </a:ext>
             </a:extLst>
           </p:cNvPr>
@@ -4980,7 +5778,7 @@
         <p:spPr>
           <a:xfrm>
             <a:off x="0" y="0"/>
-            <a:ext cx="9309100" cy="846137"/>
+            <a:ext cx="11233150" cy="922337"/>
           </a:xfrm>
         </p:spPr>
         <p:txBody>
@@ -4994,7 +5792,7 @@
                 <a:ea typeface="Aptos" panose="020B0004020202020204" pitchFamily="34" charset="0"/>
                 <a:cs typeface="Arial" panose="020B0604020202020204" pitchFamily="34" charset="0"/>
               </a:rPr>
-              <a:t>Networking i jego znaczenie</a:t>
+              <a:t>Znaczenie edukacji ekonomicznej</a:t>
             </a:r>
             <a:endParaRPr lang="pl-PL" dirty="0"/>
           </a:p>
@@ -5005,7 +5803,7 @@
           <p:cNvPr id="3" name="Podtytuł 2">
             <a:extLst>
               <a:ext uri="{FF2B5EF4-FFF2-40B4-BE49-F238E27FC236}">
-                <a16:creationId xmlns:a16="http://schemas.microsoft.com/office/drawing/2014/main" id="{0267660E-D456-E413-775C-EB4BA7E582E7}"/>
+                <a16:creationId xmlns:a16="http://schemas.microsoft.com/office/drawing/2014/main" id="{0B6C0515-4DCC-3B1F-66C6-B0224FBBAB60}"/>
               </a:ext>
             </a:extLst>
           </p:cNvPr>
@@ -5028,10 +5826,8 @@
                 <a:ea typeface="Aptos" panose="020B0004020202020204" pitchFamily="34" charset="0"/>
                 <a:cs typeface="Arial" panose="020B0604020202020204" pitchFamily="34" charset="0"/>
               </a:rPr>
-              <a:t>Rola sieci biznesowych dla MSP.</a:t>
-            </a:r>
-          </a:p>
-          <a:p>
+              <a:t>Jak edukacja wpływa na rozwój przedsiębiorczości.</a:t>
+            </a:r>
             <a:endParaRPr lang="pl-PL" dirty="0"/>
           </a:p>
         </p:txBody>
@@ -5039,7 +5835,7 @@
     </p:spTree>
     <p:extLst>
       <p:ext uri="{BB962C8B-B14F-4D97-AF65-F5344CB8AC3E}">
-        <p14:creationId xmlns:p14="http://schemas.microsoft.com/office/powerpoint/2010/main" val="2322185524"/>
+        <p14:creationId xmlns:p14="http://schemas.microsoft.com/office/powerpoint/2010/main" val="3311894841"/>
       </p:ext>
     </p:extLst>
   </p:cSld>
@@ -5071,7 +5867,7 @@
           <p:cNvPr id="2" name="Tytuł 1">
             <a:extLst>
               <a:ext uri="{FF2B5EF4-FFF2-40B4-BE49-F238E27FC236}">
-                <a16:creationId xmlns:a16="http://schemas.microsoft.com/office/drawing/2014/main" id="{75E4E6F7-5F11-C0AC-6AD8-E60F34C3C5C8}"/>
+                <a16:creationId xmlns:a16="http://schemas.microsoft.com/office/drawing/2014/main" id="{93FCB974-477A-30E4-EFA7-FB73BF1EA048}"/>
               </a:ext>
             </a:extLst>
           </p:cNvPr>
@@ -5084,8 +5880,8 @@
         </p:nvSpPr>
         <p:spPr>
           <a:xfrm>
-            <a:off x="0" y="30163"/>
-            <a:ext cx="9544050" cy="1655762"/>
+            <a:off x="0" y="0"/>
+            <a:ext cx="10623550" cy="814387"/>
           </a:xfrm>
         </p:spPr>
         <p:txBody>
@@ -5099,25 +5895,7 @@
                 <a:ea typeface="Aptos" panose="020B0004020202020204" pitchFamily="34" charset="0"/>
                 <a:cs typeface="Arial" panose="020B0604020202020204" pitchFamily="34" charset="0"/>
               </a:rPr>
-              <a:t>Case </a:t>
-            </a:r>
-            <a:r>
-              <a:rPr lang="pl-PL" dirty="0" err="1">
-                <a:effectLst/>
-                <a:latin typeface="Aptos" panose="020B0004020202020204" pitchFamily="34" charset="0"/>
-                <a:ea typeface="Aptos" panose="020B0004020202020204" pitchFamily="34" charset="0"/>
-                <a:cs typeface="Arial" panose="020B0604020202020204" pitchFamily="34" charset="0"/>
-              </a:rPr>
-              <a:t>study</a:t>
-            </a:r>
-            <a:r>
-              <a:rPr lang="pl-PL" dirty="0">
-                <a:effectLst/>
-                <a:latin typeface="Aptos" panose="020B0004020202020204" pitchFamily="34" charset="0"/>
-                <a:ea typeface="Aptos" panose="020B0004020202020204" pitchFamily="34" charset="0"/>
-                <a:cs typeface="Arial" panose="020B0604020202020204" pitchFamily="34" charset="0"/>
-              </a:rPr>
-              <a:t>: Przekształcenie kryzysu w sukces</a:t>
+              <a:t>Rola organizacji pozarządowych</a:t>
             </a:r>
             <a:endParaRPr lang="pl-PL" dirty="0"/>
           </a:p>
@@ -5128,7 +5906,7 @@
           <p:cNvPr id="3" name="Podtytuł 2">
             <a:extLst>
               <a:ext uri="{FF2B5EF4-FFF2-40B4-BE49-F238E27FC236}">
-                <a16:creationId xmlns:a16="http://schemas.microsoft.com/office/drawing/2014/main" id="{E473E86A-6E74-6CD7-D0D3-942206610D98}"/>
+                <a16:creationId xmlns:a16="http://schemas.microsoft.com/office/drawing/2014/main" id="{0D9FED86-0910-814F-A420-711A3C269779}"/>
               </a:ext>
             </a:extLst>
           </p:cNvPr>
@@ -5151,7 +5929,7 @@
                 <a:ea typeface="Aptos" panose="020B0004020202020204" pitchFamily="34" charset="0"/>
                 <a:cs typeface="Arial" panose="020B0604020202020204" pitchFamily="34" charset="0"/>
               </a:rPr>
-              <a:t>Przykład MSP, które odniosło sukces dzięki adaptacji.</a:t>
+              <a:t>Wsparcie dla MSP ze strony NGO.</a:t>
             </a:r>
           </a:p>
           <a:p>
@@ -5162,7 +5940,7 @@
     </p:spTree>
     <p:extLst>
       <p:ext uri="{BB962C8B-B14F-4D97-AF65-F5344CB8AC3E}">
-        <p14:creationId xmlns:p14="http://schemas.microsoft.com/office/powerpoint/2010/main" val="1579453048"/>
+        <p14:creationId xmlns:p14="http://schemas.microsoft.com/office/powerpoint/2010/main" val="2913440133"/>
       </p:ext>
     </p:extLst>
   </p:cSld>
@@ -5194,7 +5972,7 @@
           <p:cNvPr id="2" name="Tytuł 1">
             <a:extLst>
               <a:ext uri="{FF2B5EF4-FFF2-40B4-BE49-F238E27FC236}">
-                <a16:creationId xmlns:a16="http://schemas.microsoft.com/office/drawing/2014/main" id="{845B5555-BC53-C00A-E331-00D62AF841C4}"/>
+                <a16:creationId xmlns:a16="http://schemas.microsoft.com/office/drawing/2014/main" id="{F2EA8395-92A0-5270-979F-654F2EA6C616}"/>
               </a:ext>
             </a:extLst>
           </p:cNvPr>
@@ -5207,8 +5985,8 @@
         </p:nvSpPr>
         <p:spPr>
           <a:xfrm>
-            <a:off x="50800" y="57150"/>
-            <a:ext cx="4445000" cy="814387"/>
+            <a:off x="0" y="0"/>
+            <a:ext cx="9309100" cy="846137"/>
           </a:xfrm>
         </p:spPr>
         <p:txBody>
@@ -5222,7 +6000,7 @@
                 <a:ea typeface="Aptos" panose="020B0004020202020204" pitchFamily="34" charset="0"/>
                 <a:cs typeface="Arial" panose="020B0604020202020204" pitchFamily="34" charset="0"/>
               </a:rPr>
-              <a:t>Zakończenie</a:t>
+              <a:t>Networking i jego znaczenie</a:t>
             </a:r>
             <a:endParaRPr lang="pl-PL" dirty="0"/>
           </a:p>
@@ -5233,7 +6011,7 @@
           <p:cNvPr id="3" name="Podtytuł 2">
             <a:extLst>
               <a:ext uri="{FF2B5EF4-FFF2-40B4-BE49-F238E27FC236}">
-                <a16:creationId xmlns:a16="http://schemas.microsoft.com/office/drawing/2014/main" id="{769A5743-2E76-475E-C8F7-C18A9C503347}"/>
+                <a16:creationId xmlns:a16="http://schemas.microsoft.com/office/drawing/2014/main" id="{0267660E-D456-E413-775C-EB4BA7E582E7}"/>
               </a:ext>
             </a:extLst>
           </p:cNvPr>
@@ -5256,8 +6034,10 @@
                 <a:ea typeface="Aptos" panose="020B0004020202020204" pitchFamily="34" charset="0"/>
                 <a:cs typeface="Arial" panose="020B0604020202020204" pitchFamily="34" charset="0"/>
               </a:rPr>
-              <a:t>Podsumowanie i wnioski z prezentacji.</a:t>
-            </a:r>
+              <a:t>Rola sieci biznesowych dla MSP.</a:t>
+            </a:r>
+          </a:p>
+          <a:p>
             <a:endParaRPr lang="pl-PL" dirty="0"/>
           </a:p>
         </p:txBody>
@@ -5265,7 +6045,7 @@
     </p:spTree>
     <p:extLst>
       <p:ext uri="{BB962C8B-B14F-4D97-AF65-F5344CB8AC3E}">
-        <p14:creationId xmlns:p14="http://schemas.microsoft.com/office/powerpoint/2010/main" val="673297746"/>
+        <p14:creationId xmlns:p14="http://schemas.microsoft.com/office/powerpoint/2010/main" val="2322185524"/>
       </p:ext>
     </p:extLst>
   </p:cSld>
@@ -5297,7 +6077,7 @@
           <p:cNvPr id="2" name="Tytuł 1">
             <a:extLst>
               <a:ext uri="{FF2B5EF4-FFF2-40B4-BE49-F238E27FC236}">
-                <a16:creationId xmlns:a16="http://schemas.microsoft.com/office/drawing/2014/main" id="{76BD515B-6F73-E232-3589-AC56D3310FC0}"/>
+                <a16:creationId xmlns:a16="http://schemas.microsoft.com/office/drawing/2014/main" id="{75E4E6F7-5F11-C0AC-6AD8-E60F34C3C5C8}"/>
               </a:ext>
             </a:extLst>
           </p:cNvPr>
@@ -5310,8 +6090,8 @@
         </p:nvSpPr>
         <p:spPr>
           <a:xfrm>
-            <a:off x="12700" y="61913"/>
-            <a:ext cx="7772400" cy="808037"/>
+            <a:off x="0" y="30163"/>
+            <a:ext cx="9544050" cy="1655762"/>
           </a:xfrm>
         </p:spPr>
         <p:txBody>
@@ -5325,7 +6105,25 @@
                 <a:ea typeface="Aptos" panose="020B0004020202020204" pitchFamily="34" charset="0"/>
                 <a:cs typeface="Arial" panose="020B0604020202020204" pitchFamily="34" charset="0"/>
               </a:rPr>
-              <a:t>Pytania i odpowiedzi??</a:t>
+              <a:t>Case </a:t>
+            </a:r>
+            <a:r>
+              <a:rPr lang="pl-PL" dirty="0" err="1">
+                <a:effectLst/>
+                <a:latin typeface="Aptos" panose="020B0004020202020204" pitchFamily="34" charset="0"/>
+                <a:ea typeface="Aptos" panose="020B0004020202020204" pitchFamily="34" charset="0"/>
+                <a:cs typeface="Arial" panose="020B0604020202020204" pitchFamily="34" charset="0"/>
+              </a:rPr>
+              <a:t>study</a:t>
+            </a:r>
+            <a:r>
+              <a:rPr lang="pl-PL" dirty="0">
+                <a:effectLst/>
+                <a:latin typeface="Aptos" panose="020B0004020202020204" pitchFamily="34" charset="0"/>
+                <a:ea typeface="Aptos" panose="020B0004020202020204" pitchFamily="34" charset="0"/>
+                <a:cs typeface="Arial" panose="020B0604020202020204" pitchFamily="34" charset="0"/>
+              </a:rPr>
+              <a:t>: Przekształcenie kryzysu w sukces</a:t>
             </a:r>
             <a:endParaRPr lang="pl-PL" dirty="0"/>
           </a:p>
@@ -5336,7 +6134,7 @@
           <p:cNvPr id="3" name="Podtytuł 2">
             <a:extLst>
               <a:ext uri="{FF2B5EF4-FFF2-40B4-BE49-F238E27FC236}">
-                <a16:creationId xmlns:a16="http://schemas.microsoft.com/office/drawing/2014/main" id="{50457B9D-EC95-4084-5685-FBDCB1B04CD1}"/>
+                <a16:creationId xmlns:a16="http://schemas.microsoft.com/office/drawing/2014/main" id="{E473E86A-6E74-6CD7-D0D3-942206610D98}"/>
               </a:ext>
             </a:extLst>
           </p:cNvPr>
@@ -5359,8 +6157,10 @@
                 <a:ea typeface="Aptos" panose="020B0004020202020204" pitchFamily="34" charset="0"/>
                 <a:cs typeface="Arial" panose="020B0604020202020204" pitchFamily="34" charset="0"/>
               </a:rPr>
-              <a:t>Sesja Q&amp;A z publicznością??</a:t>
-            </a:r>
+              <a:t>Przykład MSP, które odniosło sukces dzięki adaptacji.</a:t>
+            </a:r>
+          </a:p>
+          <a:p>
             <a:endParaRPr lang="pl-PL" dirty="0"/>
           </a:p>
         </p:txBody>
@@ -5368,7 +6168,7 @@
     </p:spTree>
     <p:extLst>
       <p:ext uri="{BB962C8B-B14F-4D97-AF65-F5344CB8AC3E}">
-        <p14:creationId xmlns:p14="http://schemas.microsoft.com/office/powerpoint/2010/main" val="3547657412"/>
+        <p14:creationId xmlns:p14="http://schemas.microsoft.com/office/powerpoint/2010/main" val="1579453048"/>
       </p:ext>
     </p:extLst>
   </p:cSld>
@@ -5400,7 +6200,7 @@
           <p:cNvPr id="2" name="Tytuł 1">
             <a:extLst>
               <a:ext uri="{FF2B5EF4-FFF2-40B4-BE49-F238E27FC236}">
-                <a16:creationId xmlns:a16="http://schemas.microsoft.com/office/drawing/2014/main" id="{128EB1A6-CEAB-E223-7CB6-538FAF0FB6DD}"/>
+                <a16:creationId xmlns:a16="http://schemas.microsoft.com/office/drawing/2014/main" id="{845B5555-BC53-C00A-E331-00D62AF841C4}"/>
               </a:ext>
             </a:extLst>
           </p:cNvPr>
@@ -5413,8 +6213,8 @@
         </p:nvSpPr>
         <p:spPr>
           <a:xfrm>
-            <a:off x="57150" y="61913"/>
-            <a:ext cx="5092700" cy="788987"/>
+            <a:off x="50800" y="57150"/>
+            <a:ext cx="4445000" cy="814387"/>
           </a:xfrm>
         </p:spPr>
         <p:txBody>
@@ -5428,7 +6228,7 @@
                 <a:ea typeface="Aptos" panose="020B0004020202020204" pitchFamily="34" charset="0"/>
                 <a:cs typeface="Arial" panose="020B0604020202020204" pitchFamily="34" charset="0"/>
               </a:rPr>
-              <a:t>Podziękowania</a:t>
+              <a:t>Zakończenie</a:t>
             </a:r>
             <a:endParaRPr lang="pl-PL" dirty="0"/>
           </a:p>
@@ -5439,7 +6239,7 @@
           <p:cNvPr id="3" name="Podtytuł 2">
             <a:extLst>
               <a:ext uri="{FF2B5EF4-FFF2-40B4-BE49-F238E27FC236}">
-                <a16:creationId xmlns:a16="http://schemas.microsoft.com/office/drawing/2014/main" id="{83215E0C-1108-ED8C-7A8B-6C8803E91D1D}"/>
+                <a16:creationId xmlns:a16="http://schemas.microsoft.com/office/drawing/2014/main" id="{769A5743-2E76-475E-C8F7-C18A9C503347}"/>
               </a:ext>
             </a:extLst>
           </p:cNvPr>
@@ -5462,10 +6262,8 @@
                 <a:ea typeface="Aptos" panose="020B0004020202020204" pitchFamily="34" charset="0"/>
                 <a:cs typeface="Arial" panose="020B0604020202020204" pitchFamily="34" charset="0"/>
               </a:rPr>
-              <a:t>Podziękowanie za uwagę. + coś wesołego na koniec …?</a:t>
-            </a:r>
-          </a:p>
-          <a:p>
+              <a:t>Podsumowanie i wnioski z prezentacji.</a:t>
+            </a:r>
             <a:endParaRPr lang="pl-PL" dirty="0"/>
           </a:p>
         </p:txBody>
@@ -5473,7 +6271,7 @@
     </p:spTree>
     <p:extLst>
       <p:ext uri="{BB962C8B-B14F-4D97-AF65-F5344CB8AC3E}">
-        <p14:creationId xmlns:p14="http://schemas.microsoft.com/office/powerpoint/2010/main" val="4065885576"/>
+        <p14:creationId xmlns:p14="http://schemas.microsoft.com/office/powerpoint/2010/main" val="673297746"/>
       </p:ext>
     </p:extLst>
   </p:cSld>
@@ -5500,6 +6298,42 @@
           <a:chExt cx="0" cy="0"/>
         </a:xfrm>
       </p:grpSpPr>
+      <p:pic>
+        <p:nvPicPr>
+          <p:cNvPr id="8" name="Obraz 7" descr="Obraz zawierający tekst, zrzut ekranu, Czcionka, numer&#10;&#10;Opis wygenerowany automatycznie">
+            <a:extLst>
+              <a:ext uri="{FF2B5EF4-FFF2-40B4-BE49-F238E27FC236}">
+                <a16:creationId xmlns:a16="http://schemas.microsoft.com/office/drawing/2014/main" id="{7B262444-3C87-E3DC-7658-E1CEB99E4405}"/>
+              </a:ext>
+            </a:extLst>
+          </p:cNvPr>
+          <p:cNvPicPr>
+            <a:picLocks noChangeAspect="1"/>
+          </p:cNvPicPr>
+          <p:nvPr/>
+        </p:nvPicPr>
+        <p:blipFill>
+          <a:blip r:embed="rId3">
+            <a:extLst>
+              <a:ext uri="{28A0092B-C50C-407E-A947-70E740481C1C}">
+                <a14:useLocalDpi xmlns:a14="http://schemas.microsoft.com/office/drawing/2010/main" val="0"/>
+              </a:ext>
+            </a:extLst>
+          </a:blip>
+          <a:stretch>
+            <a:fillRect/>
+          </a:stretch>
+        </p:blipFill>
+        <p:spPr>
+          <a:xfrm>
+            <a:off x="4768921" y="4630206"/>
+            <a:ext cx="7423079" cy="2227794"/>
+          </a:xfrm>
+          <a:prstGeom prst="rect">
+            <a:avLst/>
+          </a:prstGeom>
+        </p:spPr>
+      </p:pic>
       <p:sp>
         <p:nvSpPr>
           <p:cNvPr id="2" name="Tytuł 1">
@@ -5519,7 +6353,7 @@
         <p:spPr>
           <a:xfrm>
             <a:off x="-196850" y="0"/>
-            <a:ext cx="4959350" cy="2387600"/>
+            <a:ext cx="4910893" cy="1313895"/>
           </a:xfrm>
         </p:spPr>
         <p:txBody>
@@ -5558,16 +6392,8 @@
                 <a:ea typeface="Aptos" panose="020B0004020202020204" pitchFamily="34" charset="0"/>
                 <a:cs typeface="Arial" panose="020B0604020202020204" pitchFamily="34" charset="0"/>
               </a:rPr>
-              <a:t>   </a:t>
-            </a:r>
-            <a:br>
-              <a:rPr lang="pl-PL" sz="1800" dirty="0">
-                <a:effectLst/>
-                <a:latin typeface="Aptos" panose="020B0004020202020204" pitchFamily="34" charset="0"/>
-                <a:ea typeface="Aptos" panose="020B0004020202020204" pitchFamily="34" charset="0"/>
-                <a:cs typeface="Arial" panose="020B0604020202020204" pitchFamily="34" charset="0"/>
-              </a:rPr>
-            </a:br>
+              <a:t>  </a:t>
+            </a:r>
             <a:endParaRPr lang="pl-PL" dirty="0"/>
           </a:p>
         </p:txBody>
@@ -5588,21 +6414,54 @@
             <p:ph type="subTitle" idx="1"/>
           </p:nvPr>
         </p:nvSpPr>
-        <p:spPr/>
-        <p:txBody>
-          <a:bodyPr/>
-          <a:lstStyle/>
-          <a:p>
-            <a:r>
-              <a:rPr lang="pl-PL" sz="2400" dirty="0">
-                <a:effectLst/>
-                <a:latin typeface="Aptos" panose="020B0004020202020204" pitchFamily="34" charset="0"/>
-                <a:ea typeface="Aptos" panose="020B0004020202020204" pitchFamily="34" charset="0"/>
-                <a:cs typeface="Arial" panose="020B0604020202020204" pitchFamily="34" charset="0"/>
-              </a:rPr>
-              <a:t>Definicja i kryteria klasyfikacyjne MSP w Polsce.</a:t>
-            </a:r>
-            <a:endParaRPr lang="pl-PL" dirty="0"/>
+        <p:spPr>
+          <a:xfrm>
+            <a:off x="0" y="1054146"/>
+            <a:ext cx="12192000" cy="5803854"/>
+          </a:xfrm>
+        </p:spPr>
+        <p:txBody>
+          <a:bodyPr/>
+          <a:lstStyle/>
+          <a:p>
+            <a:pPr marL="342900" indent="-342900" algn="l">
+              <a:buFont typeface="Arial" panose="020B0604020202020204" pitchFamily="34" charset="0"/>
+              <a:buChar char="•"/>
+            </a:pPr>
+            <a:r>
+              <a:rPr lang="pl-PL" dirty="0"/>
+              <a:t>MŚP - Małe Średnie Przedsiębiorstwa</a:t>
+            </a:r>
+          </a:p>
+          <a:p>
+            <a:pPr marL="342900" indent="-342900" algn="l">
+              <a:buFont typeface="Arial" panose="020B0604020202020204" pitchFamily="34" charset="0"/>
+              <a:buChar char="•"/>
+            </a:pPr>
+            <a:r>
+              <a:rPr lang="pl-PL" dirty="0"/>
+              <a:t>Przedsiębiorstwo - wyodrębniona prawnie i ekonomicznie jednostka gospodarcza. Istotą działalności przedsiębiorstwa jest produkcja dóbr lub świadczenie usług. Najczęściej definiowanym celem działalności przedsiębiorstwa jest osiąganie zysku poprzez zaspokajanie potrzeb konsumentów.</a:t>
+            </a:r>
+          </a:p>
+          <a:p>
+            <a:pPr marL="342900" indent="-342900" algn="l">
+              <a:buFont typeface="Arial" panose="020B0604020202020204" pitchFamily="34" charset="0"/>
+              <a:buChar char="•"/>
+            </a:pPr>
+            <a:r>
+              <a:rPr lang="pl-PL" dirty="0"/>
+              <a:t>Po 3 latach przekraczania progu zatrudnienia lub pułapu finansowego przedsiębiorstwo traci status MŚP.</a:t>
+            </a:r>
+          </a:p>
+          <a:p>
+            <a:pPr marL="342900" indent="-342900" algn="l">
+              <a:buFont typeface="Arial" panose="020B0604020202020204" pitchFamily="34" charset="0"/>
+              <a:buChar char="•"/>
+            </a:pPr>
+            <a:r>
+              <a:rPr lang="pl-PL" dirty="0"/>
+              <a:t>W celu zebrania danych (do tabeli poniżej) trzeba zaklasyfikować przedsiębiorstwo do jednego z: niezależne, partnerskie lub związane.</a:t>
+            </a:r>
           </a:p>
         </p:txBody>
       </p:sp>
@@ -5610,6 +6469,214 @@
     <p:extLst>
       <p:ext uri="{BB962C8B-B14F-4D97-AF65-F5344CB8AC3E}">
         <p14:creationId xmlns:p14="http://schemas.microsoft.com/office/powerpoint/2010/main" val="1038769895"/>
+      </p:ext>
+    </p:extLst>
+  </p:cSld>
+  <p:clrMapOvr>
+    <a:masterClrMapping/>
+  </p:clrMapOvr>
+</p:sld>
+</file>
+
+<file path=ppt/slides/slide40.xml><?xml version="1.0" encoding="utf-8"?>
+<p:sld xmlns:a="http://schemas.openxmlformats.org/drawingml/2006/main" xmlns:r="http://schemas.openxmlformats.org/officeDocument/2006/relationships" xmlns:p="http://schemas.openxmlformats.org/presentationml/2006/main">
+  <p:cSld>
+    <p:spTree>
+      <p:nvGrpSpPr>
+        <p:cNvPr id="1" name=""/>
+        <p:cNvGrpSpPr/>
+        <p:nvPr/>
+      </p:nvGrpSpPr>
+      <p:grpSpPr>
+        <a:xfrm>
+          <a:off x="0" y="0"/>
+          <a:ext cx="0" cy="0"/>
+          <a:chOff x="0" y="0"/>
+          <a:chExt cx="0" cy="0"/>
+        </a:xfrm>
+      </p:grpSpPr>
+      <p:sp>
+        <p:nvSpPr>
+          <p:cNvPr id="2" name="Tytuł 1">
+            <a:extLst>
+              <a:ext uri="{FF2B5EF4-FFF2-40B4-BE49-F238E27FC236}">
+                <a16:creationId xmlns:a16="http://schemas.microsoft.com/office/drawing/2014/main" id="{76BD515B-6F73-E232-3589-AC56D3310FC0}"/>
+              </a:ext>
+            </a:extLst>
+          </p:cNvPr>
+          <p:cNvSpPr>
+            <a:spLocks noGrp="1"/>
+          </p:cNvSpPr>
+          <p:nvPr>
+            <p:ph type="ctrTitle"/>
+          </p:nvPr>
+        </p:nvSpPr>
+        <p:spPr>
+          <a:xfrm>
+            <a:off x="12700" y="61913"/>
+            <a:ext cx="7772400" cy="808037"/>
+          </a:xfrm>
+        </p:spPr>
+        <p:txBody>
+          <a:bodyPr/>
+          <a:lstStyle/>
+          <a:p>
+            <a:r>
+              <a:rPr lang="pl-PL" dirty="0">
+                <a:effectLst/>
+                <a:latin typeface="Aptos" panose="020B0004020202020204" pitchFamily="34" charset="0"/>
+                <a:ea typeface="Aptos" panose="020B0004020202020204" pitchFamily="34" charset="0"/>
+                <a:cs typeface="Arial" panose="020B0604020202020204" pitchFamily="34" charset="0"/>
+              </a:rPr>
+              <a:t>Pytania i odpowiedzi??</a:t>
+            </a:r>
+            <a:endParaRPr lang="pl-PL" dirty="0"/>
+          </a:p>
+        </p:txBody>
+      </p:sp>
+      <p:sp>
+        <p:nvSpPr>
+          <p:cNvPr id="3" name="Podtytuł 2">
+            <a:extLst>
+              <a:ext uri="{FF2B5EF4-FFF2-40B4-BE49-F238E27FC236}">
+                <a16:creationId xmlns:a16="http://schemas.microsoft.com/office/drawing/2014/main" id="{50457B9D-EC95-4084-5685-FBDCB1B04CD1}"/>
+              </a:ext>
+            </a:extLst>
+          </p:cNvPr>
+          <p:cNvSpPr>
+            <a:spLocks noGrp="1"/>
+          </p:cNvSpPr>
+          <p:nvPr>
+            <p:ph type="subTitle" idx="1"/>
+          </p:nvPr>
+        </p:nvSpPr>
+        <p:spPr/>
+        <p:txBody>
+          <a:bodyPr/>
+          <a:lstStyle/>
+          <a:p>
+            <a:r>
+              <a:rPr lang="pl-PL" sz="1800" dirty="0">
+                <a:effectLst/>
+                <a:latin typeface="Aptos" panose="020B0004020202020204" pitchFamily="34" charset="0"/>
+                <a:ea typeface="Aptos" panose="020B0004020202020204" pitchFamily="34" charset="0"/>
+                <a:cs typeface="Arial" panose="020B0604020202020204" pitchFamily="34" charset="0"/>
+              </a:rPr>
+              <a:t>Sesja Q&amp;A z publicznością??</a:t>
+            </a:r>
+            <a:endParaRPr lang="pl-PL" dirty="0"/>
+          </a:p>
+        </p:txBody>
+      </p:sp>
+    </p:spTree>
+    <p:extLst>
+      <p:ext uri="{BB962C8B-B14F-4D97-AF65-F5344CB8AC3E}">
+        <p14:creationId xmlns:p14="http://schemas.microsoft.com/office/powerpoint/2010/main" val="3547657412"/>
+      </p:ext>
+    </p:extLst>
+  </p:cSld>
+  <p:clrMapOvr>
+    <a:masterClrMapping/>
+  </p:clrMapOvr>
+</p:sld>
+</file>
+
+<file path=ppt/slides/slide41.xml><?xml version="1.0" encoding="utf-8"?>
+<p:sld xmlns:a="http://schemas.openxmlformats.org/drawingml/2006/main" xmlns:r="http://schemas.openxmlformats.org/officeDocument/2006/relationships" xmlns:p="http://schemas.openxmlformats.org/presentationml/2006/main">
+  <p:cSld>
+    <p:spTree>
+      <p:nvGrpSpPr>
+        <p:cNvPr id="1" name=""/>
+        <p:cNvGrpSpPr/>
+        <p:nvPr/>
+      </p:nvGrpSpPr>
+      <p:grpSpPr>
+        <a:xfrm>
+          <a:off x="0" y="0"/>
+          <a:ext cx="0" cy="0"/>
+          <a:chOff x="0" y="0"/>
+          <a:chExt cx="0" cy="0"/>
+        </a:xfrm>
+      </p:grpSpPr>
+      <p:sp>
+        <p:nvSpPr>
+          <p:cNvPr id="2" name="Tytuł 1">
+            <a:extLst>
+              <a:ext uri="{FF2B5EF4-FFF2-40B4-BE49-F238E27FC236}">
+                <a16:creationId xmlns:a16="http://schemas.microsoft.com/office/drawing/2014/main" id="{128EB1A6-CEAB-E223-7CB6-538FAF0FB6DD}"/>
+              </a:ext>
+            </a:extLst>
+          </p:cNvPr>
+          <p:cNvSpPr>
+            <a:spLocks noGrp="1"/>
+          </p:cNvSpPr>
+          <p:nvPr>
+            <p:ph type="ctrTitle"/>
+          </p:nvPr>
+        </p:nvSpPr>
+        <p:spPr>
+          <a:xfrm>
+            <a:off x="57150" y="61913"/>
+            <a:ext cx="5092700" cy="788987"/>
+          </a:xfrm>
+        </p:spPr>
+        <p:txBody>
+          <a:bodyPr/>
+          <a:lstStyle/>
+          <a:p>
+            <a:r>
+              <a:rPr lang="pl-PL" dirty="0">
+                <a:effectLst/>
+                <a:latin typeface="Aptos" panose="020B0004020202020204" pitchFamily="34" charset="0"/>
+                <a:ea typeface="Aptos" panose="020B0004020202020204" pitchFamily="34" charset="0"/>
+                <a:cs typeface="Arial" panose="020B0604020202020204" pitchFamily="34" charset="0"/>
+              </a:rPr>
+              <a:t>Podziękowania</a:t>
+            </a:r>
+            <a:endParaRPr lang="pl-PL" dirty="0"/>
+          </a:p>
+        </p:txBody>
+      </p:sp>
+      <p:sp>
+        <p:nvSpPr>
+          <p:cNvPr id="3" name="Podtytuł 2">
+            <a:extLst>
+              <a:ext uri="{FF2B5EF4-FFF2-40B4-BE49-F238E27FC236}">
+                <a16:creationId xmlns:a16="http://schemas.microsoft.com/office/drawing/2014/main" id="{83215E0C-1108-ED8C-7A8B-6C8803E91D1D}"/>
+              </a:ext>
+            </a:extLst>
+          </p:cNvPr>
+          <p:cNvSpPr>
+            <a:spLocks noGrp="1"/>
+          </p:cNvSpPr>
+          <p:nvPr>
+            <p:ph type="subTitle" idx="1"/>
+          </p:nvPr>
+        </p:nvSpPr>
+        <p:spPr/>
+        <p:txBody>
+          <a:bodyPr/>
+          <a:lstStyle/>
+          <a:p>
+            <a:r>
+              <a:rPr lang="pl-PL" sz="1800" dirty="0">
+                <a:effectLst/>
+                <a:latin typeface="Aptos" panose="020B0004020202020204" pitchFamily="34" charset="0"/>
+                <a:ea typeface="Aptos" panose="020B0004020202020204" pitchFamily="34" charset="0"/>
+                <a:cs typeface="Arial" panose="020B0604020202020204" pitchFamily="34" charset="0"/>
+              </a:rPr>
+              <a:t>Podziękowanie za uwagę. + coś wesołego na koniec …?</a:t>
+            </a:r>
+          </a:p>
+          <a:p>
+            <a:endParaRPr lang="pl-PL" dirty="0"/>
+          </a:p>
+        </p:txBody>
+      </p:sp>
+    </p:spTree>
+    <p:extLst>
+      <p:ext uri="{BB962C8B-B14F-4D97-AF65-F5344CB8AC3E}">
+        <p14:creationId xmlns:p14="http://schemas.microsoft.com/office/powerpoint/2010/main" val="4065885576"/>
       </p:ext>
     </p:extLst>
   </p:cSld>
@@ -5655,7 +6722,7 @@
         <p:spPr>
           <a:xfrm>
             <a:off x="0" y="0"/>
-            <a:ext cx="8070850" cy="1033463"/>
+            <a:ext cx="8380520" cy="1033463"/>
           </a:xfrm>
         </p:spPr>
         <p:txBody>
@@ -5669,7 +6736,7 @@
                 <a:ea typeface="Aptos" panose="020B0004020202020204" pitchFamily="34" charset="0"/>
                 <a:cs typeface="Arial" panose="020B0604020202020204" pitchFamily="34" charset="0"/>
               </a:rPr>
-              <a:t>Statystyki MSP w Polsce</a:t>
+              <a:t>Rodzaje Przedsiębiorstw</a:t>
             </a:r>
             <a:endParaRPr lang="pl-PL" dirty="0"/>
           </a:p>
@@ -5691,22 +6758,110 @@
             <p:ph type="subTitle" idx="1"/>
           </p:nvPr>
         </p:nvSpPr>
-        <p:spPr/>
-        <p:txBody>
-          <a:bodyPr/>
-          <a:lstStyle/>
-          <a:p>
-            <a:r>
-              <a:rPr lang="pl-PL" sz="1800" dirty="0">
-                <a:effectLst/>
-                <a:latin typeface="Aptos" panose="020B0004020202020204" pitchFamily="34" charset="0"/>
-                <a:ea typeface="Aptos" panose="020B0004020202020204" pitchFamily="34" charset="0"/>
-                <a:cs typeface="Arial" panose="020B0604020202020204" pitchFamily="34" charset="0"/>
-              </a:rPr>
-              <a:t>Liczba MSP w Polsce, udział w gospodarce.</a:t>
-            </a:r>
-          </a:p>
-          <a:p>
+        <p:spPr>
+          <a:xfrm>
+            <a:off x="0" y="1033462"/>
+            <a:ext cx="12192000" cy="5824537"/>
+          </a:xfrm>
+        </p:spPr>
+        <p:txBody>
+          <a:bodyPr/>
+          <a:lstStyle/>
+          <a:p>
+            <a:pPr algn="l"/>
+            <a:r>
+              <a:rPr lang="pl-PL" sz="1400" b="1" dirty="0"/>
+              <a:t>Przedsiębiorstwo niezależne: </a:t>
+            </a:r>
+          </a:p>
+          <a:p>
+            <a:pPr algn="l"/>
+            <a:r>
+              <a:rPr lang="pl-PL" sz="1400" dirty="0"/>
+              <a:t>• przedsiębiorstwo w pełni samodzielne - nie posiada udziałów w innych przedsiębiorstwach, a inne przedsiębiorstwa nie posiadają w nim udziałów;</a:t>
+            </a:r>
+          </a:p>
+          <a:p>
+            <a:pPr algn="l"/>
+            <a:r>
+              <a:rPr lang="pl-PL" sz="1400" dirty="0"/>
+              <a:t>• posiada poniżej 25% kapitału lub głosów (w zależności, która z tych wielkości jest większa) w jednym lub kilku innych przedsiębiorstwach, a/lub inne przedsiębiorstwa posiadają poniżej 25% kapitału lub głosów (w zależności, która z tych wielkości jest większa) w tym przedsiębiorstwie </a:t>
+            </a:r>
+          </a:p>
+          <a:p>
+            <a:pPr algn="l"/>
+            <a:r>
+              <a:rPr lang="pl-PL" sz="1400" dirty="0"/>
+              <a:t>(wyjątkowo przedsiębiorstwo może zostać zakwalifikowane jako niezależne jeśli więcej niż 25% kapitału lub głosów jest w posiadaniu poniższych inwestorów: publiczne korporacje inwestycyjne, spółki kapitałowe podwyższonego ryzyka, anioły biznesu, uniwersytety, niedochodowe ośrodki badawcze, inwestorzy instytucjonalni łącznie z regionalnymi funduszami rozwoju, samorządy lokalne z rocznym budżetem nieprzekraczającym 10 milionów euro oraz liczbą mieszkańców poniżej 5000) </a:t>
+            </a:r>
+          </a:p>
+          <a:p>
+            <a:pPr algn="l"/>
+            <a:r>
+              <a:rPr lang="pl-PL" sz="1400" b="1" dirty="0"/>
+              <a:t>Przedsiębiorstwo partnerskie: </a:t>
+            </a:r>
+          </a:p>
+          <a:p>
+            <a:pPr algn="l"/>
+            <a:r>
+              <a:rPr lang="pl-PL" sz="1400" dirty="0"/>
+              <a:t>• posiada 25% lub więcej kapitału lub głosów w innym przedsiębiorstwie, a/lub inne przedsiębiorstwo posiada 25% lub więcej kapitału lub głosów w tym przedsiębiorstwie </a:t>
+            </a:r>
+          </a:p>
+          <a:p>
+            <a:pPr algn="l"/>
+            <a:r>
+              <a:rPr lang="pl-PL" sz="1400" dirty="0"/>
+              <a:t>• przedsiębiorstwo nie jest związane z innym przedsiębiorstwem (głosy jakie posiada w innym przedsiębiorstwie (lub odwrotnie), nie przekraczają 50% ogólnej sumy głosów </a:t>
+            </a:r>
+          </a:p>
+          <a:p>
+            <a:pPr algn="l"/>
+            <a:r>
+              <a:rPr lang="pl-PL" sz="1400" b="1" dirty="0"/>
+              <a:t>Przedsiębiorstwo związane </a:t>
+            </a:r>
+            <a:r>
+              <a:rPr lang="pl-PL" sz="1400" dirty="0"/>
+              <a:t>-</a:t>
+            </a:r>
+            <a:r>
+              <a:rPr lang="pl-PL" sz="1400" b="1" dirty="0"/>
+              <a:t> </a:t>
+            </a:r>
+            <a:r>
+              <a:rPr lang="pl-PL" sz="1400" dirty="0"/>
+              <a:t>Dwa lub więcej przedsiębiorstw można uznać za związane, jeżeli pozostają one ze sobą w następującym związku: </a:t>
+            </a:r>
+          </a:p>
+          <a:p>
+            <a:pPr algn="l"/>
+            <a:r>
+              <a:rPr lang="pl-PL" sz="1400" dirty="0"/>
+              <a:t>• przedsiębiorstwo posiada większość głosów przysługujących udziałowcom lub wspólnikom w innym przedsiębiorstwie, </a:t>
+            </a:r>
+          </a:p>
+          <a:p>
+            <a:pPr algn="l"/>
+            <a:r>
+              <a:rPr lang="pl-PL" sz="1400" dirty="0"/>
+              <a:t>• przedsiębiorstwo ma prawo wyznaczyć lub odwołać większość członków organu administracyjnego, zarządzającego lub nadzorczego innego przedsiębiorstwa </a:t>
+            </a:r>
+          </a:p>
+          <a:p>
+            <a:pPr algn="l"/>
+            <a:r>
+              <a:rPr lang="pl-PL" sz="1400" dirty="0"/>
+              <a:t>• przedsiębiorstwo ma prawo wywierać dominujący wpływ na inne przedsiębiorstwo zgodnie z umową zawartą z tym przedsiębiorstwem lub postanowieniem w jego dokumencie założycielskim lub statucie, </a:t>
+            </a:r>
+          </a:p>
+          <a:p>
+            <a:pPr algn="l"/>
+            <a:r>
+              <a:rPr lang="pl-PL" sz="1400" dirty="0"/>
+              <a:t>• przedsiębiorstwo jest w stanie kontrolować samodzielnie, zgodnie z umową, większość głosów udziałowców lub członków w innym przedsiębiorstwie.</a:t>
+            </a:r>
             <a:endParaRPr lang="pl-PL" dirty="0"/>
           </a:p>
         </p:txBody>
@@ -5746,7 +6901,7 @@
           <p:cNvPr id="2" name="Tytuł 1">
             <a:extLst>
               <a:ext uri="{FF2B5EF4-FFF2-40B4-BE49-F238E27FC236}">
-                <a16:creationId xmlns:a16="http://schemas.microsoft.com/office/drawing/2014/main" id="{D5CE57D2-455B-7BC4-A8CE-5307563F9406}"/>
+                <a16:creationId xmlns:a16="http://schemas.microsoft.com/office/drawing/2014/main" id="{7847919A-6E05-A02A-7B18-7335BE2F73DC}"/>
               </a:ext>
             </a:extLst>
           </p:cNvPr>
@@ -5760,7 +6915,7 @@
         <p:spPr>
           <a:xfrm>
             <a:off x="0" y="0"/>
-            <a:ext cx="7073900" cy="1608137"/>
+            <a:ext cx="8070850" cy="1033463"/>
           </a:xfrm>
         </p:spPr>
         <p:txBody>
@@ -5774,7 +6929,7 @@
                 <a:ea typeface="Aptos" panose="020B0004020202020204" pitchFamily="34" charset="0"/>
                 <a:cs typeface="Arial" panose="020B0604020202020204" pitchFamily="34" charset="0"/>
               </a:rPr>
-              <a:t>Porównanie z innymi krajami</a:t>
+              <a:t>Statystyki MSP w Polsce</a:t>
             </a:r>
             <a:endParaRPr lang="pl-PL" dirty="0"/>
           </a:p>
@@ -5785,7 +6940,7 @@
           <p:cNvPr id="3" name="Podtytuł 2">
             <a:extLst>
               <a:ext uri="{FF2B5EF4-FFF2-40B4-BE49-F238E27FC236}">
-                <a16:creationId xmlns:a16="http://schemas.microsoft.com/office/drawing/2014/main" id="{214F2C13-30D5-5131-7153-59AD41C41762}"/>
+                <a16:creationId xmlns:a16="http://schemas.microsoft.com/office/drawing/2014/main" id="{9A3F49A4-9AD5-CFBF-37CC-FFED197C67AA}"/>
               </a:ext>
             </a:extLst>
           </p:cNvPr>
@@ -5796,28 +6951,68 @@
             <p:ph type="subTitle" idx="1"/>
           </p:nvPr>
         </p:nvSpPr>
-        <p:spPr/>
-        <p:txBody>
-          <a:bodyPr/>
-          <a:lstStyle/>
-          <a:p>
+        <p:spPr>
+          <a:xfrm>
+            <a:off x="-1" y="1033463"/>
+            <a:ext cx="6533965" cy="1230343"/>
+          </a:xfrm>
+        </p:spPr>
+        <p:txBody>
+          <a:bodyPr/>
+          <a:lstStyle/>
+          <a:p>
+            <a:pPr algn="l"/>
             <a:r>
               <a:rPr lang="pl-PL" sz="1800" dirty="0">
                 <a:effectLst/>
-                <a:latin typeface="Aptos" panose="020B0004020202020204" pitchFamily="34" charset="0"/>
-                <a:ea typeface="Aptos" panose="020B0004020202020204" pitchFamily="34" charset="0"/>
-                <a:cs typeface="Arial" panose="020B0604020202020204" pitchFamily="34" charset="0"/>
-              </a:rPr>
-              <a:t>Porównanie roli MSP w Polsce do innych krajów UE.</a:t>
-            </a:r>
-            <a:endParaRPr lang="pl-PL" dirty="0"/>
-          </a:p>
-        </p:txBody>
-      </p:sp>
+                <a:ea typeface="Aptos" panose="020B0004020202020204" pitchFamily="34" charset="0"/>
+                <a:cs typeface="Arial" panose="020B0604020202020204" pitchFamily="34" charset="0"/>
+              </a:rPr>
+              <a:t>Według raportu PARP o stanie sektora małych i średnich przedsiębiorstw w Polsce z roku 2023:</a:t>
+            </a:r>
+          </a:p>
+          <a:p>
+            <a:pPr algn="l"/>
+            <a:r>
+              <a:rPr lang="pl-PL" sz="1800" dirty="0"/>
+              <a:t>PARP - Polska Agencja Rozwoju Przedsiębiorczości</a:t>
+            </a:r>
+          </a:p>
+        </p:txBody>
+      </p:sp>
+      <p:pic>
+        <p:nvPicPr>
+          <p:cNvPr id="5" name="Obraz 4">
+            <a:extLst>
+              <a:ext uri="{FF2B5EF4-FFF2-40B4-BE49-F238E27FC236}">
+                <a16:creationId xmlns:a16="http://schemas.microsoft.com/office/drawing/2014/main" id="{A851D531-4409-E8F4-1CBC-4B56D7E78BE2}"/>
+              </a:ext>
+            </a:extLst>
+          </p:cNvPr>
+          <p:cNvPicPr>
+            <a:picLocks noChangeAspect="1"/>
+          </p:cNvPicPr>
+          <p:nvPr/>
+        </p:nvPicPr>
+        <p:blipFill rotWithShape="1">
+          <a:blip r:embed="rId3"/>
+          <a:srcRect l="41505" t="19417" r="26675" b="7702"/>
+          <a:stretch/>
+        </p:blipFill>
+        <p:spPr>
+          <a:xfrm>
+            <a:off x="7519386" y="965370"/>
+            <a:ext cx="4672614" cy="6019867"/>
+          </a:xfrm>
+          <a:prstGeom prst="rect">
+            <a:avLst/>
+          </a:prstGeom>
+        </p:spPr>
+      </p:pic>
     </p:spTree>
     <p:extLst>
       <p:ext uri="{BB962C8B-B14F-4D97-AF65-F5344CB8AC3E}">
-        <p14:creationId xmlns:p14="http://schemas.microsoft.com/office/powerpoint/2010/main" val="3969808236"/>
+        <p14:creationId xmlns:p14="http://schemas.microsoft.com/office/powerpoint/2010/main" val="3450221812"/>
       </p:ext>
     </p:extLst>
   </p:cSld>
@@ -5849,7 +7044,7 @@
           <p:cNvPr id="2" name="Tytuł 1">
             <a:extLst>
               <a:ext uri="{FF2B5EF4-FFF2-40B4-BE49-F238E27FC236}">
-                <a16:creationId xmlns:a16="http://schemas.microsoft.com/office/drawing/2014/main" id="{5ED4B06E-C6C0-1BE6-2A96-45DFBDE17A31}"/>
+                <a16:creationId xmlns:a16="http://schemas.microsoft.com/office/drawing/2014/main" id="{D5CE57D2-455B-7BC4-A8CE-5307563F9406}"/>
               </a:ext>
             </a:extLst>
           </p:cNvPr>
@@ -5862,8 +7057,8 @@
         </p:nvSpPr>
         <p:spPr>
           <a:xfrm>
-            <a:off x="0" y="0"/>
-            <a:ext cx="7162800" cy="1655762"/>
+            <a:off x="-2" y="0"/>
+            <a:ext cx="9907481" cy="964961"/>
           </a:xfrm>
         </p:spPr>
         <p:txBody>
@@ -5871,67 +7066,158 @@
           <a:lstStyle/>
           <a:p>
             <a:r>
+              <a:rPr lang="pl-PL" dirty="0">
+                <a:effectLst/>
+                <a:latin typeface="Aptos" panose="020B0004020202020204" pitchFamily="34" charset="0"/>
+                <a:ea typeface="Aptos" panose="020B0004020202020204" pitchFamily="34" charset="0"/>
+                <a:cs typeface="Arial" panose="020B0604020202020204" pitchFamily="34" charset="0"/>
+              </a:rPr>
+              <a:t>Porównanie z innymi krajami</a:t>
+            </a:r>
+            <a:endParaRPr lang="pl-PL" dirty="0"/>
+          </a:p>
+        </p:txBody>
+      </p:sp>
+      <p:pic>
+        <p:nvPicPr>
+          <p:cNvPr id="7" name="Obraz 6">
+            <a:extLst>
+              <a:ext uri="{FF2B5EF4-FFF2-40B4-BE49-F238E27FC236}">
+                <a16:creationId xmlns:a16="http://schemas.microsoft.com/office/drawing/2014/main" id="{985FC4F8-23ED-3C78-B430-0B90A0739F5C}"/>
+              </a:ext>
+            </a:extLst>
+          </p:cNvPr>
+          <p:cNvPicPr>
+            <a:picLocks noChangeAspect="1"/>
+          </p:cNvPicPr>
+          <p:nvPr/>
+        </p:nvPicPr>
+        <p:blipFill rotWithShape="1">
+          <a:blip r:embed="rId3"/>
+          <a:srcRect l="41359" t="26279" r="27258" b="18317"/>
+          <a:stretch/>
+        </p:blipFill>
+        <p:spPr>
+          <a:xfrm>
+            <a:off x="7229382" y="964961"/>
+            <a:ext cx="4962618" cy="4928077"/>
+          </a:xfrm>
+          <a:prstGeom prst="rect">
+            <a:avLst/>
+          </a:prstGeom>
+        </p:spPr>
+      </p:pic>
+      <p:sp>
+        <p:nvSpPr>
+          <p:cNvPr id="8" name="Podtytuł 2">
+            <a:extLst>
+              <a:ext uri="{FF2B5EF4-FFF2-40B4-BE49-F238E27FC236}">
+                <a16:creationId xmlns:a16="http://schemas.microsoft.com/office/drawing/2014/main" id="{21D19807-1971-6AEA-5315-F0563FDD1A21}"/>
+              </a:ext>
+            </a:extLst>
+          </p:cNvPr>
+          <p:cNvSpPr>
+            <a:spLocks noGrp="1"/>
+          </p:cNvSpPr>
+          <p:nvPr>
+            <p:ph type="subTitle" idx="1"/>
+          </p:nvPr>
+        </p:nvSpPr>
+        <p:spPr>
+          <a:xfrm>
+            <a:off x="-1" y="1033463"/>
+            <a:ext cx="6533965" cy="5824537"/>
+          </a:xfrm>
+        </p:spPr>
+        <p:txBody>
+          <a:bodyPr/>
+          <a:lstStyle/>
+          <a:p>
+            <a:pPr algn="l"/>
+            <a:r>
               <a:rPr lang="pl-PL" sz="1800" dirty="0">
                 <a:effectLst/>
-                <a:latin typeface="Aptos" panose="020B0004020202020204" pitchFamily="34" charset="0"/>
-                <a:ea typeface="Aptos" panose="020B0004020202020204" pitchFamily="34" charset="0"/>
-                <a:cs typeface="Arial" panose="020B0604020202020204" pitchFamily="34" charset="0"/>
-              </a:rPr>
-              <a:t> </a:t>
-            </a:r>
-            <a:r>
-              <a:rPr lang="pl-PL" dirty="0">
-                <a:effectLst/>
-                <a:latin typeface="Aptos" panose="020B0004020202020204" pitchFamily="34" charset="0"/>
-                <a:ea typeface="Aptos" panose="020B0004020202020204" pitchFamily="34" charset="0"/>
-                <a:cs typeface="Arial" panose="020B0604020202020204" pitchFamily="34" charset="0"/>
-              </a:rPr>
-              <a:t>Sektorowe rozmieszczenie MSP</a:t>
-            </a:r>
-            <a:endParaRPr lang="pl-PL" dirty="0"/>
-          </a:p>
-        </p:txBody>
-      </p:sp>
-      <p:sp>
-        <p:nvSpPr>
-          <p:cNvPr id="3" name="Podtytuł 2">
-            <a:extLst>
-              <a:ext uri="{FF2B5EF4-FFF2-40B4-BE49-F238E27FC236}">
-                <a16:creationId xmlns:a16="http://schemas.microsoft.com/office/drawing/2014/main" id="{B4081AC7-A0AB-888A-E05C-7ECA761AF4F1}"/>
-              </a:ext>
-            </a:extLst>
-          </p:cNvPr>
-          <p:cNvSpPr>
-            <a:spLocks noGrp="1"/>
-          </p:cNvSpPr>
-          <p:nvPr>
-            <p:ph type="subTitle" idx="1"/>
-          </p:nvPr>
-        </p:nvSpPr>
-        <p:spPr/>
-        <p:txBody>
-          <a:bodyPr/>
-          <a:lstStyle/>
-          <a:p>
+                <a:ea typeface="Aptos" panose="020B0004020202020204" pitchFamily="34" charset="0"/>
+                <a:cs typeface="Arial" panose="020B0604020202020204" pitchFamily="34" charset="0"/>
+              </a:rPr>
+              <a:t>Polska jest 5-tym krajem w UE z najwyższą liczbą przedsiębiorstw po: </a:t>
+            </a:r>
+          </a:p>
+          <a:p>
+            <a:pPr marL="285750" indent="-285750" algn="l">
+              <a:buFont typeface="Arial" panose="020B0604020202020204" pitchFamily="34" charset="0"/>
+              <a:buChar char="•"/>
+            </a:pPr>
             <a:r>
               <a:rPr lang="pl-PL" sz="1800" dirty="0">
                 <a:effectLst/>
-                <a:latin typeface="Aptos" panose="020B0004020202020204" pitchFamily="34" charset="0"/>
-                <a:ea typeface="Aptos" panose="020B0004020202020204" pitchFamily="34" charset="0"/>
-                <a:cs typeface="Arial" panose="020B0604020202020204" pitchFamily="34" charset="0"/>
-              </a:rPr>
-              <a:t>Przegląd branż, w których MSP są najbardziej aktywne.</a:t>
-            </a:r>
-          </a:p>
-          <a:p>
-            <a:endParaRPr lang="pl-PL" dirty="0"/>
+                <a:ea typeface="Aptos" panose="020B0004020202020204" pitchFamily="34" charset="0"/>
+                <a:cs typeface="Arial" panose="020B0604020202020204" pitchFamily="34" charset="0"/>
+              </a:rPr>
+              <a:t>Włoszech 3,64 mln, </a:t>
+            </a:r>
+          </a:p>
+          <a:p>
+            <a:pPr marL="285750" indent="-285750" algn="l">
+              <a:buFont typeface="Arial" panose="020B0604020202020204" pitchFamily="34" charset="0"/>
+              <a:buChar char="•"/>
+            </a:pPr>
+            <a:r>
+              <a:rPr lang="pl-PL" sz="1800" dirty="0">
+                <a:effectLst/>
+                <a:ea typeface="Aptos" panose="020B0004020202020204" pitchFamily="34" charset="0"/>
+                <a:cs typeface="Arial" panose="020B0604020202020204" pitchFamily="34" charset="0"/>
+              </a:rPr>
+              <a:t>Francji 3,08 mln, </a:t>
+            </a:r>
+          </a:p>
+          <a:p>
+            <a:pPr marL="285750" indent="-285750" algn="l">
+              <a:buFont typeface="Arial" panose="020B0604020202020204" pitchFamily="34" charset="0"/>
+              <a:buChar char="•"/>
+            </a:pPr>
+            <a:r>
+              <a:rPr lang="pl-PL" sz="1800" dirty="0">
+                <a:effectLst/>
+                <a:ea typeface="Aptos" panose="020B0004020202020204" pitchFamily="34" charset="0"/>
+                <a:cs typeface="Arial" panose="020B0604020202020204" pitchFamily="34" charset="0"/>
+              </a:rPr>
+              <a:t>Hiszpanii 2,68 mln, </a:t>
+            </a:r>
+          </a:p>
+          <a:p>
+            <a:pPr marL="285750" indent="-285750" algn="l">
+              <a:buFont typeface="Arial" panose="020B0604020202020204" pitchFamily="34" charset="0"/>
+              <a:buChar char="•"/>
+            </a:pPr>
+            <a:r>
+              <a:rPr lang="pl-PL" sz="1800" dirty="0">
+                <a:effectLst/>
+                <a:ea typeface="Aptos" panose="020B0004020202020204" pitchFamily="34" charset="0"/>
+                <a:cs typeface="Arial" panose="020B0604020202020204" pitchFamily="34" charset="0"/>
+              </a:rPr>
+              <a:t>Niemczech 2,49 mln</a:t>
+            </a:r>
+          </a:p>
+          <a:p>
+            <a:pPr algn="l"/>
+            <a:endParaRPr lang="pl-PL" sz="1800" dirty="0">
+              <a:cs typeface="Arial" panose="020B0604020202020204" pitchFamily="34" charset="0"/>
+            </a:endParaRPr>
+          </a:p>
+          <a:p>
+            <a:pPr algn="l"/>
+            <a:r>
+              <a:rPr lang="pl-PL" sz="1800" dirty="0"/>
+              <a:t>Najwyższą wartość produkcji dodanej w UE mają Niemcy 1,82 mld EUR, najniższą – Malta 6,8 mld EUR.</a:t>
+            </a:r>
           </a:p>
         </p:txBody>
       </p:sp>
     </p:spTree>
     <p:extLst>
       <p:ext uri="{BB962C8B-B14F-4D97-AF65-F5344CB8AC3E}">
-        <p14:creationId xmlns:p14="http://schemas.microsoft.com/office/powerpoint/2010/main" val="4101707361"/>
+        <p14:creationId xmlns:p14="http://schemas.microsoft.com/office/powerpoint/2010/main" val="3969808236"/>
       </p:ext>
     </p:extLst>
   </p:cSld>
@@ -5963,7 +7249,7 @@
           <p:cNvPr id="2" name="Tytuł 1">
             <a:extLst>
               <a:ext uri="{FF2B5EF4-FFF2-40B4-BE49-F238E27FC236}">
-                <a16:creationId xmlns:a16="http://schemas.microsoft.com/office/drawing/2014/main" id="{BAB67E54-BB9E-A0AA-5DE2-4E193C126B98}"/>
+                <a16:creationId xmlns:a16="http://schemas.microsoft.com/office/drawing/2014/main" id="{D5CE57D2-455B-7BC4-A8CE-5307563F9406}"/>
               </a:ext>
             </a:extLst>
           </p:cNvPr>
@@ -5976,8 +7262,8 @@
         </p:nvSpPr>
         <p:spPr>
           <a:xfrm>
-            <a:off x="0" y="0"/>
-            <a:ext cx="8426450" cy="1655762"/>
+            <a:off x="-2" y="0"/>
+            <a:ext cx="9907481" cy="964961"/>
           </a:xfrm>
         </p:spPr>
         <p:txBody>
@@ -5991,7 +7277,7 @@
                 <a:ea typeface="Aptos" panose="020B0004020202020204" pitchFamily="34" charset="0"/>
                 <a:cs typeface="Arial" panose="020B0604020202020204" pitchFamily="34" charset="0"/>
               </a:rPr>
-              <a:t>Znaczenie MSP dla rynku pracy</a:t>
+              <a:t>Porównanie z innymi krajami</a:t>
             </a:r>
             <a:endParaRPr lang="pl-PL" dirty="0"/>
           </a:p>
@@ -5999,10 +7285,10 @@
       </p:sp>
       <p:sp>
         <p:nvSpPr>
-          <p:cNvPr id="3" name="Podtytuł 2">
-            <a:extLst>
-              <a:ext uri="{FF2B5EF4-FFF2-40B4-BE49-F238E27FC236}">
-                <a16:creationId xmlns:a16="http://schemas.microsoft.com/office/drawing/2014/main" id="{CF1D6111-8DA6-7059-9817-B31D4C66DE6C}"/>
+          <p:cNvPr id="8" name="Podtytuł 2">
+            <a:extLst>
+              <a:ext uri="{FF2B5EF4-FFF2-40B4-BE49-F238E27FC236}">
+                <a16:creationId xmlns:a16="http://schemas.microsoft.com/office/drawing/2014/main" id="{21D19807-1971-6AEA-5315-F0563FDD1A21}"/>
               </a:ext>
             </a:extLst>
           </p:cNvPr>
@@ -6013,30 +7299,234 @@
             <p:ph type="subTitle" idx="1"/>
           </p:nvPr>
         </p:nvSpPr>
-        <p:spPr/>
-        <p:txBody>
-          <a:bodyPr/>
-          <a:lstStyle/>
-          <a:p>
+        <p:spPr>
+          <a:xfrm>
+            <a:off x="0" y="1033463"/>
+            <a:ext cx="6161104" cy="5824537"/>
+          </a:xfrm>
+        </p:spPr>
+        <p:txBody>
+          <a:bodyPr/>
+          <a:lstStyle/>
+          <a:p>
+            <a:pPr algn="l"/>
             <a:r>
               <a:rPr lang="pl-PL" sz="1800" dirty="0">
                 <a:effectLst/>
-                <a:latin typeface="Aptos" panose="020B0004020202020204" pitchFamily="34" charset="0"/>
-                <a:ea typeface="Aptos" panose="020B0004020202020204" pitchFamily="34" charset="0"/>
-                <a:cs typeface="Arial" panose="020B0604020202020204" pitchFamily="34" charset="0"/>
-              </a:rPr>
-              <a:t>Udział MSP w tworzeniu miejsc pracy.</a:t>
-            </a:r>
-          </a:p>
-          <a:p>
-            <a:endParaRPr lang="pl-PL" dirty="0"/>
-          </a:p>
-        </p:txBody>
-      </p:sp>
+                <a:ea typeface="Aptos" panose="020B0004020202020204" pitchFamily="34" charset="0"/>
+                <a:cs typeface="Arial" panose="020B0604020202020204" pitchFamily="34" charset="0"/>
+              </a:rPr>
+              <a:t>BERD - </a:t>
+            </a:r>
+            <a:r>
+              <a:rPr lang="en-US" sz="1800" dirty="0">
+                <a:effectLst/>
+                <a:ea typeface="Aptos" panose="020B0004020202020204" pitchFamily="34" charset="0"/>
+                <a:cs typeface="Arial" panose="020B0604020202020204" pitchFamily="34" charset="0"/>
+              </a:rPr>
+              <a:t>Business </a:t>
+            </a:r>
+            <a:r>
+              <a:rPr lang="pl-PL" sz="1800" dirty="0">
+                <a:effectLst/>
+                <a:ea typeface="Aptos" panose="020B0004020202020204" pitchFamily="34" charset="0"/>
+                <a:cs typeface="Arial" panose="020B0604020202020204" pitchFamily="34" charset="0"/>
+              </a:rPr>
+              <a:t>E</a:t>
+            </a:r>
+            <a:r>
+              <a:rPr lang="en-US" sz="1800" dirty="0" err="1">
+                <a:effectLst/>
+                <a:ea typeface="Aptos" panose="020B0004020202020204" pitchFamily="34" charset="0"/>
+                <a:cs typeface="Arial" panose="020B0604020202020204" pitchFamily="34" charset="0"/>
+              </a:rPr>
+              <a:t>nterprise</a:t>
+            </a:r>
+            <a:r>
+              <a:rPr lang="en-US" sz="1800" dirty="0">
+                <a:effectLst/>
+                <a:ea typeface="Aptos" panose="020B0004020202020204" pitchFamily="34" charset="0"/>
+                <a:cs typeface="Arial" panose="020B0604020202020204" pitchFamily="34" charset="0"/>
+              </a:rPr>
+              <a:t> expenditure on R&amp;D</a:t>
+            </a:r>
+            <a:endParaRPr lang="pl-PL" sz="1800" dirty="0">
+              <a:effectLst/>
+              <a:ea typeface="Aptos" panose="020B0004020202020204" pitchFamily="34" charset="0"/>
+              <a:cs typeface="Arial" panose="020B0604020202020204" pitchFamily="34" charset="0"/>
+            </a:endParaRPr>
+          </a:p>
+          <a:p>
+            <a:pPr algn="l"/>
+            <a:r>
+              <a:rPr lang="pl-PL" sz="1800" dirty="0">
+                <a:cs typeface="Arial" panose="020B0604020202020204" pitchFamily="34" charset="0"/>
+              </a:rPr>
+              <a:t>R&amp;D – </a:t>
+            </a:r>
+            <a:r>
+              <a:rPr lang="pl-PL" sz="1800" dirty="0" err="1">
+                <a:cs typeface="Arial" panose="020B0604020202020204" pitchFamily="34" charset="0"/>
+              </a:rPr>
+              <a:t>Research</a:t>
+            </a:r>
+            <a:r>
+              <a:rPr lang="pl-PL" sz="1800" dirty="0">
+                <a:cs typeface="Arial" panose="020B0604020202020204" pitchFamily="34" charset="0"/>
+              </a:rPr>
+              <a:t> and </a:t>
+            </a:r>
+            <a:r>
+              <a:rPr lang="pl-PL" sz="1800" dirty="0" err="1">
+                <a:cs typeface="Arial" panose="020B0604020202020204" pitchFamily="34" charset="0"/>
+              </a:rPr>
+              <a:t>Developement</a:t>
+            </a:r>
+            <a:r>
+              <a:rPr lang="pl-PL" sz="1800" dirty="0">
+                <a:cs typeface="Arial" panose="020B0604020202020204" pitchFamily="34" charset="0"/>
+              </a:rPr>
+              <a:t> </a:t>
+            </a:r>
+          </a:p>
+          <a:p>
+            <a:pPr algn="l"/>
+            <a:r>
+              <a:rPr lang="pl-PL" sz="1800">
+                <a:cs typeface="Arial" panose="020B0604020202020204" pitchFamily="34" charset="0"/>
+              </a:rPr>
+              <a:t>ICT - Information </a:t>
+            </a:r>
+            <a:r>
+              <a:rPr lang="pl-PL" sz="1800" dirty="0">
+                <a:cs typeface="Arial" panose="020B0604020202020204" pitchFamily="34" charset="0"/>
+              </a:rPr>
+              <a:t>and </a:t>
+            </a:r>
+            <a:r>
+              <a:rPr lang="pl-PL" sz="1800">
+                <a:cs typeface="Arial" panose="020B0604020202020204" pitchFamily="34" charset="0"/>
+              </a:rPr>
+              <a:t>Communications Technology</a:t>
+            </a:r>
+            <a:endParaRPr lang="pl-PL" sz="1800" dirty="0">
+              <a:cs typeface="Arial" panose="020B0604020202020204" pitchFamily="34" charset="0"/>
+            </a:endParaRPr>
+          </a:p>
+          <a:p>
+            <a:pPr algn="l"/>
+            <a:endParaRPr lang="pl-PL" sz="1800" dirty="0">
+              <a:cs typeface="Arial" panose="020B0604020202020204" pitchFamily="34" charset="0"/>
+            </a:endParaRPr>
+          </a:p>
+          <a:p>
+            <a:pPr algn="l"/>
+            <a:r>
+              <a:rPr lang="pl-PL" sz="1800" dirty="0">
+                <a:cs typeface="Arial" panose="020B0604020202020204" pitchFamily="34" charset="0"/>
+              </a:rPr>
+              <a:t> Kraje UE z najwyższym udziałem BERD w PKB i jednocześnie większym niż 2% to: </a:t>
+            </a:r>
+          </a:p>
+          <a:p>
+            <a:pPr marL="285750" indent="-285750" algn="l">
+              <a:buFont typeface="Arial" panose="020B0604020202020204" pitchFamily="34" charset="0"/>
+              <a:buChar char="•"/>
+            </a:pPr>
+            <a:r>
+              <a:rPr lang="pl-PL" sz="1800" dirty="0">
+                <a:cs typeface="Arial" panose="020B0604020202020204" pitchFamily="34" charset="0"/>
+              </a:rPr>
+              <a:t>Belgia 2,42%, </a:t>
+            </a:r>
+          </a:p>
+          <a:p>
+            <a:pPr marL="285750" indent="-285750" algn="l">
+              <a:buFont typeface="Arial" panose="020B0604020202020204" pitchFamily="34" charset="0"/>
+              <a:buChar char="•"/>
+            </a:pPr>
+            <a:r>
+              <a:rPr lang="pl-PL" sz="1800" dirty="0">
+                <a:cs typeface="Arial" panose="020B0604020202020204" pitchFamily="34" charset="0"/>
+              </a:rPr>
+              <a:t>Szwecja 2,41%, </a:t>
+            </a:r>
+          </a:p>
+          <a:p>
+            <a:pPr marL="285750" indent="-285750" algn="l">
+              <a:buFont typeface="Arial" panose="020B0604020202020204" pitchFamily="34" charset="0"/>
+              <a:buChar char="•"/>
+            </a:pPr>
+            <a:r>
+              <a:rPr lang="pl-PL" sz="1800" dirty="0">
+                <a:cs typeface="Arial" panose="020B0604020202020204" pitchFamily="34" charset="0"/>
+              </a:rPr>
+              <a:t>Austria 2,22%, </a:t>
+            </a:r>
+          </a:p>
+          <a:p>
+            <a:pPr marL="285750" indent="-285750" algn="l">
+              <a:buFont typeface="Arial" panose="020B0604020202020204" pitchFamily="34" charset="0"/>
+              <a:buChar char="•"/>
+            </a:pPr>
+            <a:r>
+              <a:rPr lang="pl-PL" sz="1800" dirty="0">
+                <a:cs typeface="Arial" panose="020B0604020202020204" pitchFamily="34" charset="0"/>
+              </a:rPr>
+              <a:t>Niemcy 2,09%,</a:t>
+            </a:r>
+          </a:p>
+          <a:p>
+            <a:pPr marL="285750" indent="-285750" algn="l">
+              <a:buFont typeface="Arial" panose="020B0604020202020204" pitchFamily="34" charset="0"/>
+              <a:buChar char="•"/>
+            </a:pPr>
+            <a:r>
+              <a:rPr lang="pl-PL" sz="1800" dirty="0">
+                <a:cs typeface="Arial" panose="020B0604020202020204" pitchFamily="34" charset="0"/>
+              </a:rPr>
+              <a:t>Finlandia 2,06%.</a:t>
+            </a:r>
+          </a:p>
+          <a:p>
+            <a:pPr algn="l"/>
+            <a:endParaRPr lang="pl-PL" sz="1800" dirty="0"/>
+          </a:p>
+        </p:txBody>
+      </p:sp>
+      <p:pic>
+        <p:nvPicPr>
+          <p:cNvPr id="10" name="Obraz 9">
+            <a:extLst>
+              <a:ext uri="{FF2B5EF4-FFF2-40B4-BE49-F238E27FC236}">
+                <a16:creationId xmlns:a16="http://schemas.microsoft.com/office/drawing/2014/main" id="{301E7CFA-5949-142D-7016-08881EC34EC2}"/>
+              </a:ext>
+            </a:extLst>
+          </p:cNvPr>
+          <p:cNvPicPr>
+            <a:picLocks noChangeAspect="1"/>
+          </p:cNvPicPr>
+          <p:nvPr/>
+        </p:nvPicPr>
+        <p:blipFill rotWithShape="1">
+          <a:blip r:embed="rId3"/>
+          <a:srcRect l="41505" t="24207" r="27257" b="29709"/>
+          <a:stretch/>
+        </p:blipFill>
+        <p:spPr>
+          <a:xfrm>
+            <a:off x="6253392" y="1033463"/>
+            <a:ext cx="5938608" cy="4928077"/>
+          </a:xfrm>
+          <a:prstGeom prst="rect">
+            <a:avLst/>
+          </a:prstGeom>
+        </p:spPr>
+      </p:pic>
     </p:spTree>
     <p:extLst>
       <p:ext uri="{BB962C8B-B14F-4D97-AF65-F5344CB8AC3E}">
-        <p14:creationId xmlns:p14="http://schemas.microsoft.com/office/powerpoint/2010/main" val="3318273911"/>
+        <p14:creationId xmlns:p14="http://schemas.microsoft.com/office/powerpoint/2010/main" val="74287591"/>
       </p:ext>
     </p:extLst>
   </p:cSld>
@@ -6068,7 +7558,7 @@
           <p:cNvPr id="2" name="Tytuł 1">
             <a:extLst>
               <a:ext uri="{FF2B5EF4-FFF2-40B4-BE49-F238E27FC236}">
-                <a16:creationId xmlns:a16="http://schemas.microsoft.com/office/drawing/2014/main" id="{FF3927BD-F6AC-6437-AF66-B488ACCFE5FF}"/>
+                <a16:creationId xmlns:a16="http://schemas.microsoft.com/office/drawing/2014/main" id="{5ED4B06E-C6C0-1BE6-2A96-45DFBDE17A31}"/>
               </a:ext>
             </a:extLst>
           </p:cNvPr>
@@ -6082,7 +7572,7 @@
         <p:spPr>
           <a:xfrm>
             <a:off x="0" y="0"/>
-            <a:ext cx="4572000" cy="966787"/>
+            <a:ext cx="7162800" cy="1655762"/>
           </a:xfrm>
         </p:spPr>
         <p:txBody>
@@ -6090,13 +7580,22 @@
           <a:lstStyle/>
           <a:p>
             <a:r>
+              <a:rPr lang="pl-PL" sz="1800" dirty="0">
+                <a:effectLst/>
+                <a:latin typeface="Aptos" panose="020B0004020202020204" pitchFamily="34" charset="0"/>
+                <a:ea typeface="Aptos" panose="020B0004020202020204" pitchFamily="34" charset="0"/>
+                <a:cs typeface="Arial" panose="020B0604020202020204" pitchFamily="34" charset="0"/>
+              </a:rPr>
+              <a:t> </a:t>
+            </a:r>
+            <a:r>
               <a:rPr lang="pl-PL" dirty="0">
                 <a:effectLst/>
                 <a:latin typeface="Aptos" panose="020B0004020202020204" pitchFamily="34" charset="0"/>
                 <a:ea typeface="Aptos" panose="020B0004020202020204" pitchFamily="34" charset="0"/>
                 <a:cs typeface="Arial" panose="020B0604020202020204" pitchFamily="34" charset="0"/>
               </a:rPr>
-              <a:t>Wkład w PKB</a:t>
+              <a:t>Sektorowe rozmieszczenie MSP</a:t>
             </a:r>
             <a:endParaRPr lang="pl-PL" dirty="0"/>
           </a:p>
@@ -6107,7 +7606,7 @@
           <p:cNvPr id="3" name="Podtytuł 2">
             <a:extLst>
               <a:ext uri="{FF2B5EF4-FFF2-40B4-BE49-F238E27FC236}">
-                <a16:creationId xmlns:a16="http://schemas.microsoft.com/office/drawing/2014/main" id="{74F40F42-DB84-9D9C-4F28-635C23E5FEF3}"/>
+                <a16:creationId xmlns:a16="http://schemas.microsoft.com/office/drawing/2014/main" id="{B4081AC7-A0AB-888A-E05C-7ECA761AF4F1}"/>
               </a:ext>
             </a:extLst>
           </p:cNvPr>
@@ -6130,8 +7629,10 @@
                 <a:ea typeface="Aptos" panose="020B0004020202020204" pitchFamily="34" charset="0"/>
                 <a:cs typeface="Arial" panose="020B0604020202020204" pitchFamily="34" charset="0"/>
               </a:rPr>
-              <a:t>Procentowy udział MSP w PKB Polski.</a:t>
-            </a:r>
+              <a:t>Przegląd branż, w których MSP są najbardziej aktywne.</a:t>
+            </a:r>
+          </a:p>
+          <a:p>
             <a:endParaRPr lang="pl-PL" dirty="0"/>
           </a:p>
         </p:txBody>
@@ -6139,7 +7640,7 @@
     </p:spTree>
     <p:extLst>
       <p:ext uri="{BB962C8B-B14F-4D97-AF65-F5344CB8AC3E}">
-        <p14:creationId xmlns:p14="http://schemas.microsoft.com/office/powerpoint/2010/main" val="3353865456"/>
+        <p14:creationId xmlns:p14="http://schemas.microsoft.com/office/powerpoint/2010/main" val="4101707361"/>
       </p:ext>
     </p:extLst>
   </p:cSld>
@@ -6462,4 +7963,319 @@
     </a:ext>
   </a:extLst>
 </a:theme>
+</file>
+
+<file path=ppt/theme/theme2.xml><?xml version="1.0" encoding="utf-8"?>
+<a:theme xmlns:a="http://schemas.openxmlformats.org/drawingml/2006/main" name="Motyw pakietu Office">
+  <a:themeElements>
+    <a:clrScheme name="Pakiet Office">
+      <a:dk1>
+        <a:sysClr val="windowText" lastClr="000000"/>
+      </a:dk1>
+      <a:lt1>
+        <a:sysClr val="window" lastClr="FFFFFF"/>
+      </a:lt1>
+      <a:dk2>
+        <a:srgbClr val="0E2841"/>
+      </a:dk2>
+      <a:lt2>
+        <a:srgbClr val="E8E8E8"/>
+      </a:lt2>
+      <a:accent1>
+        <a:srgbClr val="156082"/>
+      </a:accent1>
+      <a:accent2>
+        <a:srgbClr val="E97132"/>
+      </a:accent2>
+      <a:accent3>
+        <a:srgbClr val="196B24"/>
+      </a:accent3>
+      <a:accent4>
+        <a:srgbClr val="0F9ED5"/>
+      </a:accent4>
+      <a:accent5>
+        <a:srgbClr val="A02B93"/>
+      </a:accent5>
+      <a:accent6>
+        <a:srgbClr val="4EA72E"/>
+      </a:accent6>
+      <a:hlink>
+        <a:srgbClr val="467886"/>
+      </a:hlink>
+      <a:folHlink>
+        <a:srgbClr val="96607D"/>
+      </a:folHlink>
+    </a:clrScheme>
+    <a:fontScheme name="Pakiet Office">
+      <a:majorFont>
+        <a:latin typeface="Aptos Display" panose="02110004020202020204"/>
+        <a:ea typeface=""/>
+        <a:cs typeface=""/>
+        <a:font script="Jpan" typeface="游ゴシック Light"/>
+        <a:font script="Hang" typeface="맑은 고딕"/>
+        <a:font script="Hans" typeface="等线 Light"/>
+        <a:font script="Hant" typeface="新細明體"/>
+        <a:font script="Arab" typeface="Times New Roman"/>
+        <a:font script="Hebr" typeface="Times New Roman"/>
+        <a:font script="Thai" typeface="Angsana New"/>
+        <a:font script="Ethi" typeface="Nyala"/>
+        <a:font script="Beng" typeface="Vrinda"/>
+        <a:font script="Gujr" typeface="Shruti"/>
+        <a:font script="Khmr" typeface="MoolBoran"/>
+        <a:font script="Knda" typeface="Tunga"/>
+        <a:font script="Guru" typeface="Raavi"/>
+        <a:font script="Cans" typeface="Euphemia"/>
+        <a:font script="Cher" typeface="Plantagenet Cherokee"/>
+        <a:font script="Yiii" typeface="Microsoft Yi Baiti"/>
+        <a:font script="Tibt" typeface="Microsoft Himalaya"/>
+        <a:font script="Thaa" typeface="MV Boli"/>
+        <a:font script="Deva" typeface="Mangal"/>
+        <a:font script="Telu" typeface="Gautami"/>
+        <a:font script="Taml" typeface="Latha"/>
+        <a:font script="Syrc" typeface="Estrangelo Edessa"/>
+        <a:font script="Orya" typeface="Kalinga"/>
+        <a:font script="Mlym" typeface="Kartika"/>
+        <a:font script="Laoo" typeface="DokChampa"/>
+        <a:font script="Sinh" typeface="Iskoola Pota"/>
+        <a:font script="Mong" typeface="Mongolian Baiti"/>
+        <a:font script="Viet" typeface="Times New Roman"/>
+        <a:font script="Uigh" typeface="Microsoft Uighur"/>
+        <a:font script="Geor" typeface="Sylfaen"/>
+        <a:font script="Armn" typeface="Arial"/>
+        <a:font script="Bugi" typeface="Leelawadee UI"/>
+        <a:font script="Bopo" typeface="Microsoft JhengHei"/>
+        <a:font script="Java" typeface="Javanese Text"/>
+        <a:font script="Lisu" typeface="Segoe UI"/>
+        <a:font script="Mymr" typeface="Myanmar Text"/>
+        <a:font script="Nkoo" typeface="Ebrima"/>
+        <a:font script="Olck" typeface="Nirmala UI"/>
+        <a:font script="Osma" typeface="Ebrima"/>
+        <a:font script="Phag" typeface="Phagspa"/>
+        <a:font script="Syrn" typeface="Estrangelo Edessa"/>
+        <a:font script="Syrj" typeface="Estrangelo Edessa"/>
+        <a:font script="Syre" typeface="Estrangelo Edessa"/>
+        <a:font script="Sora" typeface="Nirmala UI"/>
+        <a:font script="Tale" typeface="Microsoft Tai Le"/>
+        <a:font script="Talu" typeface="Microsoft New Tai Lue"/>
+        <a:font script="Tfng" typeface="Ebrima"/>
+      </a:majorFont>
+      <a:minorFont>
+        <a:latin typeface="Aptos" panose="02110004020202020204"/>
+        <a:ea typeface=""/>
+        <a:cs typeface=""/>
+        <a:font script="Jpan" typeface="游ゴシック"/>
+        <a:font script="Hang" typeface="맑은 고딕"/>
+        <a:font script="Hans" typeface="等线"/>
+        <a:font script="Hant" typeface="新細明體"/>
+        <a:font script="Arab" typeface="Arial"/>
+        <a:font script="Hebr" typeface="Arial"/>
+        <a:font script="Thai" typeface="Cordia New"/>
+        <a:font script="Ethi" typeface="Nyala"/>
+        <a:font script="Beng" typeface="Vrinda"/>
+        <a:font script="Gujr" typeface="Shruti"/>
+        <a:font script="Khmr" typeface="DaunPenh"/>
+        <a:font script="Knda" typeface="Tunga"/>
+        <a:font script="Guru" typeface="Raavi"/>
+        <a:font script="Cans" typeface="Euphemia"/>
+        <a:font script="Cher" typeface="Plantagenet Cherokee"/>
+        <a:font script="Yiii" typeface="Microsoft Yi Baiti"/>
+        <a:font script="Tibt" typeface="Microsoft Himalaya"/>
+        <a:font script="Thaa" typeface="MV Boli"/>
+        <a:font script="Deva" typeface="Mangal"/>
+        <a:font script="Telu" typeface="Gautami"/>
+        <a:font script="Taml" typeface="Latha"/>
+        <a:font script="Syrc" typeface="Estrangelo Edessa"/>
+        <a:font script="Orya" typeface="Kalinga"/>
+        <a:font script="Mlym" typeface="Kartika"/>
+        <a:font script="Laoo" typeface="DokChampa"/>
+        <a:font script="Sinh" typeface="Iskoola Pota"/>
+        <a:font script="Mong" typeface="Mongolian Baiti"/>
+        <a:font script="Viet" typeface="Arial"/>
+        <a:font script="Uigh" typeface="Microsoft Uighur"/>
+        <a:font script="Geor" typeface="Sylfaen"/>
+        <a:font script="Armn" typeface="Arial"/>
+        <a:font script="Bugi" typeface="Leelawadee UI"/>
+        <a:font script="Bopo" typeface="Microsoft JhengHei"/>
+        <a:font script="Java" typeface="Javanese Text"/>
+        <a:font script="Lisu" typeface="Segoe UI"/>
+        <a:font script="Mymr" typeface="Myanmar Text"/>
+        <a:font script="Nkoo" typeface="Ebrima"/>
+        <a:font script="Olck" typeface="Nirmala UI"/>
+        <a:font script="Osma" typeface="Ebrima"/>
+        <a:font script="Phag" typeface="Phagspa"/>
+        <a:font script="Syrn" typeface="Estrangelo Edessa"/>
+        <a:font script="Syrj" typeface="Estrangelo Edessa"/>
+        <a:font script="Syre" typeface="Estrangelo Edessa"/>
+        <a:font script="Sora" typeface="Nirmala UI"/>
+        <a:font script="Tale" typeface="Microsoft Tai Le"/>
+        <a:font script="Talu" typeface="Microsoft New Tai Lue"/>
+        <a:font script="Tfng" typeface="Ebrima"/>
+      </a:minorFont>
+    </a:fontScheme>
+    <a:fmtScheme name="Pakiet Office">
+      <a:fillStyleLst>
+        <a:solidFill>
+          <a:schemeClr val="phClr"/>
+        </a:solidFill>
+        <a:gradFill rotWithShape="1">
+          <a:gsLst>
+            <a:gs pos="0">
+              <a:schemeClr val="phClr">
+                <a:lumMod val="110000"/>
+                <a:satMod val="105000"/>
+                <a:tint val="67000"/>
+              </a:schemeClr>
+            </a:gs>
+            <a:gs pos="50000">
+              <a:schemeClr val="phClr">
+                <a:lumMod val="105000"/>
+                <a:satMod val="103000"/>
+                <a:tint val="73000"/>
+              </a:schemeClr>
+            </a:gs>
+            <a:gs pos="100000">
+              <a:schemeClr val="phClr">
+                <a:lumMod val="105000"/>
+                <a:satMod val="109000"/>
+                <a:tint val="81000"/>
+              </a:schemeClr>
+            </a:gs>
+          </a:gsLst>
+          <a:lin ang="5400000" scaled="0"/>
+        </a:gradFill>
+        <a:gradFill rotWithShape="1">
+          <a:gsLst>
+            <a:gs pos="0">
+              <a:schemeClr val="phClr">
+                <a:satMod val="103000"/>
+                <a:lumMod val="102000"/>
+                <a:tint val="94000"/>
+              </a:schemeClr>
+            </a:gs>
+            <a:gs pos="50000">
+              <a:schemeClr val="phClr">
+                <a:satMod val="110000"/>
+                <a:lumMod val="100000"/>
+                <a:shade val="100000"/>
+              </a:schemeClr>
+            </a:gs>
+            <a:gs pos="100000">
+              <a:schemeClr val="phClr">
+                <a:lumMod val="99000"/>
+                <a:satMod val="120000"/>
+                <a:shade val="78000"/>
+              </a:schemeClr>
+            </a:gs>
+          </a:gsLst>
+          <a:lin ang="5400000" scaled="0"/>
+        </a:gradFill>
+      </a:fillStyleLst>
+      <a:lnStyleLst>
+        <a:ln w="12700" cap="flat" cmpd="sng" algn="ctr">
+          <a:solidFill>
+            <a:schemeClr val="phClr"/>
+          </a:solidFill>
+          <a:prstDash val="solid"/>
+          <a:miter lim="800000"/>
+        </a:ln>
+        <a:ln w="19050" cap="flat" cmpd="sng" algn="ctr">
+          <a:solidFill>
+            <a:schemeClr val="phClr"/>
+          </a:solidFill>
+          <a:prstDash val="solid"/>
+          <a:miter lim="800000"/>
+        </a:ln>
+        <a:ln w="25400" cap="flat" cmpd="sng" algn="ctr">
+          <a:solidFill>
+            <a:schemeClr val="phClr"/>
+          </a:solidFill>
+          <a:prstDash val="solid"/>
+          <a:miter lim="800000"/>
+        </a:ln>
+      </a:lnStyleLst>
+      <a:effectStyleLst>
+        <a:effectStyle>
+          <a:effectLst/>
+        </a:effectStyle>
+        <a:effectStyle>
+          <a:effectLst/>
+        </a:effectStyle>
+        <a:effectStyle>
+          <a:effectLst>
+            <a:outerShdw blurRad="57150" dist="19050" dir="5400000" algn="ctr" rotWithShape="0">
+              <a:srgbClr val="000000">
+                <a:alpha val="63000"/>
+              </a:srgbClr>
+            </a:outerShdw>
+          </a:effectLst>
+        </a:effectStyle>
+      </a:effectStyleLst>
+      <a:bgFillStyleLst>
+        <a:solidFill>
+          <a:schemeClr val="phClr"/>
+        </a:solidFill>
+        <a:solidFill>
+          <a:schemeClr val="phClr">
+            <a:tint val="95000"/>
+            <a:satMod val="170000"/>
+          </a:schemeClr>
+        </a:solidFill>
+        <a:gradFill rotWithShape="1">
+          <a:gsLst>
+            <a:gs pos="0">
+              <a:schemeClr val="phClr">
+                <a:tint val="93000"/>
+                <a:satMod val="150000"/>
+                <a:shade val="98000"/>
+                <a:lumMod val="102000"/>
+              </a:schemeClr>
+            </a:gs>
+            <a:gs pos="50000">
+              <a:schemeClr val="phClr">
+                <a:tint val="98000"/>
+                <a:satMod val="130000"/>
+                <a:shade val="90000"/>
+                <a:lumMod val="103000"/>
+              </a:schemeClr>
+            </a:gs>
+            <a:gs pos="100000">
+              <a:schemeClr val="phClr">
+                <a:shade val="63000"/>
+                <a:satMod val="120000"/>
+              </a:schemeClr>
+            </a:gs>
+          </a:gsLst>
+          <a:lin ang="5400000" scaled="0"/>
+        </a:gradFill>
+      </a:bgFillStyleLst>
+    </a:fmtScheme>
+  </a:themeElements>
+  <a:objectDefaults>
+    <a:lnDef>
+      <a:spPr/>
+      <a:bodyPr/>
+      <a:lstStyle/>
+      <a:style>
+        <a:lnRef idx="2">
+          <a:schemeClr val="accent1"/>
+        </a:lnRef>
+        <a:fillRef idx="0">
+          <a:schemeClr val="accent1"/>
+        </a:fillRef>
+        <a:effectRef idx="1">
+          <a:schemeClr val="accent1"/>
+        </a:effectRef>
+        <a:fontRef idx="minor">
+          <a:schemeClr val="tx1"/>
+        </a:fontRef>
+      </a:style>
+    </a:lnDef>
+  </a:objectDefaults>
+  <a:extraClrSchemeLst/>
+  <a:extLst>
+    <a:ext uri="{05A4C25C-085E-4340-85A3-A5531E510DB2}">
+      <thm15:themeFamily xmlns:thm15="http://schemas.microsoft.com/office/thememl/2012/main" name="Office Theme" id="{2E142A2C-CD16-42D6-873A-C26D2A0506FA}" vid="{1BDDFF52-6CD6-40A5-AB3C-68EB2F1E4D0A}"/>
+    </a:ext>
+  </a:extLst>
+</a:theme>
 </file>
</xml_diff>

<commit_message>
sektory, PKB, rynek pracy
</commit_message>
<xml_diff>
--- a/WPSG_INF_K4m_Prezentacja_temat_3.pptx
+++ b/WPSG_INF_K4m_Prezentacja_temat_3.pptx
@@ -2288,22 +2288,120 @@
             <p:ph type="subTitle" idx="1"/>
           </p:nvPr>
         </p:nvSpPr>
-        <p:spPr/>
-        <p:txBody>
-          <a:bodyPr/>
-          <a:lstStyle/>
-          <a:p>
-            <a:r>
-              <a:rPr lang="pl-PL" sz="1800" dirty="0">
-                <a:effectLst/>
-                <a:latin typeface="Aptos" panose="020B0004020202020204" pitchFamily="34" charset="0"/>
-                <a:ea typeface="Aptos" panose="020B0004020202020204" pitchFamily="34" charset="0"/>
-                <a:cs typeface="Arial" panose="020B0604020202020204" pitchFamily="34" charset="0"/>
-              </a:rPr>
-              <a:t>Udział MSP w tworzeniu miejsc pracy.</a:t>
-            </a:r>
-          </a:p>
-          <a:p>
+        <p:spPr>
+          <a:xfrm>
+            <a:off x="0" y="2012935"/>
+            <a:ext cx="9144000" cy="1655762"/>
+          </a:xfrm>
+        </p:spPr>
+        <p:txBody>
+          <a:bodyPr/>
+          <a:lstStyle/>
+          <a:p>
+            <a:pPr algn="l">
+              <a:lnSpc>
+                <a:spcPct val="100000"/>
+              </a:lnSpc>
+            </a:pPr>
+            <a:r>
+              <a:rPr lang="pl-PL" sz="1800" dirty="0">
+                <a:effectLst/>
+                <a:latin typeface="Aptos" panose="020B0004020202020204" pitchFamily="34" charset="0"/>
+                <a:ea typeface="Aptos" panose="020B0004020202020204" pitchFamily="34" charset="0"/>
+                <a:cs typeface="Arial" panose="020B0604020202020204" pitchFamily="34" charset="0"/>
+              </a:rPr>
+              <a:t>Sektor MSP stanowi przeważającą większość przedsiębiorstw w Polsce – 99,8%.</a:t>
+            </a:r>
+          </a:p>
+          <a:p>
+            <a:pPr algn="l">
+              <a:lnSpc>
+                <a:spcPct val="100000"/>
+              </a:lnSpc>
+            </a:pPr>
+            <a:r>
+              <a:rPr lang="pl-PL" sz="1800" dirty="0">
+                <a:effectLst/>
+                <a:latin typeface="Aptos" panose="020B0004020202020204" pitchFamily="34" charset="0"/>
+                <a:ea typeface="Aptos" panose="020B0004020202020204" pitchFamily="34" charset="0"/>
+                <a:cs typeface="Arial" panose="020B0604020202020204" pitchFamily="34" charset="0"/>
+              </a:rPr>
+              <a:t>Według stanu na 31.12.2021 r. w sektorze przedsiębiorstw (również dużych) pracowało ponad 10,2 mln osób i ta liczba rośnie już od wielu lat. W sektorze MSP pracowało ponad 6,9 mln osób, tj. 68% pracujących ogółem w sektorze przedsiębiorstw.</a:t>
+            </a:r>
+          </a:p>
+          <a:p>
+            <a:pPr algn="l">
+              <a:lnSpc>
+                <a:spcPct val="100000"/>
+              </a:lnSpc>
+            </a:pPr>
+            <a:r>
+              <a:rPr lang="pl-PL" sz="1800" dirty="0">
+                <a:latin typeface="Aptos" panose="020B0004020202020204" pitchFamily="34" charset="0"/>
+                <a:cs typeface="Arial" panose="020B0604020202020204" pitchFamily="34" charset="0"/>
+              </a:rPr>
+              <a:t>Mikroprzedsiębiorstwa – 4,3 mln osób</a:t>
+            </a:r>
+          </a:p>
+          <a:p>
+            <a:pPr algn="l">
+              <a:lnSpc>
+                <a:spcPct val="100000"/>
+              </a:lnSpc>
+            </a:pPr>
+            <a:r>
+              <a:rPr lang="pl-PL" sz="1800" dirty="0">
+                <a:latin typeface="Aptos" panose="020B0004020202020204" pitchFamily="34" charset="0"/>
+                <a:cs typeface="Arial" panose="020B0604020202020204" pitchFamily="34" charset="0"/>
+              </a:rPr>
+              <a:t>Małe przedsiębiorstwa – 1 mln osób</a:t>
+            </a:r>
+          </a:p>
+          <a:p>
+            <a:pPr algn="l">
+              <a:lnSpc>
+                <a:spcPct val="100000"/>
+              </a:lnSpc>
+            </a:pPr>
+            <a:r>
+              <a:rPr lang="pl-PL" sz="1800" dirty="0">
+                <a:latin typeface="Aptos" panose="020B0004020202020204" pitchFamily="34" charset="0"/>
+                <a:cs typeface="Arial" panose="020B0604020202020204" pitchFamily="34" charset="0"/>
+              </a:rPr>
+              <a:t>Średnie przedsiębiorstwa </a:t>
+            </a:r>
+            <a:r>
+              <a:rPr lang="pl-PL" sz="1800">
+                <a:latin typeface="Aptos" panose="020B0004020202020204" pitchFamily="34" charset="0"/>
+                <a:cs typeface="Arial" panose="020B0604020202020204" pitchFamily="34" charset="0"/>
+              </a:rPr>
+              <a:t>– 1,6 mln osób</a:t>
+            </a:r>
+            <a:endParaRPr lang="pl-PL" sz="1800" dirty="0">
+              <a:latin typeface="Aptos" panose="020B0004020202020204" pitchFamily="34" charset="0"/>
+              <a:cs typeface="Arial" panose="020B0604020202020204" pitchFamily="34" charset="0"/>
+            </a:endParaRPr>
+          </a:p>
+          <a:p>
+            <a:pPr algn="l">
+              <a:lnSpc>
+                <a:spcPct val="100000"/>
+              </a:lnSpc>
+            </a:pPr>
+            <a:r>
+              <a:rPr lang="pl-PL" sz="1800" dirty="0">
+                <a:latin typeface="Aptos" panose="020B0004020202020204" pitchFamily="34" charset="0"/>
+                <a:cs typeface="Arial" panose="020B0604020202020204" pitchFamily="34" charset="0"/>
+              </a:rPr>
+              <a:t>Duże przedsiębiorstwa – 3,3 mln osób</a:t>
+            </a:r>
+          </a:p>
+          <a:p>
+            <a:pPr algn="l">
+              <a:lnSpc>
+                <a:spcPct val="100000"/>
+              </a:lnSpc>
+            </a:pPr>
             <a:endParaRPr lang="pl-PL" dirty="0"/>
           </a:p>
         </p:txBody>
@@ -2393,7 +2491,12 @@
             <p:ph type="subTitle" idx="1"/>
           </p:nvPr>
         </p:nvSpPr>
-        <p:spPr/>
+        <p:spPr>
+          <a:xfrm>
+            <a:off x="0" y="966787"/>
+            <a:ext cx="9144000" cy="1655762"/>
+          </a:xfrm>
+        </p:spPr>
         <p:txBody>
           <a:bodyPr/>
           <a:lstStyle/>
@@ -2411,6 +2514,35 @@
           </a:p>
         </p:txBody>
       </p:sp>
+      <p:pic>
+        <p:nvPicPr>
+          <p:cNvPr id="7" name="Obraz 6">
+            <a:extLst>
+              <a:ext uri="{FF2B5EF4-FFF2-40B4-BE49-F238E27FC236}">
+                <a16:creationId xmlns:a16="http://schemas.microsoft.com/office/drawing/2014/main" id="{D8815AA2-0404-CBF2-FF8A-0B729DF5EADE}"/>
+              </a:ext>
+            </a:extLst>
+          </p:cNvPr>
+          <p:cNvPicPr>
+            <a:picLocks noChangeAspect="1"/>
+          </p:cNvPicPr>
+          <p:nvPr/>
+        </p:nvPicPr>
+        <p:blipFill rotWithShape="1">
+          <a:blip r:embed="rId2"/>
+          <a:srcRect l="41578" t="34046" r="27039" b="32038"/>
+          <a:stretch/>
+        </p:blipFill>
+        <p:spPr>
+          <a:xfrm>
+            <a:off x="5116317" y="2556769"/>
+            <a:ext cx="7075683" cy="4301231"/>
+          </a:xfrm>
+          <a:prstGeom prst="rect">
+            <a:avLst/>
+          </a:prstGeom>
+        </p:spPr>
+      </p:pic>
     </p:spTree>
     <p:extLst>
       <p:ext uri="{BB962C8B-B14F-4D97-AF65-F5344CB8AC3E}">
@@ -7392,26 +7524,11 @@
           <a:p>
             <a:pPr algn="l"/>
             <a:r>
-              <a:rPr lang="pl-PL" sz="1800">
-                <a:cs typeface="Arial" panose="020B0604020202020204" pitchFamily="34" charset="0"/>
-              </a:rPr>
-              <a:t>ICT - Information </a:t>
-            </a:r>
-            <a:r>
-              <a:rPr lang="pl-PL" sz="1800" dirty="0">
-                <a:cs typeface="Arial" panose="020B0604020202020204" pitchFamily="34" charset="0"/>
-              </a:rPr>
-              <a:t>and </a:t>
-            </a:r>
-            <a:r>
-              <a:rPr lang="pl-PL" sz="1800">
-                <a:cs typeface="Arial" panose="020B0604020202020204" pitchFamily="34" charset="0"/>
-              </a:rPr>
-              <a:t>Communications Technology</a:t>
-            </a:r>
-            <a:endParaRPr lang="pl-PL" sz="1800" dirty="0">
-              <a:cs typeface="Arial" panose="020B0604020202020204" pitchFamily="34" charset="0"/>
-            </a:endParaRPr>
+              <a:rPr lang="pl-PL" sz="1800" dirty="0">
+                <a:cs typeface="Arial" panose="020B0604020202020204" pitchFamily="34" charset="0"/>
+              </a:rPr>
+              <a:t>ICT - Information and Communications Technology</a:t>
+            </a:r>
           </a:p>
           <a:p>
             <a:pPr algn="l"/>
@@ -7617,22 +7734,163 @@
             <p:ph type="subTitle" idx="1"/>
           </p:nvPr>
         </p:nvSpPr>
-        <p:spPr/>
-        <p:txBody>
-          <a:bodyPr/>
-          <a:lstStyle/>
-          <a:p>
-            <a:r>
-              <a:rPr lang="pl-PL" sz="1800" dirty="0">
-                <a:effectLst/>
-                <a:latin typeface="Aptos" panose="020B0004020202020204" pitchFamily="34" charset="0"/>
-                <a:ea typeface="Aptos" panose="020B0004020202020204" pitchFamily="34" charset="0"/>
-                <a:cs typeface="Arial" panose="020B0604020202020204" pitchFamily="34" charset="0"/>
-              </a:rPr>
-              <a:t>Przegląd branż, w których MSP są najbardziej aktywne.</a:t>
-            </a:r>
-          </a:p>
-          <a:p>
+        <p:spPr>
+          <a:xfrm>
+            <a:off x="0" y="1655762"/>
+            <a:ext cx="9144000" cy="5202238"/>
+          </a:xfrm>
+        </p:spPr>
+        <p:txBody>
+          <a:bodyPr/>
+          <a:lstStyle/>
+          <a:p>
+            <a:pPr algn="l"/>
+            <a:r>
+              <a:rPr lang="pl-PL" sz="1800" dirty="0">
+                <a:effectLst/>
+                <a:latin typeface="Aptos" panose="020B0004020202020204" pitchFamily="34" charset="0"/>
+                <a:ea typeface="Aptos" panose="020B0004020202020204" pitchFamily="34" charset="0"/>
+                <a:cs typeface="Arial" panose="020B0604020202020204" pitchFamily="34" charset="0"/>
+              </a:rPr>
+              <a:t>Sektor MSP:</a:t>
+            </a:r>
+          </a:p>
+          <a:p>
+            <a:pPr marL="285750" indent="-285750" algn="l">
+              <a:buFont typeface="Arial" panose="020B0604020202020204" pitchFamily="34" charset="0"/>
+              <a:buChar char="•"/>
+            </a:pPr>
+            <a:r>
+              <a:rPr lang="pl-PL" sz="1800" dirty="0">
+                <a:effectLst/>
+                <a:latin typeface="Aptos" panose="020B0004020202020204" pitchFamily="34" charset="0"/>
+                <a:ea typeface="Aptos" panose="020B0004020202020204" pitchFamily="34" charset="0"/>
+                <a:cs typeface="Arial" panose="020B0604020202020204" pitchFamily="34" charset="0"/>
+              </a:rPr>
+              <a:t>Usługi 53,9%</a:t>
+            </a:r>
+          </a:p>
+          <a:p>
+            <a:pPr marL="285750" indent="-285750" algn="l">
+              <a:buFont typeface="Arial" panose="020B0604020202020204" pitchFamily="34" charset="0"/>
+              <a:buChar char="•"/>
+            </a:pPr>
+            <a:r>
+              <a:rPr lang="pl-PL" sz="1800" dirty="0">
+                <a:effectLst/>
+                <a:latin typeface="Aptos" panose="020B0004020202020204" pitchFamily="34" charset="0"/>
+                <a:ea typeface="Aptos" panose="020B0004020202020204" pitchFamily="34" charset="0"/>
+                <a:cs typeface="Arial" panose="020B0604020202020204" pitchFamily="34" charset="0"/>
+              </a:rPr>
+              <a:t>Handel 20,9%</a:t>
+            </a:r>
+          </a:p>
+          <a:p>
+            <a:pPr marL="285750" indent="-285750" algn="l">
+              <a:buFont typeface="Arial" panose="020B0604020202020204" pitchFamily="34" charset="0"/>
+              <a:buChar char="•"/>
+            </a:pPr>
+            <a:r>
+              <a:rPr lang="pl-PL" sz="1800" dirty="0">
+                <a:effectLst/>
+                <a:latin typeface="Aptos" panose="020B0004020202020204" pitchFamily="34" charset="0"/>
+                <a:ea typeface="Aptos" panose="020B0004020202020204" pitchFamily="34" charset="0"/>
+                <a:cs typeface="Arial" panose="020B0604020202020204" pitchFamily="34" charset="0"/>
+              </a:rPr>
+              <a:t>Budownictwo 15,6%</a:t>
+            </a:r>
+          </a:p>
+          <a:p>
+            <a:pPr marL="285750" indent="-285750" algn="l">
+              <a:buFont typeface="Arial" panose="020B0604020202020204" pitchFamily="34" charset="0"/>
+              <a:buChar char="•"/>
+            </a:pPr>
+            <a:r>
+              <a:rPr lang="pl-PL" sz="1800" dirty="0">
+                <a:effectLst/>
+                <a:latin typeface="Aptos" panose="020B0004020202020204" pitchFamily="34" charset="0"/>
+                <a:ea typeface="Aptos" panose="020B0004020202020204" pitchFamily="34" charset="0"/>
+                <a:cs typeface="Arial" panose="020B0604020202020204" pitchFamily="34" charset="0"/>
+              </a:rPr>
+              <a:t>Przemysł 9,6%</a:t>
+            </a:r>
+          </a:p>
+          <a:p>
+            <a:pPr algn="l"/>
+            <a:r>
+              <a:rPr lang="pl-PL" sz="1800" dirty="0">
+                <a:effectLst/>
+                <a:latin typeface="Aptos" panose="020B0004020202020204" pitchFamily="34" charset="0"/>
+                <a:ea typeface="Aptos" panose="020B0004020202020204" pitchFamily="34" charset="0"/>
+                <a:cs typeface="Arial" panose="020B0604020202020204" pitchFamily="34" charset="0"/>
+              </a:rPr>
+              <a:t>Dla porównania, duże firmy:</a:t>
+            </a:r>
+          </a:p>
+          <a:p>
+            <a:pPr marL="285750" indent="-285750" algn="l">
+              <a:buFont typeface="Arial" panose="020B0604020202020204" pitchFamily="34" charset="0"/>
+              <a:buChar char="•"/>
+            </a:pPr>
+            <a:r>
+              <a:rPr lang="pl-PL" sz="1800" dirty="0">
+                <a:latin typeface="Aptos" panose="020B0004020202020204" pitchFamily="34" charset="0"/>
+                <a:ea typeface="Aptos" panose="020B0004020202020204" pitchFamily="34" charset="0"/>
+                <a:cs typeface="Arial" panose="020B0604020202020204" pitchFamily="34" charset="0"/>
+              </a:rPr>
+              <a:t>Przemysł 51,1%</a:t>
+            </a:r>
+          </a:p>
+          <a:p>
+            <a:pPr marL="285750" indent="-285750" algn="l">
+              <a:buFont typeface="Arial" panose="020B0604020202020204" pitchFamily="34" charset="0"/>
+              <a:buChar char="•"/>
+            </a:pPr>
+            <a:r>
+              <a:rPr lang="pl-PL" sz="1800" dirty="0">
+                <a:effectLst/>
+                <a:latin typeface="Aptos" panose="020B0004020202020204" pitchFamily="34" charset="0"/>
+                <a:ea typeface="Aptos" panose="020B0004020202020204" pitchFamily="34" charset="0"/>
+                <a:cs typeface="Arial" panose="020B0604020202020204" pitchFamily="34" charset="0"/>
+              </a:rPr>
+              <a:t>Usługi 32%</a:t>
+            </a:r>
+          </a:p>
+          <a:p>
+            <a:pPr marL="285750" indent="-285750" algn="l">
+              <a:buFont typeface="Arial" panose="020B0604020202020204" pitchFamily="34" charset="0"/>
+              <a:buChar char="•"/>
+            </a:pPr>
+            <a:r>
+              <a:rPr lang="pl-PL" sz="1800" dirty="0">
+                <a:effectLst/>
+                <a:latin typeface="Aptos" panose="020B0004020202020204" pitchFamily="34" charset="0"/>
+                <a:ea typeface="Aptos" panose="020B0004020202020204" pitchFamily="34" charset="0"/>
+                <a:cs typeface="Arial" panose="020B0604020202020204" pitchFamily="34" charset="0"/>
+              </a:rPr>
+              <a:t>Handel 13,6%</a:t>
+            </a:r>
+          </a:p>
+          <a:p>
+            <a:pPr marL="285750" indent="-285750" algn="l">
+              <a:buFont typeface="Arial" panose="020B0604020202020204" pitchFamily="34" charset="0"/>
+              <a:buChar char="•"/>
+            </a:pPr>
+            <a:r>
+              <a:rPr lang="pl-PL" sz="1800" dirty="0">
+                <a:effectLst/>
+                <a:latin typeface="Aptos" panose="020B0004020202020204" pitchFamily="34" charset="0"/>
+                <a:ea typeface="Aptos" panose="020B0004020202020204" pitchFamily="34" charset="0"/>
+                <a:cs typeface="Arial" panose="020B0604020202020204" pitchFamily="34" charset="0"/>
+              </a:rPr>
+              <a:t>Budownictwo 3,3%</a:t>
+            </a:r>
+          </a:p>
+          <a:p>
+            <a:pPr marL="342900" indent="-342900" algn="l">
+              <a:buFont typeface="Arial" panose="020B0604020202020204" pitchFamily="34" charset="0"/>
+              <a:buChar char="•"/>
+            </a:pPr>
             <a:endParaRPr lang="pl-PL" dirty="0"/>
           </a:p>
         </p:txBody>

</xml_diff>

<commit_message>
sektory wykresy, wsparcie dla msp
</commit_message>
<xml_diff>
--- a/WPSG_INF_K4m_Prezentacja_temat_3.pptx
+++ b/WPSG_INF_K4m_Prezentacja_temat_3.pptx
@@ -155,6 +155,2082 @@
 </p:presentation>
 </file>
 
+<file path=ppt/charts/chart1.xml><?xml version="1.0" encoding="utf-8"?>
+<c:chartSpace xmlns:c="http://schemas.openxmlformats.org/drawingml/2006/chart" xmlns:a="http://schemas.openxmlformats.org/drawingml/2006/main" xmlns:r="http://schemas.openxmlformats.org/officeDocument/2006/relationships" xmlns:c16r2="http://schemas.microsoft.com/office/drawing/2015/06/chart">
+  <c:date1904 val="0"/>
+  <c:lang val="pl-PL"/>
+  <c:roundedCorners val="0"/>
+  <mc:AlternateContent xmlns:mc="http://schemas.openxmlformats.org/markup-compatibility/2006">
+    <mc:Choice xmlns:c14="http://schemas.microsoft.com/office/drawing/2007/8/2/chart" Requires="c14">
+      <c14:style val="102"/>
+    </mc:Choice>
+    <mc:Fallback>
+      <c:style val="2"/>
+    </mc:Fallback>
+  </mc:AlternateContent>
+  <c:chart>
+    <c:title>
+      <c:tx>
+        <c:rich>
+          <a:bodyPr rot="0" spcFirstLastPara="1" vertOverflow="ellipsis" vert="horz" wrap="square" anchor="ctr" anchorCtr="1"/>
+          <a:lstStyle/>
+          <a:p>
+            <a:pPr>
+              <a:defRPr sz="2128" b="1" i="0" u="none" strike="noStrike" kern="1200" cap="all" baseline="0">
+                <a:solidFill>
+                  <a:schemeClr val="tx1">
+                    <a:lumMod val="65000"/>
+                    <a:lumOff val="35000"/>
+                  </a:schemeClr>
+                </a:solidFill>
+                <a:latin typeface="+mn-lt"/>
+                <a:ea typeface="+mn-ea"/>
+                <a:cs typeface="+mn-cs"/>
+              </a:defRPr>
+            </a:pPr>
+            <a:r>
+              <a:rPr lang="pl-PL" dirty="0"/>
+              <a:t>Sektor </a:t>
+            </a:r>
+            <a:r>
+              <a:rPr lang="en-US" dirty="0"/>
+              <a:t>MSP</a:t>
+            </a:r>
+          </a:p>
+        </c:rich>
+      </c:tx>
+      <c:overlay val="0"/>
+      <c:spPr>
+        <a:noFill/>
+        <a:ln>
+          <a:noFill/>
+        </a:ln>
+        <a:effectLst/>
+      </c:spPr>
+      <c:txPr>
+        <a:bodyPr rot="0" spcFirstLastPara="1" vertOverflow="ellipsis" vert="horz" wrap="square" anchor="ctr" anchorCtr="1"/>
+        <a:lstStyle/>
+        <a:p>
+          <a:pPr>
+            <a:defRPr sz="2128" b="1" i="0" u="none" strike="noStrike" kern="1200" cap="all" baseline="0">
+              <a:solidFill>
+                <a:schemeClr val="tx1">
+                  <a:lumMod val="65000"/>
+                  <a:lumOff val="35000"/>
+                </a:schemeClr>
+              </a:solidFill>
+              <a:latin typeface="+mn-lt"/>
+              <a:ea typeface="+mn-ea"/>
+              <a:cs typeface="+mn-cs"/>
+            </a:defRPr>
+          </a:pPr>
+          <a:endParaRPr lang="pl-PL"/>
+        </a:p>
+      </c:txPr>
+    </c:title>
+    <c:autoTitleDeleted val="0"/>
+    <c:plotArea>
+      <c:layout/>
+      <c:pieChart>
+        <c:varyColors val="1"/>
+        <c:ser>
+          <c:idx val="0"/>
+          <c:order val="0"/>
+          <c:tx>
+            <c:strRef>
+              <c:f>Arkusz1!$B$1</c:f>
+              <c:strCache>
+                <c:ptCount val="1"/>
+                <c:pt idx="0">
+                  <c:v>MSP</c:v>
+                </c:pt>
+              </c:strCache>
+            </c:strRef>
+          </c:tx>
+          <c:dPt>
+            <c:idx val="0"/>
+            <c:bubble3D val="0"/>
+            <c:spPr>
+              <a:solidFill>
+                <a:schemeClr val="accent1"/>
+              </a:solidFill>
+              <a:ln>
+                <a:noFill/>
+              </a:ln>
+              <a:effectLst>
+                <a:outerShdw blurRad="63500" sx="102000" sy="102000" algn="ctr" rotWithShape="0">
+                  <a:prstClr val="black">
+                    <a:alpha val="20000"/>
+                  </a:prstClr>
+                </a:outerShdw>
+              </a:effectLst>
+            </c:spPr>
+            <c:extLst>
+              <c:ext xmlns:c16="http://schemas.microsoft.com/office/drawing/2014/chart" uri="{C3380CC4-5D6E-409C-BE32-E72D297353CC}">
+                <c16:uniqueId val="{00000005-61BA-459E-AE48-A6D322A1F25E}"/>
+              </c:ext>
+            </c:extLst>
+          </c:dPt>
+          <c:dPt>
+            <c:idx val="1"/>
+            <c:bubble3D val="0"/>
+            <c:spPr>
+              <a:solidFill>
+                <a:schemeClr val="accent2"/>
+              </a:solidFill>
+              <a:ln>
+                <a:noFill/>
+              </a:ln>
+              <a:effectLst>
+                <a:outerShdw blurRad="63500" sx="102000" sy="102000" algn="ctr" rotWithShape="0">
+                  <a:prstClr val="black">
+                    <a:alpha val="20000"/>
+                  </a:prstClr>
+                </a:outerShdw>
+              </a:effectLst>
+            </c:spPr>
+            <c:extLst>
+              <c:ext xmlns:c16="http://schemas.microsoft.com/office/drawing/2014/chart" uri="{C3380CC4-5D6E-409C-BE32-E72D297353CC}">
+                <c16:uniqueId val="{00000006-61BA-459E-AE48-A6D322A1F25E}"/>
+              </c:ext>
+            </c:extLst>
+          </c:dPt>
+          <c:dPt>
+            <c:idx val="2"/>
+            <c:bubble3D val="0"/>
+            <c:spPr>
+              <a:solidFill>
+                <a:schemeClr val="accent3"/>
+              </a:solidFill>
+              <a:ln>
+                <a:noFill/>
+              </a:ln>
+              <a:effectLst>
+                <a:outerShdw blurRad="63500" sx="102000" sy="102000" algn="ctr" rotWithShape="0">
+                  <a:prstClr val="black">
+                    <a:alpha val="20000"/>
+                  </a:prstClr>
+                </a:outerShdw>
+              </a:effectLst>
+            </c:spPr>
+            <c:extLst>
+              <c:ext xmlns:c16="http://schemas.microsoft.com/office/drawing/2014/chart" uri="{C3380CC4-5D6E-409C-BE32-E72D297353CC}">
+                <c16:uniqueId val="{00000007-61BA-459E-AE48-A6D322A1F25E}"/>
+              </c:ext>
+            </c:extLst>
+          </c:dPt>
+          <c:dPt>
+            <c:idx val="3"/>
+            <c:bubble3D val="0"/>
+            <c:spPr>
+              <a:solidFill>
+                <a:schemeClr val="accent4"/>
+              </a:solidFill>
+              <a:ln>
+                <a:noFill/>
+              </a:ln>
+              <a:effectLst>
+                <a:outerShdw blurRad="63500" sx="102000" sy="102000" algn="ctr" rotWithShape="0">
+                  <a:prstClr val="black">
+                    <a:alpha val="20000"/>
+                  </a:prstClr>
+                </a:outerShdw>
+              </a:effectLst>
+            </c:spPr>
+            <c:extLst>
+              <c:ext xmlns:c16="http://schemas.microsoft.com/office/drawing/2014/chart" uri="{C3380CC4-5D6E-409C-BE32-E72D297353CC}">
+                <c16:uniqueId val="{00000008-61BA-459E-AE48-A6D322A1F25E}"/>
+              </c:ext>
+            </c:extLst>
+          </c:dPt>
+          <c:dLbls>
+            <c:dLbl>
+              <c:idx val="0"/>
+              <c:spPr>
+                <a:noFill/>
+                <a:ln>
+                  <a:noFill/>
+                </a:ln>
+                <a:effectLst/>
+              </c:spPr>
+              <c:txPr>
+                <a:bodyPr rot="0" spcFirstLastPara="1" vertOverflow="ellipsis" vert="horz" wrap="square" lIns="38100" tIns="19050" rIns="38100" bIns="19050" anchor="ctr" anchorCtr="1">
+                  <a:spAutoFit/>
+                </a:bodyPr>
+                <a:lstStyle/>
+                <a:p>
+                  <a:pPr>
+                    <a:defRPr sz="1330" b="1" i="0" u="none" strike="noStrike" kern="1200" spc="0" baseline="0">
+                      <a:solidFill>
+                        <a:schemeClr val="accent1"/>
+                      </a:solidFill>
+                      <a:latin typeface="+mn-lt"/>
+                      <a:ea typeface="+mn-ea"/>
+                      <a:cs typeface="+mn-cs"/>
+                    </a:defRPr>
+                  </a:pPr>
+                  <a:endParaRPr lang="pl-PL"/>
+                </a:p>
+              </c:txPr>
+              <c:dLblPos val="outEnd"/>
+              <c:showLegendKey val="0"/>
+              <c:showVal val="0"/>
+              <c:showCatName val="1"/>
+              <c:showSerName val="0"/>
+              <c:showPercent val="0"/>
+              <c:showBubbleSize val="0"/>
+              <c:extLst>
+                <c:ext xmlns:c16="http://schemas.microsoft.com/office/drawing/2014/chart" uri="{C3380CC4-5D6E-409C-BE32-E72D297353CC}">
+                  <c16:uniqueId val="{00000005-61BA-459E-AE48-A6D322A1F25E}"/>
+                </c:ext>
+              </c:extLst>
+            </c:dLbl>
+            <c:dLbl>
+              <c:idx val="1"/>
+              <c:spPr>
+                <a:noFill/>
+                <a:ln>
+                  <a:noFill/>
+                </a:ln>
+                <a:effectLst/>
+              </c:spPr>
+              <c:txPr>
+                <a:bodyPr rot="0" spcFirstLastPara="1" vertOverflow="ellipsis" vert="horz" wrap="square" lIns="38100" tIns="19050" rIns="38100" bIns="19050" anchor="ctr" anchorCtr="1">
+                  <a:spAutoFit/>
+                </a:bodyPr>
+                <a:lstStyle/>
+                <a:p>
+                  <a:pPr>
+                    <a:defRPr sz="1330" b="1" i="0" u="none" strike="noStrike" kern="1200" spc="0" baseline="0">
+                      <a:solidFill>
+                        <a:schemeClr val="accent2"/>
+                      </a:solidFill>
+                      <a:latin typeface="+mn-lt"/>
+                      <a:ea typeface="+mn-ea"/>
+                      <a:cs typeface="+mn-cs"/>
+                    </a:defRPr>
+                  </a:pPr>
+                  <a:endParaRPr lang="pl-PL"/>
+                </a:p>
+              </c:txPr>
+              <c:dLblPos val="outEnd"/>
+              <c:showLegendKey val="0"/>
+              <c:showVal val="0"/>
+              <c:showCatName val="1"/>
+              <c:showSerName val="0"/>
+              <c:showPercent val="0"/>
+              <c:showBubbleSize val="0"/>
+              <c:extLst>
+                <c:ext xmlns:c16="http://schemas.microsoft.com/office/drawing/2014/chart" uri="{C3380CC4-5D6E-409C-BE32-E72D297353CC}">
+                  <c16:uniqueId val="{00000006-61BA-459E-AE48-A6D322A1F25E}"/>
+                </c:ext>
+              </c:extLst>
+            </c:dLbl>
+            <c:dLbl>
+              <c:idx val="2"/>
+              <c:spPr>
+                <a:noFill/>
+                <a:ln>
+                  <a:noFill/>
+                </a:ln>
+                <a:effectLst/>
+              </c:spPr>
+              <c:txPr>
+                <a:bodyPr rot="0" spcFirstLastPara="1" vertOverflow="ellipsis" vert="horz" wrap="square" lIns="38100" tIns="19050" rIns="38100" bIns="19050" anchor="ctr" anchorCtr="1">
+                  <a:spAutoFit/>
+                </a:bodyPr>
+                <a:lstStyle/>
+                <a:p>
+                  <a:pPr>
+                    <a:defRPr sz="1330" b="1" i="0" u="none" strike="noStrike" kern="1200" spc="0" baseline="0">
+                      <a:solidFill>
+                        <a:schemeClr val="accent3"/>
+                      </a:solidFill>
+                      <a:latin typeface="+mn-lt"/>
+                      <a:ea typeface="+mn-ea"/>
+                      <a:cs typeface="+mn-cs"/>
+                    </a:defRPr>
+                  </a:pPr>
+                  <a:endParaRPr lang="pl-PL"/>
+                </a:p>
+              </c:txPr>
+              <c:dLblPos val="outEnd"/>
+              <c:showLegendKey val="0"/>
+              <c:showVal val="0"/>
+              <c:showCatName val="1"/>
+              <c:showSerName val="0"/>
+              <c:showPercent val="0"/>
+              <c:showBubbleSize val="0"/>
+              <c:extLst>
+                <c:ext xmlns:c16="http://schemas.microsoft.com/office/drawing/2014/chart" uri="{C3380CC4-5D6E-409C-BE32-E72D297353CC}">
+                  <c16:uniqueId val="{00000007-61BA-459E-AE48-A6D322A1F25E}"/>
+                </c:ext>
+              </c:extLst>
+            </c:dLbl>
+            <c:dLbl>
+              <c:idx val="3"/>
+              <c:spPr>
+                <a:noFill/>
+                <a:ln>
+                  <a:noFill/>
+                </a:ln>
+                <a:effectLst/>
+              </c:spPr>
+              <c:txPr>
+                <a:bodyPr rot="0" spcFirstLastPara="1" vertOverflow="ellipsis" vert="horz" wrap="square" lIns="38100" tIns="19050" rIns="38100" bIns="19050" anchor="ctr" anchorCtr="1">
+                  <a:spAutoFit/>
+                </a:bodyPr>
+                <a:lstStyle/>
+                <a:p>
+                  <a:pPr>
+                    <a:defRPr sz="1330" b="1" i="0" u="none" strike="noStrike" kern="1200" spc="0" baseline="0">
+                      <a:solidFill>
+                        <a:schemeClr val="accent4"/>
+                      </a:solidFill>
+                      <a:latin typeface="+mn-lt"/>
+                      <a:ea typeface="+mn-ea"/>
+                      <a:cs typeface="+mn-cs"/>
+                    </a:defRPr>
+                  </a:pPr>
+                  <a:endParaRPr lang="pl-PL"/>
+                </a:p>
+              </c:txPr>
+              <c:dLblPos val="outEnd"/>
+              <c:showLegendKey val="0"/>
+              <c:showVal val="0"/>
+              <c:showCatName val="1"/>
+              <c:showSerName val="0"/>
+              <c:showPercent val="0"/>
+              <c:showBubbleSize val="0"/>
+              <c:extLst>
+                <c:ext xmlns:c16="http://schemas.microsoft.com/office/drawing/2014/chart" uri="{C3380CC4-5D6E-409C-BE32-E72D297353CC}">
+                  <c16:uniqueId val="{00000008-61BA-459E-AE48-A6D322A1F25E}"/>
+                </c:ext>
+              </c:extLst>
+            </c:dLbl>
+            <c:dLblPos val="outEnd"/>
+            <c:showLegendKey val="0"/>
+            <c:showVal val="0"/>
+            <c:showCatName val="1"/>
+            <c:showSerName val="0"/>
+            <c:showPercent val="0"/>
+            <c:showBubbleSize val="0"/>
+            <c:showLeaderLines val="1"/>
+            <c:leaderLines>
+              <c:spPr>
+                <a:ln w="9525" cap="flat" cmpd="sng" algn="ctr">
+                  <a:solidFill>
+                    <a:schemeClr val="tx1">
+                      <a:lumMod val="35000"/>
+                      <a:lumOff val="65000"/>
+                    </a:schemeClr>
+                  </a:solidFill>
+                  <a:round/>
+                </a:ln>
+                <a:effectLst/>
+              </c:spPr>
+            </c:leaderLines>
+            <c:extLst>
+              <c:ext xmlns:c15="http://schemas.microsoft.com/office/drawing/2012/chart" uri="{CE6537A1-D6FC-4f65-9D91-7224C49458BB}"/>
+            </c:extLst>
+          </c:dLbls>
+          <c:cat>
+            <c:strRef>
+              <c:f>Arkusz1!$A$2:$A$5</c:f>
+              <c:strCache>
+                <c:ptCount val="4"/>
+                <c:pt idx="0">
+                  <c:v>Usługi 53,9%</c:v>
+                </c:pt>
+                <c:pt idx="1">
+                  <c:v>Handel 20,9%</c:v>
+                </c:pt>
+                <c:pt idx="2">
+                  <c:v>Budownictwo 15,6%</c:v>
+                </c:pt>
+                <c:pt idx="3">
+                  <c:v>Przemysł 9,6%</c:v>
+                </c:pt>
+              </c:strCache>
+            </c:strRef>
+          </c:cat>
+          <c:val>
+            <c:numRef>
+              <c:f>Arkusz1!$B$2:$B$5</c:f>
+              <c:numCache>
+                <c:formatCode>General</c:formatCode>
+                <c:ptCount val="4"/>
+                <c:pt idx="0">
+                  <c:v>53.9</c:v>
+                </c:pt>
+                <c:pt idx="1">
+                  <c:v>20.9</c:v>
+                </c:pt>
+                <c:pt idx="2">
+                  <c:v>15.6</c:v>
+                </c:pt>
+                <c:pt idx="3">
+                  <c:v>9.6</c:v>
+                </c:pt>
+              </c:numCache>
+            </c:numRef>
+          </c:val>
+          <c:extLst>
+            <c:ext xmlns:c16="http://schemas.microsoft.com/office/drawing/2014/chart" uri="{C3380CC4-5D6E-409C-BE32-E72D297353CC}">
+              <c16:uniqueId val="{00000000-61BA-459E-AE48-A6D322A1F25E}"/>
+            </c:ext>
+          </c:extLst>
+        </c:ser>
+        <c:dLbls>
+          <c:dLblPos val="outEnd"/>
+          <c:showLegendKey val="0"/>
+          <c:showVal val="0"/>
+          <c:showCatName val="1"/>
+          <c:showSerName val="0"/>
+          <c:showPercent val="0"/>
+          <c:showBubbleSize val="0"/>
+          <c:showLeaderLines val="1"/>
+        </c:dLbls>
+        <c:firstSliceAng val="0"/>
+      </c:pieChart>
+      <c:spPr>
+        <a:noFill/>
+        <a:ln>
+          <a:noFill/>
+        </a:ln>
+        <a:effectLst/>
+      </c:spPr>
+    </c:plotArea>
+    <c:plotVisOnly val="1"/>
+    <c:dispBlanksAs val="gap"/>
+    <c:extLst>
+      <c:ext xmlns:c16r3="http://schemas.microsoft.com/office/drawing/2017/03/chart" uri="{56B9EC1D-385E-4148-901F-78D8002777C0}">
+        <c16r3:dataDisplayOptions16>
+          <c16r3:dispNaAsBlank val="1"/>
+        </c16r3:dataDisplayOptions16>
+      </c:ext>
+    </c:extLst>
+    <c:showDLblsOverMax val="0"/>
+  </c:chart>
+  <c:spPr>
+    <a:noFill/>
+    <a:ln>
+      <a:noFill/>
+    </a:ln>
+    <a:effectLst/>
+  </c:spPr>
+  <c:txPr>
+    <a:bodyPr/>
+    <a:lstStyle/>
+    <a:p>
+      <a:pPr>
+        <a:defRPr/>
+      </a:pPr>
+      <a:endParaRPr lang="pl-PL"/>
+    </a:p>
+  </c:txPr>
+  <c:externalData r:id="rId3">
+    <c:autoUpdate val="0"/>
+  </c:externalData>
+</c:chartSpace>
+</file>
+
+<file path=ppt/charts/chart2.xml><?xml version="1.0" encoding="utf-8"?>
+<c:chartSpace xmlns:c="http://schemas.openxmlformats.org/drawingml/2006/chart" xmlns:a="http://schemas.openxmlformats.org/drawingml/2006/main" xmlns:r="http://schemas.openxmlformats.org/officeDocument/2006/relationships" xmlns:c16r2="http://schemas.microsoft.com/office/drawing/2015/06/chart">
+  <c:date1904 val="0"/>
+  <c:lang val="pl-PL"/>
+  <c:roundedCorners val="0"/>
+  <mc:AlternateContent xmlns:mc="http://schemas.openxmlformats.org/markup-compatibility/2006">
+    <mc:Choice xmlns:c14="http://schemas.microsoft.com/office/drawing/2007/8/2/chart" Requires="c14">
+      <c14:style val="102"/>
+    </mc:Choice>
+    <mc:Fallback>
+      <c:style val="2"/>
+    </mc:Fallback>
+  </mc:AlternateContent>
+  <c:chart>
+    <c:title>
+      <c:tx>
+        <c:rich>
+          <a:bodyPr rot="0" spcFirstLastPara="1" vertOverflow="ellipsis" vert="horz" wrap="square" anchor="ctr" anchorCtr="1"/>
+          <a:lstStyle/>
+          <a:p>
+            <a:pPr>
+              <a:defRPr lang="en-US" sz="2128" b="1" i="0" u="none" strike="noStrike" kern="1200" cap="all" baseline="0">
+                <a:solidFill>
+                  <a:schemeClr val="tx1">
+                    <a:lumMod val="65000"/>
+                    <a:lumOff val="35000"/>
+                  </a:schemeClr>
+                </a:solidFill>
+                <a:latin typeface="+mn-lt"/>
+                <a:ea typeface="+mn-ea"/>
+                <a:cs typeface="+mn-cs"/>
+              </a:defRPr>
+            </a:pPr>
+            <a:r>
+              <a:rPr lang="pl-PL"/>
+              <a:t>Duże Firmy</a:t>
+            </a:r>
+            <a:endParaRPr lang="en-US"/>
+          </a:p>
+        </c:rich>
+      </c:tx>
+      <c:overlay val="0"/>
+      <c:spPr>
+        <a:noFill/>
+        <a:ln>
+          <a:noFill/>
+        </a:ln>
+        <a:effectLst/>
+      </c:spPr>
+      <c:txPr>
+        <a:bodyPr rot="0" spcFirstLastPara="1" vertOverflow="ellipsis" vert="horz" wrap="square" anchor="ctr" anchorCtr="1"/>
+        <a:lstStyle/>
+        <a:p>
+          <a:pPr>
+            <a:defRPr lang="en-US" sz="2128" b="1" i="0" u="none" strike="noStrike" kern="1200" cap="all" baseline="0">
+              <a:solidFill>
+                <a:schemeClr val="tx1">
+                  <a:lumMod val="65000"/>
+                  <a:lumOff val="35000"/>
+                </a:schemeClr>
+              </a:solidFill>
+              <a:latin typeface="+mn-lt"/>
+              <a:ea typeface="+mn-ea"/>
+              <a:cs typeface="+mn-cs"/>
+            </a:defRPr>
+          </a:pPr>
+          <a:endParaRPr lang="pl-PL"/>
+        </a:p>
+      </c:txPr>
+    </c:title>
+    <c:autoTitleDeleted val="0"/>
+    <c:plotArea>
+      <c:layout/>
+      <c:pieChart>
+        <c:varyColors val="1"/>
+        <c:ser>
+          <c:idx val="0"/>
+          <c:order val="0"/>
+          <c:tx>
+            <c:strRef>
+              <c:f>Arkusz1!$B$1</c:f>
+              <c:strCache>
+                <c:ptCount val="1"/>
+                <c:pt idx="0">
+                  <c:v>MSP</c:v>
+                </c:pt>
+              </c:strCache>
+            </c:strRef>
+          </c:tx>
+          <c:dPt>
+            <c:idx val="0"/>
+            <c:bubble3D val="0"/>
+            <c:spPr>
+              <a:solidFill>
+                <a:schemeClr val="accent1"/>
+              </a:solidFill>
+              <a:ln>
+                <a:noFill/>
+              </a:ln>
+              <a:effectLst>
+                <a:outerShdw blurRad="63500" sx="102000" sy="102000" algn="ctr" rotWithShape="0">
+                  <a:prstClr val="black">
+                    <a:alpha val="20000"/>
+                  </a:prstClr>
+                </a:outerShdw>
+              </a:effectLst>
+            </c:spPr>
+            <c:extLst>
+              <c:ext xmlns:c16="http://schemas.microsoft.com/office/drawing/2014/chart" uri="{C3380CC4-5D6E-409C-BE32-E72D297353CC}">
+                <c16:uniqueId val="{00000001-F8E4-4C10-B8EB-BF9230864348}"/>
+              </c:ext>
+            </c:extLst>
+          </c:dPt>
+          <c:dPt>
+            <c:idx val="1"/>
+            <c:bubble3D val="0"/>
+            <c:spPr>
+              <a:solidFill>
+                <a:schemeClr val="accent2"/>
+              </a:solidFill>
+              <a:ln>
+                <a:noFill/>
+              </a:ln>
+              <a:effectLst>
+                <a:outerShdw blurRad="63500" sx="102000" sy="102000" algn="ctr" rotWithShape="0">
+                  <a:prstClr val="black">
+                    <a:alpha val="20000"/>
+                  </a:prstClr>
+                </a:outerShdw>
+              </a:effectLst>
+            </c:spPr>
+            <c:extLst>
+              <c:ext xmlns:c16="http://schemas.microsoft.com/office/drawing/2014/chart" uri="{C3380CC4-5D6E-409C-BE32-E72D297353CC}">
+                <c16:uniqueId val="{00000003-F8E4-4C10-B8EB-BF9230864348}"/>
+              </c:ext>
+            </c:extLst>
+          </c:dPt>
+          <c:dPt>
+            <c:idx val="2"/>
+            <c:bubble3D val="0"/>
+            <c:spPr>
+              <a:solidFill>
+                <a:schemeClr val="accent3"/>
+              </a:solidFill>
+              <a:ln>
+                <a:noFill/>
+              </a:ln>
+              <a:effectLst>
+                <a:outerShdw blurRad="63500" sx="102000" sy="102000" algn="ctr" rotWithShape="0">
+                  <a:prstClr val="black">
+                    <a:alpha val="20000"/>
+                  </a:prstClr>
+                </a:outerShdw>
+              </a:effectLst>
+            </c:spPr>
+            <c:extLst>
+              <c:ext xmlns:c16="http://schemas.microsoft.com/office/drawing/2014/chart" uri="{C3380CC4-5D6E-409C-BE32-E72D297353CC}">
+                <c16:uniqueId val="{00000005-F8E4-4C10-B8EB-BF9230864348}"/>
+              </c:ext>
+            </c:extLst>
+          </c:dPt>
+          <c:dPt>
+            <c:idx val="3"/>
+            <c:bubble3D val="0"/>
+            <c:spPr>
+              <a:solidFill>
+                <a:schemeClr val="accent4"/>
+              </a:solidFill>
+              <a:ln>
+                <a:noFill/>
+              </a:ln>
+              <a:effectLst>
+                <a:outerShdw blurRad="63500" sx="102000" sy="102000" algn="ctr" rotWithShape="0">
+                  <a:prstClr val="black">
+                    <a:alpha val="20000"/>
+                  </a:prstClr>
+                </a:outerShdw>
+              </a:effectLst>
+            </c:spPr>
+            <c:extLst>
+              <c:ext xmlns:c16="http://schemas.microsoft.com/office/drawing/2014/chart" uri="{C3380CC4-5D6E-409C-BE32-E72D297353CC}">
+                <c16:uniqueId val="{00000007-F8E4-4C10-B8EB-BF9230864348}"/>
+              </c:ext>
+            </c:extLst>
+          </c:dPt>
+          <c:dLbls>
+            <c:dLbl>
+              <c:idx val="0"/>
+              <c:spPr>
+                <a:noFill/>
+                <a:ln>
+                  <a:noFill/>
+                </a:ln>
+                <a:effectLst/>
+              </c:spPr>
+              <c:txPr>
+                <a:bodyPr rot="0" spcFirstLastPara="1" vertOverflow="ellipsis" vert="horz" wrap="square" anchor="ctr" anchorCtr="1"/>
+                <a:lstStyle/>
+                <a:p>
+                  <a:pPr>
+                    <a:defRPr lang="en-US" sz="1330" b="1" i="0" u="none" strike="noStrike" kern="1200" spc="0" baseline="0">
+                      <a:solidFill>
+                        <a:schemeClr val="accent1"/>
+                      </a:solidFill>
+                      <a:latin typeface="+mn-lt"/>
+                      <a:ea typeface="+mn-ea"/>
+                      <a:cs typeface="+mn-cs"/>
+                    </a:defRPr>
+                  </a:pPr>
+                  <a:endParaRPr lang="pl-PL"/>
+                </a:p>
+              </c:txPr>
+              <c:dLblPos val="outEnd"/>
+              <c:showLegendKey val="0"/>
+              <c:showVal val="0"/>
+              <c:showCatName val="1"/>
+              <c:showSerName val="0"/>
+              <c:showPercent val="0"/>
+              <c:showBubbleSize val="0"/>
+              <c:extLst>
+                <c:ext xmlns:c16="http://schemas.microsoft.com/office/drawing/2014/chart" uri="{C3380CC4-5D6E-409C-BE32-E72D297353CC}">
+                  <c16:uniqueId val="{00000001-F8E4-4C10-B8EB-BF9230864348}"/>
+                </c:ext>
+              </c:extLst>
+            </c:dLbl>
+            <c:dLbl>
+              <c:idx val="1"/>
+              <c:spPr>
+                <a:noFill/>
+                <a:ln>
+                  <a:noFill/>
+                </a:ln>
+                <a:effectLst/>
+              </c:spPr>
+              <c:txPr>
+                <a:bodyPr rot="0" spcFirstLastPara="1" vertOverflow="ellipsis" vert="horz" wrap="square" anchor="ctr" anchorCtr="1"/>
+                <a:lstStyle/>
+                <a:p>
+                  <a:pPr>
+                    <a:defRPr lang="en-US" sz="1330" b="1" i="0" u="none" strike="noStrike" kern="1200" spc="0" baseline="0">
+                      <a:solidFill>
+                        <a:schemeClr val="accent2"/>
+                      </a:solidFill>
+                      <a:latin typeface="+mn-lt"/>
+                      <a:ea typeface="+mn-ea"/>
+                      <a:cs typeface="+mn-cs"/>
+                    </a:defRPr>
+                  </a:pPr>
+                  <a:endParaRPr lang="pl-PL"/>
+                </a:p>
+              </c:txPr>
+              <c:dLblPos val="outEnd"/>
+              <c:showLegendKey val="0"/>
+              <c:showVal val="0"/>
+              <c:showCatName val="1"/>
+              <c:showSerName val="0"/>
+              <c:showPercent val="0"/>
+              <c:showBubbleSize val="0"/>
+              <c:extLst>
+                <c:ext xmlns:c16="http://schemas.microsoft.com/office/drawing/2014/chart" uri="{C3380CC4-5D6E-409C-BE32-E72D297353CC}">
+                  <c16:uniqueId val="{00000003-F8E4-4C10-B8EB-BF9230864348}"/>
+                </c:ext>
+              </c:extLst>
+            </c:dLbl>
+            <c:dLbl>
+              <c:idx val="2"/>
+              <c:spPr>
+                <a:noFill/>
+                <a:ln>
+                  <a:noFill/>
+                </a:ln>
+                <a:effectLst/>
+              </c:spPr>
+              <c:txPr>
+                <a:bodyPr rot="0" spcFirstLastPara="1" vertOverflow="ellipsis" vert="horz" wrap="square" anchor="ctr" anchorCtr="1"/>
+                <a:lstStyle/>
+                <a:p>
+                  <a:pPr>
+                    <a:defRPr lang="en-US" sz="1330" b="1" i="0" u="none" strike="noStrike" kern="1200" spc="0" baseline="0">
+                      <a:solidFill>
+                        <a:schemeClr val="accent3"/>
+                      </a:solidFill>
+                      <a:latin typeface="+mn-lt"/>
+                      <a:ea typeface="+mn-ea"/>
+                      <a:cs typeface="+mn-cs"/>
+                    </a:defRPr>
+                  </a:pPr>
+                  <a:endParaRPr lang="pl-PL"/>
+                </a:p>
+              </c:txPr>
+              <c:dLblPos val="outEnd"/>
+              <c:showLegendKey val="0"/>
+              <c:showVal val="0"/>
+              <c:showCatName val="1"/>
+              <c:showSerName val="0"/>
+              <c:showPercent val="0"/>
+              <c:showBubbleSize val="0"/>
+              <c:extLst>
+                <c:ext xmlns:c16="http://schemas.microsoft.com/office/drawing/2014/chart" uri="{C3380CC4-5D6E-409C-BE32-E72D297353CC}">
+                  <c16:uniqueId val="{00000005-F8E4-4C10-B8EB-BF9230864348}"/>
+                </c:ext>
+              </c:extLst>
+            </c:dLbl>
+            <c:dLbl>
+              <c:idx val="3"/>
+              <c:spPr>
+                <a:noFill/>
+                <a:ln>
+                  <a:noFill/>
+                </a:ln>
+                <a:effectLst/>
+              </c:spPr>
+              <c:txPr>
+                <a:bodyPr rot="0" spcFirstLastPara="1" vertOverflow="ellipsis" vert="horz" wrap="square" anchor="ctr" anchorCtr="1"/>
+                <a:lstStyle/>
+                <a:p>
+                  <a:pPr>
+                    <a:defRPr lang="en-US" sz="1330" b="1" i="0" u="none" strike="noStrike" kern="1200" spc="0" baseline="0">
+                      <a:solidFill>
+                        <a:schemeClr val="accent4"/>
+                      </a:solidFill>
+                      <a:latin typeface="+mn-lt"/>
+                      <a:ea typeface="+mn-ea"/>
+                      <a:cs typeface="+mn-cs"/>
+                    </a:defRPr>
+                  </a:pPr>
+                  <a:endParaRPr lang="pl-PL"/>
+                </a:p>
+              </c:txPr>
+              <c:dLblPos val="outEnd"/>
+              <c:showLegendKey val="0"/>
+              <c:showVal val="0"/>
+              <c:showCatName val="1"/>
+              <c:showSerName val="0"/>
+              <c:showPercent val="0"/>
+              <c:showBubbleSize val="0"/>
+              <c:extLst>
+                <c:ext xmlns:c16="http://schemas.microsoft.com/office/drawing/2014/chart" uri="{C3380CC4-5D6E-409C-BE32-E72D297353CC}">
+                  <c16:uniqueId val="{00000007-F8E4-4C10-B8EB-BF9230864348}"/>
+                </c:ext>
+              </c:extLst>
+            </c:dLbl>
+            <c:spPr>
+              <a:noFill/>
+              <a:ln>
+                <a:noFill/>
+              </a:ln>
+              <a:effectLst/>
+            </c:spPr>
+            <c:dLblPos val="outEnd"/>
+            <c:showLegendKey val="0"/>
+            <c:showVal val="0"/>
+            <c:showCatName val="1"/>
+            <c:showSerName val="0"/>
+            <c:showPercent val="0"/>
+            <c:showBubbleSize val="0"/>
+            <c:showLeaderLines val="1"/>
+            <c:leaderLines>
+              <c:spPr>
+                <a:ln w="9525" cap="flat" cmpd="sng" algn="ctr">
+                  <a:solidFill>
+                    <a:schemeClr val="tx1">
+                      <a:lumMod val="35000"/>
+                      <a:lumOff val="65000"/>
+                    </a:schemeClr>
+                  </a:solidFill>
+                  <a:round/>
+                </a:ln>
+                <a:effectLst/>
+              </c:spPr>
+            </c:leaderLines>
+            <c:extLst>
+              <c:ext xmlns:c15="http://schemas.microsoft.com/office/drawing/2012/chart" uri="{CE6537A1-D6FC-4f65-9D91-7224C49458BB}"/>
+            </c:extLst>
+          </c:dLbls>
+          <c:cat>
+            <c:strRef>
+              <c:f>Arkusz1!$A$2:$A$5</c:f>
+              <c:strCache>
+                <c:ptCount val="4"/>
+                <c:pt idx="0">
+                  <c:v>Usługi 32%</c:v>
+                </c:pt>
+                <c:pt idx="1">
+                  <c:v>Handel 13,6%</c:v>
+                </c:pt>
+                <c:pt idx="2">
+                  <c:v>Budownictwo 3,3%</c:v>
+                </c:pt>
+                <c:pt idx="3">
+                  <c:v>Przemysł 51,1%</c:v>
+                </c:pt>
+              </c:strCache>
+            </c:strRef>
+          </c:cat>
+          <c:val>
+            <c:numRef>
+              <c:f>Arkusz1!$B$2:$B$5</c:f>
+              <c:numCache>
+                <c:formatCode>General</c:formatCode>
+                <c:ptCount val="4"/>
+                <c:pt idx="0">
+                  <c:v>32</c:v>
+                </c:pt>
+                <c:pt idx="1">
+                  <c:v>13.6</c:v>
+                </c:pt>
+                <c:pt idx="2">
+                  <c:v>3.3</c:v>
+                </c:pt>
+                <c:pt idx="3">
+                  <c:v>51.1</c:v>
+                </c:pt>
+              </c:numCache>
+            </c:numRef>
+          </c:val>
+          <c:extLst>
+            <c:ext xmlns:c16="http://schemas.microsoft.com/office/drawing/2014/chart" uri="{C3380CC4-5D6E-409C-BE32-E72D297353CC}">
+              <c16:uniqueId val="{00000008-F8E4-4C10-B8EB-BF9230864348}"/>
+            </c:ext>
+          </c:extLst>
+        </c:ser>
+        <c:dLbls>
+          <c:dLblPos val="outEnd"/>
+          <c:showLegendKey val="0"/>
+          <c:showVal val="0"/>
+          <c:showCatName val="1"/>
+          <c:showSerName val="0"/>
+          <c:showPercent val="0"/>
+          <c:showBubbleSize val="0"/>
+          <c:showLeaderLines val="1"/>
+        </c:dLbls>
+        <c:firstSliceAng val="0"/>
+      </c:pieChart>
+      <c:spPr>
+        <a:noFill/>
+        <a:ln>
+          <a:noFill/>
+        </a:ln>
+        <a:effectLst/>
+      </c:spPr>
+    </c:plotArea>
+    <c:plotVisOnly val="1"/>
+    <c:dispBlanksAs val="gap"/>
+    <c:extLst>
+      <c:ext xmlns:c16r3="http://schemas.microsoft.com/office/drawing/2017/03/chart" uri="{56B9EC1D-385E-4148-901F-78D8002777C0}">
+        <c16r3:dataDisplayOptions16>
+          <c16r3:dispNaAsBlank val="1"/>
+        </c16r3:dataDisplayOptions16>
+      </c:ext>
+    </c:extLst>
+    <c:showDLblsOverMax val="0"/>
+  </c:chart>
+  <c:spPr>
+    <a:noFill/>
+    <a:ln>
+      <a:noFill/>
+    </a:ln>
+    <a:effectLst/>
+  </c:spPr>
+  <c:txPr>
+    <a:bodyPr/>
+    <a:lstStyle/>
+    <a:p>
+      <a:pPr>
+        <a:defRPr lang="en-US"/>
+      </a:pPr>
+      <a:endParaRPr lang="pl-PL"/>
+    </a:p>
+  </c:txPr>
+  <c:externalData r:id="rId3">
+    <c:autoUpdate val="0"/>
+  </c:externalData>
+</c:chartSpace>
+</file>
+
+<file path=ppt/charts/colors1.xml><?xml version="1.0" encoding="utf-8"?>
+<cs:colorStyle xmlns:cs="http://schemas.microsoft.com/office/drawing/2012/chartStyle" xmlns:a="http://schemas.openxmlformats.org/drawingml/2006/main" meth="cycle" id="10">
+  <a:schemeClr val="accent1"/>
+  <a:schemeClr val="accent2"/>
+  <a:schemeClr val="accent3"/>
+  <a:schemeClr val="accent4"/>
+  <a:schemeClr val="accent5"/>
+  <a:schemeClr val="accent6"/>
+  <cs:variation/>
+  <cs:variation>
+    <a:lumMod val="60000"/>
+  </cs:variation>
+  <cs:variation>
+    <a:lumMod val="80000"/>
+    <a:lumOff val="20000"/>
+  </cs:variation>
+  <cs:variation>
+    <a:lumMod val="80000"/>
+  </cs:variation>
+  <cs:variation>
+    <a:lumMod val="60000"/>
+    <a:lumOff val="40000"/>
+  </cs:variation>
+  <cs:variation>
+    <a:lumMod val="50000"/>
+  </cs:variation>
+  <cs:variation>
+    <a:lumMod val="70000"/>
+    <a:lumOff val="30000"/>
+  </cs:variation>
+  <cs:variation>
+    <a:lumMod val="70000"/>
+  </cs:variation>
+  <cs:variation>
+    <a:lumMod val="50000"/>
+    <a:lumOff val="50000"/>
+  </cs:variation>
+</cs:colorStyle>
+</file>
+
+<file path=ppt/charts/colors2.xml><?xml version="1.0" encoding="utf-8"?>
+<cs:colorStyle xmlns:cs="http://schemas.microsoft.com/office/drawing/2012/chartStyle" xmlns:a="http://schemas.openxmlformats.org/drawingml/2006/main" meth="cycle" id="10">
+  <a:schemeClr val="accent1"/>
+  <a:schemeClr val="accent2"/>
+  <a:schemeClr val="accent3"/>
+  <a:schemeClr val="accent4"/>
+  <a:schemeClr val="accent5"/>
+  <a:schemeClr val="accent6"/>
+  <cs:variation/>
+  <cs:variation>
+    <a:lumMod val="60000"/>
+  </cs:variation>
+  <cs:variation>
+    <a:lumMod val="80000"/>
+    <a:lumOff val="20000"/>
+  </cs:variation>
+  <cs:variation>
+    <a:lumMod val="80000"/>
+  </cs:variation>
+  <cs:variation>
+    <a:lumMod val="60000"/>
+    <a:lumOff val="40000"/>
+  </cs:variation>
+  <cs:variation>
+    <a:lumMod val="50000"/>
+  </cs:variation>
+  <cs:variation>
+    <a:lumMod val="70000"/>
+    <a:lumOff val="30000"/>
+  </cs:variation>
+  <cs:variation>
+    <a:lumMod val="70000"/>
+  </cs:variation>
+  <cs:variation>
+    <a:lumMod val="50000"/>
+    <a:lumOff val="50000"/>
+  </cs:variation>
+</cs:colorStyle>
+</file>
+
+<file path=ppt/charts/style1.xml><?xml version="1.0" encoding="utf-8"?>
+<cs:chartStyle xmlns:cs="http://schemas.microsoft.com/office/drawing/2012/chartStyle" xmlns:a="http://schemas.openxmlformats.org/drawingml/2006/main" id="259">
+  <cs:axisTitle>
+    <cs:lnRef idx="0"/>
+    <cs:fillRef idx="0"/>
+    <cs:effectRef idx="0"/>
+    <cs:fontRef idx="minor">
+      <a:schemeClr val="tx1">
+        <a:lumMod val="65000"/>
+        <a:lumOff val="35000"/>
+      </a:schemeClr>
+    </cs:fontRef>
+    <cs:defRPr sz="1197" kern="1200" cap="all"/>
+  </cs:axisTitle>
+  <cs:categoryAxis>
+    <cs:lnRef idx="0"/>
+    <cs:fillRef idx="0"/>
+    <cs:effectRef idx="0"/>
+    <cs:fontRef idx="minor">
+      <a:schemeClr val="tx1">
+        <a:lumMod val="65000"/>
+        <a:lumOff val="35000"/>
+      </a:schemeClr>
+    </cs:fontRef>
+    <cs:defRPr sz="1197" kern="1200"/>
+  </cs:categoryAxis>
+  <cs:chartArea mods="allowNoFillOverride allowNoLineOverride">
+    <cs:lnRef idx="0"/>
+    <cs:fillRef idx="0"/>
+    <cs:effectRef idx="0"/>
+    <cs:fontRef idx="minor">
+      <a:schemeClr val="tx1"/>
+    </cs:fontRef>
+    <cs:spPr>
+      <a:solidFill>
+        <a:schemeClr val="bg1"/>
+      </a:solidFill>
+      <a:ln w="9525" cap="flat" cmpd="sng" algn="ctr">
+        <a:solidFill>
+          <a:schemeClr val="tx1">
+            <a:lumMod val="15000"/>
+            <a:lumOff val="85000"/>
+          </a:schemeClr>
+        </a:solidFill>
+        <a:round/>
+      </a:ln>
+    </cs:spPr>
+    <cs:defRPr sz="1330" kern="1200"/>
+  </cs:chartArea>
+  <cs:dataLabel>
+    <cs:lnRef idx="0"/>
+    <cs:fillRef idx="0"/>
+    <cs:effectRef idx="0"/>
+    <cs:fontRef idx="minor">
+      <cs:styleClr val="auto"/>
+    </cs:fontRef>
+    <cs:defRPr sz="1330" b="1" i="0" u="none" strike="noStrike" kern="1200" spc="0" baseline="0"/>
+  </cs:dataLabel>
+  <cs:dataLabelCallout>
+    <cs:lnRef idx="0">
+      <cs:styleClr val="auto"/>
+    </cs:lnRef>
+    <cs:fillRef idx="0"/>
+    <cs:effectRef idx="0"/>
+    <cs:fontRef idx="minor">
+      <cs:styleClr val="auto"/>
+    </cs:fontRef>
+    <cs:spPr>
+      <a:solidFill>
+        <a:schemeClr val="lt1"/>
+      </a:solidFill>
+      <a:ln>
+        <a:solidFill>
+          <a:schemeClr val="phClr"/>
+        </a:solidFill>
+      </a:ln>
+    </cs:spPr>
+    <cs:defRPr sz="1330" b="1" kern="1200"/>
+    <cs:bodyPr rot="0" spcFirstLastPara="1" vertOverflow="clip" horzOverflow="clip" vert="horz" wrap="square" lIns="36576" tIns="18288" rIns="36576" bIns="18288" anchor="ctr" anchorCtr="1">
+      <a:spAutoFit/>
+    </cs:bodyPr>
+  </cs:dataLabelCallout>
+  <cs:dataPoint>
+    <cs:lnRef idx="0"/>
+    <cs:fillRef idx="0">
+      <cs:styleClr val="auto"/>
+    </cs:fillRef>
+    <cs:effectRef idx="0"/>
+    <cs:fontRef idx="minor">
+      <a:schemeClr val="dk1"/>
+    </cs:fontRef>
+    <cs:spPr>
+      <a:solidFill>
+        <a:schemeClr val="phClr"/>
+      </a:solidFill>
+      <a:effectLst>
+        <a:outerShdw blurRad="63500" sx="102000" sy="102000" algn="ctr" rotWithShape="0">
+          <a:prstClr val="black">
+            <a:alpha val="20000"/>
+          </a:prstClr>
+        </a:outerShdw>
+      </a:effectLst>
+    </cs:spPr>
+  </cs:dataPoint>
+  <cs:dataPoint3D>
+    <cs:lnRef idx="0"/>
+    <cs:fillRef idx="0">
+      <cs:styleClr val="auto"/>
+    </cs:fillRef>
+    <cs:effectRef idx="0"/>
+    <cs:fontRef idx="minor">
+      <a:schemeClr val="dk1"/>
+    </cs:fontRef>
+    <cs:spPr>
+      <a:solidFill>
+        <a:schemeClr val="phClr"/>
+      </a:solidFill>
+      <a:effectLst>
+        <a:outerShdw blurRad="88900" sx="102000" sy="102000" algn="ctr" rotWithShape="0">
+          <a:prstClr val="black">
+            <a:alpha val="10000"/>
+          </a:prstClr>
+        </a:outerShdw>
+      </a:effectLst>
+      <a:scene3d>
+        <a:camera prst="orthographicFront"/>
+        <a:lightRig rig="threePt" dir="t"/>
+      </a:scene3d>
+      <a:sp3d>
+        <a:bevelT w="127000" h="127000"/>
+        <a:bevelB w="127000" h="127000"/>
+      </a:sp3d>
+    </cs:spPr>
+  </cs:dataPoint3D>
+  <cs:dataPointLine>
+    <cs:lnRef idx="0">
+      <cs:styleClr val="auto"/>
+    </cs:lnRef>
+    <cs:fillRef idx="0"/>
+    <cs:effectRef idx="0"/>
+    <cs:fontRef idx="minor">
+      <a:schemeClr val="dk1"/>
+    </cs:fontRef>
+    <cs:spPr>
+      <a:ln w="28575" cap="rnd">
+        <a:solidFill>
+          <a:schemeClr val="phClr"/>
+        </a:solidFill>
+        <a:round/>
+      </a:ln>
+    </cs:spPr>
+  </cs:dataPointLine>
+  <cs:dataPointMarker>
+    <cs:lnRef idx="0"/>
+    <cs:fillRef idx="0">
+      <cs:styleClr val="auto"/>
+    </cs:fillRef>
+    <cs:effectRef idx="0"/>
+    <cs:fontRef idx="minor">
+      <a:schemeClr val="dk1"/>
+    </cs:fontRef>
+    <cs:spPr>
+      <a:solidFill>
+        <a:schemeClr val="phClr"/>
+      </a:solidFill>
+      <a:ln w="9525">
+        <a:solidFill>
+          <a:schemeClr val="lt1"/>
+        </a:solidFill>
+      </a:ln>
+    </cs:spPr>
+  </cs:dataPointMarker>
+  <cs:dataPointMarkerLayout symbol="circle" size="6"/>
+  <cs:dataPointWireframe>
+    <cs:lnRef idx="0">
+      <cs:styleClr val="auto"/>
+    </cs:lnRef>
+    <cs:fillRef idx="0"/>
+    <cs:effectRef idx="0"/>
+    <cs:fontRef idx="minor">
+      <a:schemeClr val="dk1"/>
+    </cs:fontRef>
+    <cs:spPr>
+      <a:ln w="9525" cap="rnd">
+        <a:solidFill>
+          <a:schemeClr val="phClr"/>
+        </a:solidFill>
+        <a:round/>
+      </a:ln>
+    </cs:spPr>
+  </cs:dataPointWireframe>
+  <cs:dataTable>
+    <cs:lnRef idx="0"/>
+    <cs:fillRef idx="0"/>
+    <cs:effectRef idx="0"/>
+    <cs:fontRef idx="minor">
+      <a:schemeClr val="tx1">
+        <a:lumMod val="65000"/>
+        <a:lumOff val="35000"/>
+      </a:schemeClr>
+    </cs:fontRef>
+    <cs:spPr>
+      <a:noFill/>
+      <a:ln w="9525" cap="flat" cmpd="sng" algn="ctr">
+        <a:solidFill>
+          <a:schemeClr val="tx1">
+            <a:lumMod val="15000"/>
+            <a:lumOff val="85000"/>
+          </a:schemeClr>
+        </a:solidFill>
+        <a:round/>
+      </a:ln>
+    </cs:spPr>
+    <cs:defRPr sz="1197" kern="1200"/>
+  </cs:dataTable>
+  <cs:downBar>
+    <cs:lnRef idx="0"/>
+    <cs:fillRef idx="0"/>
+    <cs:effectRef idx="0"/>
+    <cs:fontRef idx="minor">
+      <a:schemeClr val="tx1"/>
+    </cs:fontRef>
+    <cs:spPr>
+      <a:solidFill>
+        <a:schemeClr val="dk1">
+          <a:lumMod val="75000"/>
+          <a:lumOff val="25000"/>
+        </a:schemeClr>
+      </a:solidFill>
+      <a:ln w="9525" cap="flat" cmpd="sng" algn="ctr">
+        <a:solidFill>
+          <a:schemeClr val="tx1">
+            <a:lumMod val="65000"/>
+            <a:lumOff val="35000"/>
+          </a:schemeClr>
+        </a:solidFill>
+        <a:round/>
+      </a:ln>
+    </cs:spPr>
+  </cs:downBar>
+  <cs:dropLine>
+    <cs:lnRef idx="0"/>
+    <cs:fillRef idx="0"/>
+    <cs:effectRef idx="0"/>
+    <cs:fontRef idx="minor">
+      <a:schemeClr val="tx1"/>
+    </cs:fontRef>
+    <cs:spPr>
+      <a:ln w="9525" cap="flat" cmpd="sng" algn="ctr">
+        <a:solidFill>
+          <a:schemeClr val="tx1">
+            <a:lumMod val="35000"/>
+            <a:lumOff val="65000"/>
+          </a:schemeClr>
+        </a:solidFill>
+        <a:round/>
+      </a:ln>
+    </cs:spPr>
+  </cs:dropLine>
+  <cs:errorBar>
+    <cs:lnRef idx="0"/>
+    <cs:fillRef idx="0"/>
+    <cs:effectRef idx="0"/>
+    <cs:fontRef idx="minor">
+      <a:schemeClr val="tx1"/>
+    </cs:fontRef>
+    <cs:spPr>
+      <a:ln w="9525" cap="flat" cmpd="sng" algn="ctr">
+        <a:solidFill>
+          <a:schemeClr val="tx1">
+            <a:lumMod val="65000"/>
+            <a:lumOff val="35000"/>
+          </a:schemeClr>
+        </a:solidFill>
+        <a:round/>
+      </a:ln>
+    </cs:spPr>
+  </cs:errorBar>
+  <cs:floor>
+    <cs:lnRef idx="0"/>
+    <cs:fillRef idx="0"/>
+    <cs:effectRef idx="0"/>
+    <cs:fontRef idx="minor">
+      <a:schemeClr val="tx1"/>
+    </cs:fontRef>
+    <cs:spPr>
+      <a:noFill/>
+      <a:ln>
+        <a:noFill/>
+      </a:ln>
+    </cs:spPr>
+  </cs:floor>
+  <cs:gridlineMajor>
+    <cs:lnRef idx="0"/>
+    <cs:fillRef idx="0"/>
+    <cs:effectRef idx="0"/>
+    <cs:fontRef idx="minor">
+      <a:schemeClr val="tx1"/>
+    </cs:fontRef>
+    <cs:spPr>
+      <a:ln w="9525" cap="flat" cmpd="sng" algn="ctr">
+        <a:solidFill>
+          <a:schemeClr val="tx1">
+            <a:lumMod val="15000"/>
+            <a:lumOff val="85000"/>
+          </a:schemeClr>
+        </a:solidFill>
+        <a:round/>
+      </a:ln>
+    </cs:spPr>
+  </cs:gridlineMajor>
+  <cs:gridlineMinor>
+    <cs:lnRef idx="0"/>
+    <cs:fillRef idx="0"/>
+    <cs:effectRef idx="0"/>
+    <cs:fontRef idx="minor">
+      <a:schemeClr val="tx1"/>
+    </cs:fontRef>
+    <cs:spPr>
+      <a:ln w="9525" cap="flat" cmpd="sng" algn="ctr">
+        <a:solidFill>
+          <a:schemeClr val="tx1">
+            <a:lumMod val="5000"/>
+            <a:lumOff val="95000"/>
+          </a:schemeClr>
+        </a:solidFill>
+        <a:round/>
+      </a:ln>
+    </cs:spPr>
+  </cs:gridlineMinor>
+  <cs:hiLoLine>
+    <cs:lnRef idx="0"/>
+    <cs:fillRef idx="0"/>
+    <cs:effectRef idx="0"/>
+    <cs:fontRef idx="minor">
+      <a:schemeClr val="tx1"/>
+    </cs:fontRef>
+    <cs:spPr>
+      <a:ln w="9525" cap="flat" cmpd="sng" algn="ctr">
+        <a:solidFill>
+          <a:schemeClr val="tx1">
+            <a:lumMod val="50000"/>
+            <a:lumOff val="50000"/>
+          </a:schemeClr>
+        </a:solidFill>
+        <a:round/>
+      </a:ln>
+    </cs:spPr>
+  </cs:hiLoLine>
+  <cs:leaderLine>
+    <cs:lnRef idx="0"/>
+    <cs:fillRef idx="0"/>
+    <cs:effectRef idx="0"/>
+    <cs:fontRef idx="minor">
+      <a:schemeClr val="tx1"/>
+    </cs:fontRef>
+    <cs:spPr>
+      <a:ln w="9525" cap="flat" cmpd="sng" algn="ctr">
+        <a:solidFill>
+          <a:schemeClr val="tx1">
+            <a:lumMod val="35000"/>
+            <a:lumOff val="65000"/>
+          </a:schemeClr>
+        </a:solidFill>
+        <a:round/>
+      </a:ln>
+    </cs:spPr>
+  </cs:leaderLine>
+  <cs:legend>
+    <cs:lnRef idx="0"/>
+    <cs:fillRef idx="0"/>
+    <cs:effectRef idx="0"/>
+    <cs:fontRef idx="minor">
+      <a:schemeClr val="tx1">
+        <a:lumMod val="65000"/>
+        <a:lumOff val="35000"/>
+      </a:schemeClr>
+    </cs:fontRef>
+    <cs:defRPr sz="1197" kern="1200"/>
+  </cs:legend>
+  <cs:plotArea mods="allowNoFillOverride allowNoLineOverride">
+    <cs:lnRef idx="0"/>
+    <cs:fillRef idx="0"/>
+    <cs:effectRef idx="0"/>
+    <cs:fontRef idx="minor">
+      <a:schemeClr val="dk1"/>
+    </cs:fontRef>
+  </cs:plotArea>
+  <cs:plotArea3D mods="allowNoFillOverride allowNoLineOverride">
+    <cs:lnRef idx="0"/>
+    <cs:fillRef idx="0"/>
+    <cs:effectRef idx="0"/>
+    <cs:fontRef idx="minor">
+      <a:schemeClr val="dk1"/>
+    </cs:fontRef>
+  </cs:plotArea3D>
+  <cs:seriesAxis>
+    <cs:lnRef idx="0"/>
+    <cs:fillRef idx="0"/>
+    <cs:effectRef idx="0"/>
+    <cs:fontRef idx="minor">
+      <a:schemeClr val="tx1">
+        <a:lumMod val="65000"/>
+        <a:lumOff val="35000"/>
+      </a:schemeClr>
+    </cs:fontRef>
+    <cs:defRPr sz="1197" kern="1200"/>
+  </cs:seriesAxis>
+  <cs:seriesLine>
+    <cs:lnRef idx="0"/>
+    <cs:fillRef idx="0"/>
+    <cs:effectRef idx="0"/>
+    <cs:fontRef idx="minor">
+      <a:schemeClr val="tx1"/>
+    </cs:fontRef>
+    <cs:spPr>
+      <a:ln w="9525" cap="flat" cmpd="sng" algn="ctr">
+        <a:solidFill>
+          <a:schemeClr val="tx1">
+            <a:lumMod val="35000"/>
+            <a:lumOff val="65000"/>
+          </a:schemeClr>
+        </a:solidFill>
+        <a:round/>
+      </a:ln>
+    </cs:spPr>
+  </cs:seriesLine>
+  <cs:title>
+    <cs:lnRef idx="0"/>
+    <cs:fillRef idx="0"/>
+    <cs:effectRef idx="0"/>
+    <cs:fontRef idx="minor">
+      <a:schemeClr val="tx1">
+        <a:lumMod val="65000"/>
+        <a:lumOff val="35000"/>
+      </a:schemeClr>
+    </cs:fontRef>
+    <cs:defRPr sz="2128" b="1" kern="1200" cap="all" baseline="0"/>
+  </cs:title>
+  <cs:trendline>
+    <cs:lnRef idx="0">
+      <cs:styleClr val="auto"/>
+    </cs:lnRef>
+    <cs:fillRef idx="0"/>
+    <cs:effectRef idx="0"/>
+    <cs:fontRef idx="minor">
+      <a:schemeClr val="tx1"/>
+    </cs:fontRef>
+    <cs:spPr>
+      <a:ln w="19050" cap="rnd">
+        <a:solidFill>
+          <a:schemeClr val="phClr"/>
+        </a:solidFill>
+        <a:prstDash val="sysDash"/>
+      </a:ln>
+    </cs:spPr>
+  </cs:trendline>
+  <cs:trendlineLabel>
+    <cs:lnRef idx="0"/>
+    <cs:fillRef idx="0"/>
+    <cs:effectRef idx="0"/>
+    <cs:fontRef idx="minor">
+      <a:schemeClr val="tx1">
+        <a:lumMod val="65000"/>
+        <a:lumOff val="35000"/>
+      </a:schemeClr>
+    </cs:fontRef>
+    <cs:defRPr sz="1197" kern="1200"/>
+  </cs:trendlineLabel>
+  <cs:upBar>
+    <cs:lnRef idx="0"/>
+    <cs:fillRef idx="0"/>
+    <cs:effectRef idx="0"/>
+    <cs:fontRef idx="minor">
+      <a:schemeClr val="tx1"/>
+    </cs:fontRef>
+    <cs:spPr>
+      <a:solidFill>
+        <a:schemeClr val="lt1"/>
+      </a:solidFill>
+      <a:ln w="9525" cap="flat" cmpd="sng" algn="ctr">
+        <a:solidFill>
+          <a:schemeClr val="tx1">
+            <a:lumMod val="65000"/>
+            <a:lumOff val="35000"/>
+          </a:schemeClr>
+        </a:solidFill>
+        <a:round/>
+      </a:ln>
+    </cs:spPr>
+  </cs:upBar>
+  <cs:valueAxis>
+    <cs:lnRef idx="0"/>
+    <cs:fillRef idx="0"/>
+    <cs:effectRef idx="0"/>
+    <cs:fontRef idx="minor">
+      <a:schemeClr val="tx1">
+        <a:lumMod val="65000"/>
+        <a:lumOff val="35000"/>
+      </a:schemeClr>
+    </cs:fontRef>
+    <cs:defRPr sz="1197" kern="1200"/>
+  </cs:valueAxis>
+  <cs:wall>
+    <cs:lnRef idx="0"/>
+    <cs:fillRef idx="0"/>
+    <cs:effectRef idx="0"/>
+    <cs:fontRef idx="minor">
+      <a:schemeClr val="tx1"/>
+    </cs:fontRef>
+    <cs:spPr>
+      <a:noFill/>
+      <a:ln>
+        <a:noFill/>
+      </a:ln>
+    </cs:spPr>
+  </cs:wall>
+</cs:chartStyle>
+</file>
+
+<file path=ppt/charts/style2.xml><?xml version="1.0" encoding="utf-8"?>
+<cs:chartStyle xmlns:cs="http://schemas.microsoft.com/office/drawing/2012/chartStyle" xmlns:a="http://schemas.openxmlformats.org/drawingml/2006/main" id="259">
+  <cs:axisTitle>
+    <cs:lnRef idx="0"/>
+    <cs:fillRef idx="0"/>
+    <cs:effectRef idx="0"/>
+    <cs:fontRef idx="minor">
+      <a:schemeClr val="tx1">
+        <a:lumMod val="65000"/>
+        <a:lumOff val="35000"/>
+      </a:schemeClr>
+    </cs:fontRef>
+    <cs:defRPr sz="1197" kern="1200" cap="all"/>
+  </cs:axisTitle>
+  <cs:categoryAxis>
+    <cs:lnRef idx="0"/>
+    <cs:fillRef idx="0"/>
+    <cs:effectRef idx="0"/>
+    <cs:fontRef idx="minor">
+      <a:schemeClr val="tx1">
+        <a:lumMod val="65000"/>
+        <a:lumOff val="35000"/>
+      </a:schemeClr>
+    </cs:fontRef>
+    <cs:defRPr sz="1197" kern="1200"/>
+  </cs:categoryAxis>
+  <cs:chartArea mods="allowNoFillOverride allowNoLineOverride">
+    <cs:lnRef idx="0"/>
+    <cs:fillRef idx="0"/>
+    <cs:effectRef idx="0"/>
+    <cs:fontRef idx="minor">
+      <a:schemeClr val="tx1"/>
+    </cs:fontRef>
+    <cs:spPr>
+      <a:solidFill>
+        <a:schemeClr val="bg1"/>
+      </a:solidFill>
+      <a:ln w="9525" cap="flat" cmpd="sng" algn="ctr">
+        <a:solidFill>
+          <a:schemeClr val="tx1">
+            <a:lumMod val="15000"/>
+            <a:lumOff val="85000"/>
+          </a:schemeClr>
+        </a:solidFill>
+        <a:round/>
+      </a:ln>
+    </cs:spPr>
+    <cs:defRPr sz="1330" kern="1200"/>
+  </cs:chartArea>
+  <cs:dataLabel>
+    <cs:lnRef idx="0"/>
+    <cs:fillRef idx="0"/>
+    <cs:effectRef idx="0"/>
+    <cs:fontRef idx="minor">
+      <cs:styleClr val="auto"/>
+    </cs:fontRef>
+    <cs:defRPr sz="1330" b="1" i="0" u="none" strike="noStrike" kern="1200" spc="0" baseline="0"/>
+  </cs:dataLabel>
+  <cs:dataLabelCallout>
+    <cs:lnRef idx="0">
+      <cs:styleClr val="auto"/>
+    </cs:lnRef>
+    <cs:fillRef idx="0"/>
+    <cs:effectRef idx="0"/>
+    <cs:fontRef idx="minor">
+      <cs:styleClr val="auto"/>
+    </cs:fontRef>
+    <cs:spPr>
+      <a:solidFill>
+        <a:schemeClr val="lt1"/>
+      </a:solidFill>
+      <a:ln>
+        <a:solidFill>
+          <a:schemeClr val="phClr"/>
+        </a:solidFill>
+      </a:ln>
+    </cs:spPr>
+    <cs:defRPr sz="1330" b="1" kern="1200"/>
+    <cs:bodyPr rot="0" spcFirstLastPara="1" vertOverflow="clip" horzOverflow="clip" vert="horz" wrap="square" lIns="36576" tIns="18288" rIns="36576" bIns="18288" anchor="ctr" anchorCtr="1">
+      <a:spAutoFit/>
+    </cs:bodyPr>
+  </cs:dataLabelCallout>
+  <cs:dataPoint>
+    <cs:lnRef idx="0"/>
+    <cs:fillRef idx="0">
+      <cs:styleClr val="auto"/>
+    </cs:fillRef>
+    <cs:effectRef idx="0"/>
+    <cs:fontRef idx="minor">
+      <a:schemeClr val="dk1"/>
+    </cs:fontRef>
+    <cs:spPr>
+      <a:solidFill>
+        <a:schemeClr val="phClr"/>
+      </a:solidFill>
+      <a:effectLst>
+        <a:outerShdw blurRad="63500" sx="102000" sy="102000" algn="ctr" rotWithShape="0">
+          <a:prstClr val="black">
+            <a:alpha val="20000"/>
+          </a:prstClr>
+        </a:outerShdw>
+      </a:effectLst>
+    </cs:spPr>
+  </cs:dataPoint>
+  <cs:dataPoint3D>
+    <cs:lnRef idx="0"/>
+    <cs:fillRef idx="0">
+      <cs:styleClr val="auto"/>
+    </cs:fillRef>
+    <cs:effectRef idx="0"/>
+    <cs:fontRef idx="minor">
+      <a:schemeClr val="dk1"/>
+    </cs:fontRef>
+    <cs:spPr>
+      <a:solidFill>
+        <a:schemeClr val="phClr"/>
+      </a:solidFill>
+      <a:effectLst>
+        <a:outerShdw blurRad="88900" sx="102000" sy="102000" algn="ctr" rotWithShape="0">
+          <a:prstClr val="black">
+            <a:alpha val="10000"/>
+          </a:prstClr>
+        </a:outerShdw>
+      </a:effectLst>
+      <a:scene3d>
+        <a:camera prst="orthographicFront"/>
+        <a:lightRig rig="threePt" dir="t"/>
+      </a:scene3d>
+      <a:sp3d>
+        <a:bevelT w="127000" h="127000"/>
+        <a:bevelB w="127000" h="127000"/>
+      </a:sp3d>
+    </cs:spPr>
+  </cs:dataPoint3D>
+  <cs:dataPointLine>
+    <cs:lnRef idx="0">
+      <cs:styleClr val="auto"/>
+    </cs:lnRef>
+    <cs:fillRef idx="0"/>
+    <cs:effectRef idx="0"/>
+    <cs:fontRef idx="minor">
+      <a:schemeClr val="dk1"/>
+    </cs:fontRef>
+    <cs:spPr>
+      <a:ln w="28575" cap="rnd">
+        <a:solidFill>
+          <a:schemeClr val="phClr"/>
+        </a:solidFill>
+        <a:round/>
+      </a:ln>
+    </cs:spPr>
+  </cs:dataPointLine>
+  <cs:dataPointMarker>
+    <cs:lnRef idx="0"/>
+    <cs:fillRef idx="0">
+      <cs:styleClr val="auto"/>
+    </cs:fillRef>
+    <cs:effectRef idx="0"/>
+    <cs:fontRef idx="minor">
+      <a:schemeClr val="dk1"/>
+    </cs:fontRef>
+    <cs:spPr>
+      <a:solidFill>
+        <a:schemeClr val="phClr"/>
+      </a:solidFill>
+      <a:ln w="9525">
+        <a:solidFill>
+          <a:schemeClr val="lt1"/>
+        </a:solidFill>
+      </a:ln>
+    </cs:spPr>
+  </cs:dataPointMarker>
+  <cs:dataPointMarkerLayout symbol="circle" size="6"/>
+  <cs:dataPointWireframe>
+    <cs:lnRef idx="0">
+      <cs:styleClr val="auto"/>
+    </cs:lnRef>
+    <cs:fillRef idx="0"/>
+    <cs:effectRef idx="0"/>
+    <cs:fontRef idx="minor">
+      <a:schemeClr val="dk1"/>
+    </cs:fontRef>
+    <cs:spPr>
+      <a:ln w="9525" cap="rnd">
+        <a:solidFill>
+          <a:schemeClr val="phClr"/>
+        </a:solidFill>
+        <a:round/>
+      </a:ln>
+    </cs:spPr>
+  </cs:dataPointWireframe>
+  <cs:dataTable>
+    <cs:lnRef idx="0"/>
+    <cs:fillRef idx="0"/>
+    <cs:effectRef idx="0"/>
+    <cs:fontRef idx="minor">
+      <a:schemeClr val="tx1">
+        <a:lumMod val="65000"/>
+        <a:lumOff val="35000"/>
+      </a:schemeClr>
+    </cs:fontRef>
+    <cs:spPr>
+      <a:noFill/>
+      <a:ln w="9525" cap="flat" cmpd="sng" algn="ctr">
+        <a:solidFill>
+          <a:schemeClr val="tx1">
+            <a:lumMod val="15000"/>
+            <a:lumOff val="85000"/>
+          </a:schemeClr>
+        </a:solidFill>
+        <a:round/>
+      </a:ln>
+    </cs:spPr>
+    <cs:defRPr sz="1197" kern="1200"/>
+  </cs:dataTable>
+  <cs:downBar>
+    <cs:lnRef idx="0"/>
+    <cs:fillRef idx="0"/>
+    <cs:effectRef idx="0"/>
+    <cs:fontRef idx="minor">
+      <a:schemeClr val="tx1"/>
+    </cs:fontRef>
+    <cs:spPr>
+      <a:solidFill>
+        <a:schemeClr val="dk1">
+          <a:lumMod val="75000"/>
+          <a:lumOff val="25000"/>
+        </a:schemeClr>
+      </a:solidFill>
+      <a:ln w="9525" cap="flat" cmpd="sng" algn="ctr">
+        <a:solidFill>
+          <a:schemeClr val="tx1">
+            <a:lumMod val="65000"/>
+            <a:lumOff val="35000"/>
+          </a:schemeClr>
+        </a:solidFill>
+        <a:round/>
+      </a:ln>
+    </cs:spPr>
+  </cs:downBar>
+  <cs:dropLine>
+    <cs:lnRef idx="0"/>
+    <cs:fillRef idx="0"/>
+    <cs:effectRef idx="0"/>
+    <cs:fontRef idx="minor">
+      <a:schemeClr val="tx1"/>
+    </cs:fontRef>
+    <cs:spPr>
+      <a:ln w="9525" cap="flat" cmpd="sng" algn="ctr">
+        <a:solidFill>
+          <a:schemeClr val="tx1">
+            <a:lumMod val="35000"/>
+            <a:lumOff val="65000"/>
+          </a:schemeClr>
+        </a:solidFill>
+        <a:round/>
+      </a:ln>
+    </cs:spPr>
+  </cs:dropLine>
+  <cs:errorBar>
+    <cs:lnRef idx="0"/>
+    <cs:fillRef idx="0"/>
+    <cs:effectRef idx="0"/>
+    <cs:fontRef idx="minor">
+      <a:schemeClr val="tx1"/>
+    </cs:fontRef>
+    <cs:spPr>
+      <a:ln w="9525" cap="flat" cmpd="sng" algn="ctr">
+        <a:solidFill>
+          <a:schemeClr val="tx1">
+            <a:lumMod val="65000"/>
+            <a:lumOff val="35000"/>
+          </a:schemeClr>
+        </a:solidFill>
+        <a:round/>
+      </a:ln>
+    </cs:spPr>
+  </cs:errorBar>
+  <cs:floor>
+    <cs:lnRef idx="0"/>
+    <cs:fillRef idx="0"/>
+    <cs:effectRef idx="0"/>
+    <cs:fontRef idx="minor">
+      <a:schemeClr val="tx1"/>
+    </cs:fontRef>
+    <cs:spPr>
+      <a:noFill/>
+      <a:ln>
+        <a:noFill/>
+      </a:ln>
+    </cs:spPr>
+  </cs:floor>
+  <cs:gridlineMajor>
+    <cs:lnRef idx="0"/>
+    <cs:fillRef idx="0"/>
+    <cs:effectRef idx="0"/>
+    <cs:fontRef idx="minor">
+      <a:schemeClr val="tx1"/>
+    </cs:fontRef>
+    <cs:spPr>
+      <a:ln w="9525" cap="flat" cmpd="sng" algn="ctr">
+        <a:solidFill>
+          <a:schemeClr val="tx1">
+            <a:lumMod val="15000"/>
+            <a:lumOff val="85000"/>
+          </a:schemeClr>
+        </a:solidFill>
+        <a:round/>
+      </a:ln>
+    </cs:spPr>
+  </cs:gridlineMajor>
+  <cs:gridlineMinor>
+    <cs:lnRef idx="0"/>
+    <cs:fillRef idx="0"/>
+    <cs:effectRef idx="0"/>
+    <cs:fontRef idx="minor">
+      <a:schemeClr val="tx1"/>
+    </cs:fontRef>
+    <cs:spPr>
+      <a:ln w="9525" cap="flat" cmpd="sng" algn="ctr">
+        <a:solidFill>
+          <a:schemeClr val="tx1">
+            <a:lumMod val="5000"/>
+            <a:lumOff val="95000"/>
+          </a:schemeClr>
+        </a:solidFill>
+        <a:round/>
+      </a:ln>
+    </cs:spPr>
+  </cs:gridlineMinor>
+  <cs:hiLoLine>
+    <cs:lnRef idx="0"/>
+    <cs:fillRef idx="0"/>
+    <cs:effectRef idx="0"/>
+    <cs:fontRef idx="minor">
+      <a:schemeClr val="tx1"/>
+    </cs:fontRef>
+    <cs:spPr>
+      <a:ln w="9525" cap="flat" cmpd="sng" algn="ctr">
+        <a:solidFill>
+          <a:schemeClr val="tx1">
+            <a:lumMod val="50000"/>
+            <a:lumOff val="50000"/>
+          </a:schemeClr>
+        </a:solidFill>
+        <a:round/>
+      </a:ln>
+    </cs:spPr>
+  </cs:hiLoLine>
+  <cs:leaderLine>
+    <cs:lnRef idx="0"/>
+    <cs:fillRef idx="0"/>
+    <cs:effectRef idx="0"/>
+    <cs:fontRef idx="minor">
+      <a:schemeClr val="tx1"/>
+    </cs:fontRef>
+    <cs:spPr>
+      <a:ln w="9525" cap="flat" cmpd="sng" algn="ctr">
+        <a:solidFill>
+          <a:schemeClr val="tx1">
+            <a:lumMod val="35000"/>
+            <a:lumOff val="65000"/>
+          </a:schemeClr>
+        </a:solidFill>
+        <a:round/>
+      </a:ln>
+    </cs:spPr>
+  </cs:leaderLine>
+  <cs:legend>
+    <cs:lnRef idx="0"/>
+    <cs:fillRef idx="0"/>
+    <cs:effectRef idx="0"/>
+    <cs:fontRef idx="minor">
+      <a:schemeClr val="tx1">
+        <a:lumMod val="65000"/>
+        <a:lumOff val="35000"/>
+      </a:schemeClr>
+    </cs:fontRef>
+    <cs:defRPr sz="1197" kern="1200"/>
+  </cs:legend>
+  <cs:plotArea mods="allowNoFillOverride allowNoLineOverride">
+    <cs:lnRef idx="0"/>
+    <cs:fillRef idx="0"/>
+    <cs:effectRef idx="0"/>
+    <cs:fontRef idx="minor">
+      <a:schemeClr val="dk1"/>
+    </cs:fontRef>
+  </cs:plotArea>
+  <cs:plotArea3D mods="allowNoFillOverride allowNoLineOverride">
+    <cs:lnRef idx="0"/>
+    <cs:fillRef idx="0"/>
+    <cs:effectRef idx="0"/>
+    <cs:fontRef idx="minor">
+      <a:schemeClr val="dk1"/>
+    </cs:fontRef>
+  </cs:plotArea3D>
+  <cs:seriesAxis>
+    <cs:lnRef idx="0"/>
+    <cs:fillRef idx="0"/>
+    <cs:effectRef idx="0"/>
+    <cs:fontRef idx="minor">
+      <a:schemeClr val="tx1">
+        <a:lumMod val="65000"/>
+        <a:lumOff val="35000"/>
+      </a:schemeClr>
+    </cs:fontRef>
+    <cs:defRPr sz="1197" kern="1200"/>
+  </cs:seriesAxis>
+  <cs:seriesLine>
+    <cs:lnRef idx="0"/>
+    <cs:fillRef idx="0"/>
+    <cs:effectRef idx="0"/>
+    <cs:fontRef idx="minor">
+      <a:schemeClr val="tx1"/>
+    </cs:fontRef>
+    <cs:spPr>
+      <a:ln w="9525" cap="flat" cmpd="sng" algn="ctr">
+        <a:solidFill>
+          <a:schemeClr val="tx1">
+            <a:lumMod val="35000"/>
+            <a:lumOff val="65000"/>
+          </a:schemeClr>
+        </a:solidFill>
+        <a:round/>
+      </a:ln>
+    </cs:spPr>
+  </cs:seriesLine>
+  <cs:title>
+    <cs:lnRef idx="0"/>
+    <cs:fillRef idx="0"/>
+    <cs:effectRef idx="0"/>
+    <cs:fontRef idx="minor">
+      <a:schemeClr val="tx1">
+        <a:lumMod val="65000"/>
+        <a:lumOff val="35000"/>
+      </a:schemeClr>
+    </cs:fontRef>
+    <cs:defRPr sz="2128" b="1" kern="1200" cap="all" baseline="0"/>
+  </cs:title>
+  <cs:trendline>
+    <cs:lnRef idx="0">
+      <cs:styleClr val="auto"/>
+    </cs:lnRef>
+    <cs:fillRef idx="0"/>
+    <cs:effectRef idx="0"/>
+    <cs:fontRef idx="minor">
+      <a:schemeClr val="tx1"/>
+    </cs:fontRef>
+    <cs:spPr>
+      <a:ln w="19050" cap="rnd">
+        <a:solidFill>
+          <a:schemeClr val="phClr"/>
+        </a:solidFill>
+        <a:prstDash val="sysDash"/>
+      </a:ln>
+    </cs:spPr>
+  </cs:trendline>
+  <cs:trendlineLabel>
+    <cs:lnRef idx="0"/>
+    <cs:fillRef idx="0"/>
+    <cs:effectRef idx="0"/>
+    <cs:fontRef idx="minor">
+      <a:schemeClr val="tx1">
+        <a:lumMod val="65000"/>
+        <a:lumOff val="35000"/>
+      </a:schemeClr>
+    </cs:fontRef>
+    <cs:defRPr sz="1197" kern="1200"/>
+  </cs:trendlineLabel>
+  <cs:upBar>
+    <cs:lnRef idx="0"/>
+    <cs:fillRef idx="0"/>
+    <cs:effectRef idx="0"/>
+    <cs:fontRef idx="minor">
+      <a:schemeClr val="tx1"/>
+    </cs:fontRef>
+    <cs:spPr>
+      <a:solidFill>
+        <a:schemeClr val="lt1"/>
+      </a:solidFill>
+      <a:ln w="9525" cap="flat" cmpd="sng" algn="ctr">
+        <a:solidFill>
+          <a:schemeClr val="tx1">
+            <a:lumMod val="65000"/>
+            <a:lumOff val="35000"/>
+          </a:schemeClr>
+        </a:solidFill>
+        <a:round/>
+      </a:ln>
+    </cs:spPr>
+  </cs:upBar>
+  <cs:valueAxis>
+    <cs:lnRef idx="0"/>
+    <cs:fillRef idx="0"/>
+    <cs:effectRef idx="0"/>
+    <cs:fontRef idx="minor">
+      <a:schemeClr val="tx1">
+        <a:lumMod val="65000"/>
+        <a:lumOff val="35000"/>
+      </a:schemeClr>
+    </cs:fontRef>
+    <cs:defRPr sz="1197" kern="1200"/>
+  </cs:valueAxis>
+  <cs:wall>
+    <cs:lnRef idx="0"/>
+    <cs:fillRef idx="0"/>
+    <cs:effectRef idx="0"/>
+    <cs:fontRef idx="minor">
+      <a:schemeClr val="tx1"/>
+    </cs:fontRef>
+    <cs:spPr>
+      <a:noFill/>
+      <a:ln>
+        <a:noFill/>
+      </a:ln>
+    </cs:spPr>
+  </cs:wall>
+</cs:chartStyle>
+</file>
+
 <file path=ppt/notesMasters/notesMaster1.xml><?xml version="1.0" encoding="utf-8"?>
 <p:notesMaster xmlns:a="http://schemas.openxmlformats.org/drawingml/2006/main" xmlns:r="http://schemas.openxmlformats.org/officeDocument/2006/relationships" xmlns:p="http://schemas.openxmlformats.org/presentationml/2006/main">
   <p:cSld>
@@ -237,7 +2313,7 @@
           <a:p>
             <a:fld id="{FDFAE622-8C56-4731-9D34-899558E94A45}" type="datetimeFigureOut">
               <a:rPr lang="pl-PL" smtClean="0"/>
-              <a:t>31.03.2024</a:t>
+              <a:t>01.04.2024</a:t>
             </a:fld>
             <a:endParaRPr lang="pl-PL"/>
           </a:p>
@@ -728,6 +2804,12 @@
           <a:p>
             <a:r>
               <a:rPr lang="pl-PL" dirty="0"/>
+              <a:t>https://www.parp.gov.pl/component/publications/publication/raport-o-stanie-sektora-malych-i-srednich-przedsiebiorstw-w-polsce-2023</a:t>
+            </a:r>
+          </a:p>
+          <a:p>
+            <a:r>
+              <a:rPr lang="pl-PL" dirty="0"/>
               <a:t>https://www.parp.gov.pl/storage/publications/pdf/ROSS_2023_scalony_ost_popr.pdf</a:t>
             </a:r>
           </a:p>
@@ -934,6 +3016,177 @@
     <p:extLst>
       <p:ext uri="{BB962C8B-B14F-4D97-AF65-F5344CB8AC3E}">
         <p14:creationId xmlns:p14="http://schemas.microsoft.com/office/powerpoint/2010/main" val="3783768304"/>
+      </p:ext>
+    </p:extLst>
+  </p:cSld>
+  <p:clrMapOvr>
+    <a:masterClrMapping/>
+  </p:clrMapOvr>
+</p:notes>
+</file>
+
+<file path=ppt/notesSlides/notesSlide6.xml><?xml version="1.0" encoding="utf-8"?>
+<p:notes xmlns:a="http://schemas.openxmlformats.org/drawingml/2006/main" xmlns:r="http://schemas.openxmlformats.org/officeDocument/2006/relationships" xmlns:p="http://schemas.openxmlformats.org/presentationml/2006/main">
+  <p:cSld>
+    <p:spTree>
+      <p:nvGrpSpPr>
+        <p:cNvPr id="1" name=""/>
+        <p:cNvGrpSpPr/>
+        <p:nvPr/>
+      </p:nvGrpSpPr>
+      <p:grpSpPr>
+        <a:xfrm>
+          <a:off x="0" y="0"/>
+          <a:ext cx="0" cy="0"/>
+          <a:chOff x="0" y="0"/>
+          <a:chExt cx="0" cy="0"/>
+        </a:xfrm>
+      </p:grpSpPr>
+      <p:sp>
+        <p:nvSpPr>
+          <p:cNvPr id="2" name="Symbol zastępczy obrazu slajdu 1"/>
+          <p:cNvSpPr>
+            <a:spLocks noGrp="1" noRot="1" noChangeAspect="1"/>
+          </p:cNvSpPr>
+          <p:nvPr>
+            <p:ph type="sldImg"/>
+          </p:nvPr>
+        </p:nvSpPr>
+        <p:spPr/>
+      </p:sp>
+      <p:sp>
+        <p:nvSpPr>
+          <p:cNvPr id="3" name="Symbol zastępczy notatek 2"/>
+          <p:cNvSpPr>
+            <a:spLocks noGrp="1"/>
+          </p:cNvSpPr>
+          <p:nvPr>
+            <p:ph type="body" idx="1"/>
+          </p:nvPr>
+        </p:nvSpPr>
+        <p:spPr/>
+        <p:txBody>
+          <a:bodyPr/>
+          <a:lstStyle/>
+          <a:p>
+            <a:endParaRPr lang="pl-PL" dirty="0"/>
+          </a:p>
+        </p:txBody>
+      </p:sp>
+      <p:sp>
+        <p:nvSpPr>
+          <p:cNvPr id="4" name="Symbol zastępczy numeru slajdu 3"/>
+          <p:cNvSpPr>
+            <a:spLocks noGrp="1"/>
+          </p:cNvSpPr>
+          <p:nvPr>
+            <p:ph type="sldNum" sz="quarter" idx="5"/>
+          </p:nvPr>
+        </p:nvSpPr>
+        <p:spPr/>
+        <p:txBody>
+          <a:bodyPr/>
+          <a:lstStyle/>
+          <a:p>
+            <a:fld id="{2AC13549-AA33-4E14-83CF-9CF2FE6802EB}" type="slidenum">
+              <a:rPr lang="pl-PL" smtClean="0"/>
+              <a:t>11</a:t>
+            </a:fld>
+            <a:endParaRPr lang="pl-PL"/>
+          </a:p>
+        </p:txBody>
+      </p:sp>
+    </p:spTree>
+    <p:extLst>
+      <p:ext uri="{BB962C8B-B14F-4D97-AF65-F5344CB8AC3E}">
+        <p14:creationId xmlns:p14="http://schemas.microsoft.com/office/powerpoint/2010/main" val="3126315369"/>
+      </p:ext>
+    </p:extLst>
+  </p:cSld>
+  <p:clrMapOvr>
+    <a:masterClrMapping/>
+  </p:clrMapOvr>
+</p:notes>
+</file>
+
+<file path=ppt/notesSlides/notesSlide7.xml><?xml version="1.0" encoding="utf-8"?>
+<p:notes xmlns:a="http://schemas.openxmlformats.org/drawingml/2006/main" xmlns:r="http://schemas.openxmlformats.org/officeDocument/2006/relationships" xmlns:p="http://schemas.openxmlformats.org/presentationml/2006/main">
+  <p:cSld>
+    <p:spTree>
+      <p:nvGrpSpPr>
+        <p:cNvPr id="1" name=""/>
+        <p:cNvGrpSpPr/>
+        <p:nvPr/>
+      </p:nvGrpSpPr>
+      <p:grpSpPr>
+        <a:xfrm>
+          <a:off x="0" y="0"/>
+          <a:ext cx="0" cy="0"/>
+          <a:chOff x="0" y="0"/>
+          <a:chExt cx="0" cy="0"/>
+        </a:xfrm>
+      </p:grpSpPr>
+      <p:sp>
+        <p:nvSpPr>
+          <p:cNvPr id="2" name="Symbol zastępczy obrazu slajdu 1"/>
+          <p:cNvSpPr>
+            <a:spLocks noGrp="1" noRot="1" noChangeAspect="1"/>
+          </p:cNvSpPr>
+          <p:nvPr>
+            <p:ph type="sldImg"/>
+          </p:nvPr>
+        </p:nvSpPr>
+        <p:spPr/>
+      </p:sp>
+      <p:sp>
+        <p:nvSpPr>
+          <p:cNvPr id="3" name="Symbol zastępczy notatek 2"/>
+          <p:cNvSpPr>
+            <a:spLocks noGrp="1"/>
+          </p:cNvSpPr>
+          <p:nvPr>
+            <p:ph type="body" idx="1"/>
+          </p:nvPr>
+        </p:nvSpPr>
+        <p:spPr/>
+        <p:txBody>
+          <a:bodyPr/>
+          <a:lstStyle/>
+          <a:p>
+            <a:r>
+              <a:rPr lang="pl-PL" dirty="0"/>
+              <a:t>https://pragmago.pl/porada/sektor-msp-w-polsce/</a:t>
+            </a:r>
+          </a:p>
+        </p:txBody>
+      </p:sp>
+      <p:sp>
+        <p:nvSpPr>
+          <p:cNvPr id="4" name="Symbol zastępczy numeru slajdu 3"/>
+          <p:cNvSpPr>
+            <a:spLocks noGrp="1"/>
+          </p:cNvSpPr>
+          <p:nvPr>
+            <p:ph type="sldNum" sz="quarter" idx="5"/>
+          </p:nvPr>
+        </p:nvSpPr>
+        <p:spPr/>
+        <p:txBody>
+          <a:bodyPr/>
+          <a:lstStyle/>
+          <a:p>
+            <a:fld id="{2AC13549-AA33-4E14-83CF-9CF2FE6802EB}" type="slidenum">
+              <a:rPr lang="pl-PL" smtClean="0"/>
+              <a:t>15</a:t>
+            </a:fld>
+            <a:endParaRPr lang="pl-PL"/>
+          </a:p>
+        </p:txBody>
+      </p:sp>
+    </p:spTree>
+    <p:extLst>
+      <p:ext uri="{BB962C8B-B14F-4D97-AF65-F5344CB8AC3E}">
+        <p14:creationId xmlns:p14="http://schemas.microsoft.com/office/powerpoint/2010/main" val="1197821625"/>
       </p:ext>
     </p:extLst>
   </p:cSld>
@@ -2501,6 +4754,7 @@
           <a:bodyPr/>
           <a:lstStyle/>
           <a:p>
+            <a:pPr algn="l"/>
             <a:r>
               <a:rPr lang="pl-PL" sz="1800" dirty="0">
                 <a:effectLst/>
@@ -2509,6 +4763,41 @@
                 <a:cs typeface="Arial" panose="020B0604020202020204" pitchFamily="34" charset="0"/>
               </a:rPr>
               <a:t>Procentowy udział MSP w PKB Polski.</a:t>
+            </a:r>
+            <a:r>
+              <a:rPr lang="pl-PL" sz="1800" dirty="0">
+                <a:latin typeface="Aptos" panose="020B0004020202020204" pitchFamily="34" charset="0"/>
+                <a:ea typeface="Aptos" panose="020B0004020202020204" pitchFamily="34" charset="0"/>
+                <a:cs typeface="Arial" panose="020B0604020202020204" pitchFamily="34" charset="0"/>
+              </a:rPr>
+              <a:t> </a:t>
+            </a:r>
+            <a:r>
+              <a:rPr lang="pl-PL" sz="1800" b="1" dirty="0">
+                <a:latin typeface="Aptos" panose="020B0004020202020204" pitchFamily="34" charset="0"/>
+                <a:cs typeface="Arial" panose="020B0604020202020204" pitchFamily="34" charset="0"/>
+              </a:rPr>
+              <a:t>TO READ: </a:t>
+            </a:r>
+          </a:p>
+          <a:p>
+            <a:pPr algn="l"/>
+            <a:r>
+              <a:rPr lang="pl-PL" sz="1800" dirty="0">
+                <a:latin typeface="Aptos" panose="020B0004020202020204" pitchFamily="34" charset="0"/>
+                <a:cs typeface="Arial" panose="020B0604020202020204" pitchFamily="34" charset="0"/>
+              </a:rPr>
+              <a:t>https://depilconcept.pl/raport-parp-2022-o-stanie-sektora-msp-w-polsce/</a:t>
+            </a:r>
+          </a:p>
+          <a:p>
+            <a:pPr algn="l"/>
+            <a:r>
+              <a:rPr lang="pl-PL" sz="1800" dirty="0">
+                <a:latin typeface="Aptos" panose="020B0004020202020204" pitchFamily="34" charset="0"/>
+                <a:cs typeface="Arial" panose="020B0604020202020204" pitchFamily="34" charset="0"/>
+              </a:rPr>
+              <a:t>https://www.parp.gov.pl/component/content/article/82282:jubileuszowy-raport-parp-msp-niezaprzeczalnie-najwazniejszym-ogniwem-polskiej-gospodarki</a:t>
             </a:r>
             <a:endParaRPr lang="pl-PL" dirty="0"/>
           </a:p>
@@ -2529,14 +4818,43 @@
           <p:nvPr/>
         </p:nvPicPr>
         <p:blipFill rotWithShape="1">
-          <a:blip r:embed="rId2"/>
+          <a:blip r:embed="rId3"/>
           <a:srcRect l="41578" t="34046" r="27039" b="32038"/>
           <a:stretch/>
         </p:blipFill>
         <p:spPr>
           <a:xfrm>
-            <a:off x="5116317" y="2556769"/>
-            <a:ext cx="7075683" cy="4301231"/>
+            <a:off x="5612855" y="2787588"/>
+            <a:ext cx="6579145" cy="3999391"/>
+          </a:xfrm>
+          <a:prstGeom prst="rect">
+            <a:avLst/>
+          </a:prstGeom>
+        </p:spPr>
+      </p:pic>
+      <p:pic>
+        <p:nvPicPr>
+          <p:cNvPr id="5" name="Obraz 4">
+            <a:extLst>
+              <a:ext uri="{FF2B5EF4-FFF2-40B4-BE49-F238E27FC236}">
+                <a16:creationId xmlns:a16="http://schemas.microsoft.com/office/drawing/2014/main" id="{871C5977-47AB-605D-67CF-F2CD23609DC9}"/>
+              </a:ext>
+            </a:extLst>
+          </p:cNvPr>
+          <p:cNvPicPr>
+            <a:picLocks noChangeAspect="1"/>
+          </p:cNvPicPr>
+          <p:nvPr/>
+        </p:nvPicPr>
+        <p:blipFill rotWithShape="1">
+          <a:blip r:embed="rId4"/>
+          <a:srcRect l="37500" t="42718" r="25000" b="19094"/>
+          <a:stretch/>
+        </p:blipFill>
+        <p:spPr>
+          <a:xfrm>
+            <a:off x="0" y="2956264"/>
+            <a:ext cx="5610623" cy="3213853"/>
           </a:xfrm>
           <a:prstGeom prst="rect">
             <a:avLst/>
@@ -2910,6 +5228,7 @@
           <a:bodyPr/>
           <a:lstStyle/>
           <a:p>
+            <a:pPr algn="l"/>
             <a:r>
               <a:rPr lang="pl-PL" dirty="0">
                 <a:effectLst/>
@@ -2917,7 +5236,7 @@
                 <a:ea typeface="Aptos" panose="020B0004020202020204" pitchFamily="34" charset="0"/>
                 <a:cs typeface="Arial" panose="020B0604020202020204" pitchFamily="34" charset="0"/>
               </a:rPr>
-              <a:t>Wsparcie państwa dla MSP</a:t>
+              <a:t>Wsparcie dla MSP</a:t>
             </a:r>
             <a:endParaRPr lang="pl-PL" dirty="0"/>
           </a:p>
@@ -2939,23 +5258,270 @@
             <p:ph type="subTitle" idx="1"/>
           </p:nvPr>
         </p:nvSpPr>
-        <p:spPr/>
+        <p:spPr>
+          <a:xfrm>
+            <a:off x="0" y="922336"/>
+            <a:ext cx="9144000" cy="5935663"/>
+          </a:xfrm>
+        </p:spPr>
         <p:txBody>
           <a:bodyPr/>
           <a:lstStyle/>
           <a:p>
+            <a:pPr algn="l"/>
             <a:r>
               <a:rPr lang="pl-PL" sz="1800" dirty="0">
-                <a:effectLst/>
-                <a:latin typeface="Aptos" panose="020B0004020202020204" pitchFamily="34" charset="0"/>
-                <a:ea typeface="Aptos" panose="020B0004020202020204" pitchFamily="34" charset="0"/>
-                <a:cs typeface="Arial" panose="020B0604020202020204" pitchFamily="34" charset="0"/>
-              </a:rPr>
-              <a:t>Przegląd programów wsparcia i finansowania dostępnych dla MSP.</a:t>
-            </a:r>
-          </a:p>
-          <a:p>
-            <a:endParaRPr lang="pl-PL" dirty="0"/>
+                <a:latin typeface="Aptos" panose="020B0004020202020204" pitchFamily="34" charset="0"/>
+                <a:ea typeface="Aptos" panose="020B0004020202020204" pitchFamily="34" charset="0"/>
+                <a:cs typeface="Arial" panose="020B0604020202020204" pitchFamily="34" charset="0"/>
+              </a:rPr>
+              <a:t>Rodzaje:</a:t>
+            </a:r>
+            <a:endParaRPr lang="pl-PL" sz="1800" dirty="0">
+              <a:effectLst/>
+              <a:latin typeface="Aptos" panose="020B0004020202020204" pitchFamily="34" charset="0"/>
+              <a:ea typeface="Aptos" panose="020B0004020202020204" pitchFamily="34" charset="0"/>
+              <a:cs typeface="Arial" panose="020B0604020202020204" pitchFamily="34" charset="0"/>
+            </a:endParaRPr>
+          </a:p>
+          <a:p>
+            <a:pPr marL="285750" indent="-285750" algn="l">
+              <a:buFont typeface="Arial" panose="020B0604020202020204" pitchFamily="34" charset="0"/>
+              <a:buChar char="•"/>
+            </a:pPr>
+            <a:r>
+              <a:rPr lang="pl-PL" sz="1800" b="1" dirty="0">
+                <a:effectLst/>
+                <a:latin typeface="Aptos" panose="020B0004020202020204" pitchFamily="34" charset="0"/>
+                <a:ea typeface="Aptos" panose="020B0004020202020204" pitchFamily="34" charset="0"/>
+                <a:cs typeface="Arial" panose="020B0604020202020204" pitchFamily="34" charset="0"/>
+              </a:rPr>
+              <a:t>dotacje</a:t>
+            </a:r>
+            <a:r>
+              <a:rPr lang="pl-PL" sz="1800" dirty="0">
+                <a:effectLst/>
+                <a:latin typeface="Aptos" panose="020B0004020202020204" pitchFamily="34" charset="0"/>
+                <a:ea typeface="Aptos" panose="020B0004020202020204" pitchFamily="34" charset="0"/>
+                <a:cs typeface="Arial" panose="020B0604020202020204" pitchFamily="34" charset="0"/>
+              </a:rPr>
+              <a:t> i </a:t>
+            </a:r>
+            <a:r>
+              <a:rPr lang="pl-PL" sz="1800" b="1" dirty="0">
+                <a:effectLst/>
+                <a:latin typeface="Aptos" panose="020B0004020202020204" pitchFamily="34" charset="0"/>
+                <a:ea typeface="Aptos" panose="020B0004020202020204" pitchFamily="34" charset="0"/>
+                <a:cs typeface="Arial" panose="020B0604020202020204" pitchFamily="34" charset="0"/>
+              </a:rPr>
+              <a:t>dofinansowania</a:t>
+            </a:r>
+            <a:r>
+              <a:rPr lang="pl-PL" sz="1800" dirty="0">
+                <a:effectLst/>
+                <a:latin typeface="Aptos" panose="020B0004020202020204" pitchFamily="34" charset="0"/>
+                <a:ea typeface="Aptos" panose="020B0004020202020204" pitchFamily="34" charset="0"/>
+                <a:cs typeface="Arial" panose="020B0604020202020204" pitchFamily="34" charset="0"/>
+              </a:rPr>
+              <a:t> (</a:t>
+            </a:r>
+            <a:r>
+              <a:rPr lang="pl-PL" sz="1800" dirty="0">
+                <a:latin typeface="Aptos" panose="020B0004020202020204" pitchFamily="34" charset="0"/>
+                <a:ea typeface="Aptos" panose="020B0004020202020204" pitchFamily="34" charset="0"/>
+                <a:cs typeface="Arial" panose="020B0604020202020204" pitchFamily="34" charset="0"/>
+              </a:rPr>
+              <a:t>np. </a:t>
+            </a:r>
+            <a:r>
+              <a:rPr lang="pl-PL" sz="1800" dirty="0">
+                <a:effectLst/>
+                <a:latin typeface="Aptos" panose="020B0004020202020204" pitchFamily="34" charset="0"/>
+                <a:ea typeface="Aptos" panose="020B0004020202020204" pitchFamily="34" charset="0"/>
+                <a:cs typeface="Arial" panose="020B0604020202020204" pitchFamily="34" charset="0"/>
+              </a:rPr>
+              <a:t>Fundusze Europejskie)</a:t>
+            </a:r>
+          </a:p>
+          <a:p>
+            <a:pPr marL="285750" indent="-285750" algn="l">
+              <a:buFont typeface="Arial" panose="020B0604020202020204" pitchFamily="34" charset="0"/>
+              <a:buChar char="•"/>
+            </a:pPr>
+            <a:r>
+              <a:rPr lang="pl-PL" sz="1800" b="1" dirty="0">
+                <a:effectLst/>
+                <a:latin typeface="Aptos" panose="020B0004020202020204" pitchFamily="34" charset="0"/>
+                <a:ea typeface="Aptos" panose="020B0004020202020204" pitchFamily="34" charset="0"/>
+                <a:cs typeface="Arial" panose="020B0604020202020204" pitchFamily="34" charset="0"/>
+              </a:rPr>
+              <a:t>konkursach  </a:t>
+            </a:r>
+            <a:r>
+              <a:rPr lang="pl-PL" sz="1800" dirty="0">
+                <a:effectLst/>
+                <a:latin typeface="Aptos" panose="020B0004020202020204" pitchFamily="34" charset="0"/>
+                <a:ea typeface="Aptos" panose="020B0004020202020204" pitchFamily="34" charset="0"/>
+                <a:cs typeface="Arial" panose="020B0604020202020204" pitchFamily="34" charset="0"/>
+              </a:rPr>
+              <a:t>(organizowane często przez regionalne centra przedsiębiorczości) </a:t>
+            </a:r>
+          </a:p>
+          <a:p>
+            <a:pPr marL="285750" indent="-285750" algn="l">
+              <a:buFont typeface="Arial" panose="020B0604020202020204" pitchFamily="34" charset="0"/>
+              <a:buChar char="•"/>
+            </a:pPr>
+            <a:r>
+              <a:rPr lang="pl-PL" sz="1800" b="1" dirty="0">
+                <a:latin typeface="Aptos" panose="020B0004020202020204" pitchFamily="34" charset="0"/>
+                <a:ea typeface="Aptos" panose="020B0004020202020204" pitchFamily="34" charset="0"/>
+                <a:cs typeface="Arial" panose="020B0604020202020204" pitchFamily="34" charset="0"/>
+              </a:rPr>
+              <a:t>a</a:t>
+            </a:r>
+            <a:r>
+              <a:rPr lang="pl-PL" sz="1800" b="1" dirty="0">
+                <a:effectLst/>
+                <a:latin typeface="Aptos" panose="020B0004020202020204" pitchFamily="34" charset="0"/>
+                <a:ea typeface="Aptos" panose="020B0004020202020204" pitchFamily="34" charset="0"/>
+                <a:cs typeface="Arial" panose="020B0604020202020204" pitchFamily="34" charset="0"/>
+              </a:rPr>
+              <a:t>kcje rządowe </a:t>
+            </a:r>
+            <a:r>
+              <a:rPr lang="pl-PL" sz="1800" dirty="0">
+                <a:effectLst/>
+                <a:latin typeface="Aptos" panose="020B0004020202020204" pitchFamily="34" charset="0"/>
+                <a:ea typeface="Aptos" panose="020B0004020202020204" pitchFamily="34" charset="0"/>
+                <a:cs typeface="Arial" panose="020B0604020202020204" pitchFamily="34" charset="0"/>
+              </a:rPr>
+              <a:t>(np.</a:t>
+            </a:r>
+            <a:r>
+              <a:rPr lang="pl-PL" sz="1800" b="1" dirty="0">
+                <a:effectLst/>
+                <a:latin typeface="Aptos" panose="020B0004020202020204" pitchFamily="34" charset="0"/>
+                <a:ea typeface="Aptos" panose="020B0004020202020204" pitchFamily="34" charset="0"/>
+                <a:cs typeface="Arial" panose="020B0604020202020204" pitchFamily="34" charset="0"/>
+              </a:rPr>
+              <a:t> </a:t>
+            </a:r>
+            <a:r>
+              <a:rPr lang="pl-PL" sz="1800" dirty="0">
+                <a:effectLst/>
+                <a:latin typeface="Aptos" panose="020B0004020202020204" pitchFamily="34" charset="0"/>
+                <a:ea typeface="Aptos" panose="020B0004020202020204" pitchFamily="34" charset="0"/>
+                <a:cs typeface="Arial" panose="020B0604020202020204" pitchFamily="34" charset="0"/>
+              </a:rPr>
+              <a:t>Tarcza Antykryzysowa)</a:t>
+            </a:r>
+          </a:p>
+          <a:p>
+            <a:pPr marL="285750" indent="-285750" algn="l">
+              <a:buFont typeface="Arial" panose="020B0604020202020204" pitchFamily="34" charset="0"/>
+              <a:buChar char="•"/>
+            </a:pPr>
+            <a:r>
+              <a:rPr lang="pl-PL" sz="1800" b="1" dirty="0">
+                <a:effectLst/>
+                <a:latin typeface="Aptos" panose="020B0004020202020204" pitchFamily="34" charset="0"/>
+                <a:ea typeface="Aptos" panose="020B0004020202020204" pitchFamily="34" charset="0"/>
+                <a:cs typeface="Arial" panose="020B0604020202020204" pitchFamily="34" charset="0"/>
+              </a:rPr>
+              <a:t>Inkubatory przedsiębiorczości</a:t>
+            </a:r>
+          </a:p>
+          <a:p>
+            <a:pPr algn="l"/>
+            <a:endParaRPr lang="pl-PL" sz="1800" dirty="0">
+              <a:latin typeface="Aptos" panose="020B0004020202020204" pitchFamily="34" charset="0"/>
+              <a:ea typeface="Aptos" panose="020B0004020202020204" pitchFamily="34" charset="0"/>
+              <a:cs typeface="Arial" panose="020B0604020202020204" pitchFamily="34" charset="0"/>
+            </a:endParaRPr>
+          </a:p>
+          <a:p>
+            <a:pPr algn="l"/>
+            <a:r>
+              <a:rPr lang="pl-PL" sz="1800" dirty="0">
+                <a:latin typeface="Aptos" panose="020B0004020202020204" pitchFamily="34" charset="0"/>
+                <a:ea typeface="Aptos" panose="020B0004020202020204" pitchFamily="34" charset="0"/>
+                <a:cs typeface="Arial" panose="020B0604020202020204" pitchFamily="34" charset="0"/>
+              </a:rPr>
+              <a:t>Gdzie szukać wsparcia:</a:t>
+            </a:r>
+          </a:p>
+          <a:p>
+            <a:pPr marL="285750" indent="-285750" algn="l">
+              <a:buFont typeface="Arial" panose="020B0604020202020204" pitchFamily="34" charset="0"/>
+              <a:buChar char="•"/>
+            </a:pPr>
+            <a:r>
+              <a:rPr lang="pl-PL" sz="1800" b="1" dirty="0">
+                <a:effectLst/>
+                <a:latin typeface="Aptos" panose="020B0004020202020204" pitchFamily="34" charset="0"/>
+                <a:ea typeface="Aptos" panose="020B0004020202020204" pitchFamily="34" charset="0"/>
+                <a:cs typeface="Arial" panose="020B0604020202020204" pitchFamily="34" charset="0"/>
+              </a:rPr>
+              <a:t>gov.pl (Tarcza Antykryzysowa) </a:t>
+            </a:r>
+            <a:r>
+              <a:rPr lang="pl-PL" sz="1800" dirty="0">
+                <a:effectLst/>
+                <a:latin typeface="Aptos" panose="020B0004020202020204" pitchFamily="34" charset="0"/>
+                <a:ea typeface="Aptos" panose="020B0004020202020204" pitchFamily="34" charset="0"/>
+                <a:cs typeface="Arial" panose="020B0604020202020204" pitchFamily="34" charset="0"/>
+              </a:rPr>
+              <a:t>– aktualności dotyczące planowanych i wprowadzanych rozwiązań dla przedsiębiorców w walce ze skutkami ekonomicznymi pandemii koronawirusa.</a:t>
+            </a:r>
+          </a:p>
+          <a:p>
+            <a:pPr marL="285750" indent="-285750" algn="l">
+              <a:buFont typeface="Arial" panose="020B0604020202020204" pitchFamily="34" charset="0"/>
+              <a:buChar char="•"/>
+            </a:pPr>
+            <a:r>
+              <a:rPr lang="pl-PL" sz="1800" b="1" dirty="0">
+                <a:effectLst/>
+                <a:latin typeface="Aptos" panose="020B0004020202020204" pitchFamily="34" charset="0"/>
+                <a:ea typeface="Aptos" panose="020B0004020202020204" pitchFamily="34" charset="0"/>
+                <a:cs typeface="Arial" panose="020B0604020202020204" pitchFamily="34" charset="0"/>
+              </a:rPr>
+              <a:t>Państwowa Agencja Rozwoju Przedsiębiorczości (PARP) </a:t>
+            </a:r>
+            <a:r>
+              <a:rPr lang="pl-PL" sz="1800" dirty="0">
+                <a:effectLst/>
+                <a:latin typeface="Aptos" panose="020B0004020202020204" pitchFamily="34" charset="0"/>
+                <a:ea typeface="Aptos" panose="020B0004020202020204" pitchFamily="34" charset="0"/>
+                <a:cs typeface="Arial" panose="020B0604020202020204" pitchFamily="34" charset="0"/>
+              </a:rPr>
+              <a:t>– informacje dotyczące szkoleń, grantów, Funduszy Europejskich i innych form dofinansowań.</a:t>
+            </a:r>
+          </a:p>
+          <a:p>
+            <a:pPr marL="285750" indent="-285750" algn="l">
+              <a:buFont typeface="Arial" panose="020B0604020202020204" pitchFamily="34" charset="0"/>
+              <a:buChar char="•"/>
+            </a:pPr>
+            <a:r>
+              <a:rPr lang="pl-PL" sz="1800" b="1" dirty="0">
+                <a:effectLst/>
+                <a:latin typeface="Aptos" panose="020B0004020202020204" pitchFamily="34" charset="0"/>
+                <a:ea typeface="Aptos" panose="020B0004020202020204" pitchFamily="34" charset="0"/>
+                <a:cs typeface="Arial" panose="020B0604020202020204" pitchFamily="34" charset="0"/>
+              </a:rPr>
+              <a:t>Portal Funduszy Europejskich </a:t>
+            </a:r>
+            <a:r>
+              <a:rPr lang="pl-PL" sz="1800" dirty="0">
+                <a:effectLst/>
+                <a:latin typeface="Aptos" panose="020B0004020202020204" pitchFamily="34" charset="0"/>
+                <a:ea typeface="Aptos" panose="020B0004020202020204" pitchFamily="34" charset="0"/>
+                <a:cs typeface="Arial" panose="020B0604020202020204" pitchFamily="34" charset="0"/>
+              </a:rPr>
+              <a:t>– zainteresowani przedsiębiorcy znajdą tu informacje dotyczące dostępnych form finansowania. </a:t>
+            </a:r>
           </a:p>
         </p:txBody>
       </p:sp>
@@ -5259,8 +7825,8 @@
         </p:nvSpPr>
         <p:spPr>
           <a:xfrm>
-            <a:off x="-120650" y="-831850"/>
-            <a:ext cx="5391150" cy="2921000"/>
+            <a:off x="0" y="0"/>
+            <a:ext cx="5391150" cy="1258530"/>
           </a:xfrm>
         </p:spPr>
         <p:txBody>
@@ -5284,14 +7850,6 @@
               </a:rPr>
               <a:t>Wprowadzenie</a:t>
             </a:r>
-            <a:br>
-              <a:rPr lang="pl-PL" sz="1800" dirty="0">
-                <a:effectLst/>
-                <a:latin typeface="Aptos" panose="020B0004020202020204" pitchFamily="34" charset="0"/>
-                <a:ea typeface="Aptos" panose="020B0004020202020204" pitchFamily="34" charset="0"/>
-                <a:cs typeface="Arial" panose="020B0604020202020204" pitchFamily="34" charset="0"/>
-              </a:rPr>
-            </a:br>
             <a:endParaRPr lang="pl-PL" dirty="0"/>
           </a:p>
         </p:txBody>
@@ -7128,13 +9686,13 @@
         </p:nvPicPr>
         <p:blipFill rotWithShape="1">
           <a:blip r:embed="rId3"/>
-          <a:srcRect l="41505" t="19417" r="26675" b="7702"/>
+          <a:srcRect l="41505" t="19418" r="26675" b="11517"/>
           <a:stretch/>
         </p:blipFill>
         <p:spPr>
           <a:xfrm>
-            <a:off x="7519386" y="965370"/>
-            <a:ext cx="4672614" cy="6019867"/>
+            <a:off x="7519386" y="1033463"/>
+            <a:ext cx="4672614" cy="5704710"/>
           </a:xfrm>
           <a:prstGeom prst="rect">
             <a:avLst/>
@@ -7231,8 +9789,8 @@
         </p:blipFill>
         <p:spPr>
           <a:xfrm>
-            <a:off x="7229382" y="964961"/>
-            <a:ext cx="4962618" cy="4928077"/>
+            <a:off x="6533964" y="1033463"/>
+            <a:ext cx="5658036" cy="5618655"/>
           </a:xfrm>
           <a:prstGeom prst="rect">
             <a:avLst/>
@@ -7718,183 +10276,62 @@
           </a:p>
         </p:txBody>
       </p:sp>
-      <p:sp>
-        <p:nvSpPr>
-          <p:cNvPr id="3" name="Podtytuł 2">
+      <p:graphicFrame>
+        <p:nvGraphicFramePr>
+          <p:cNvPr id="6" name="Wykres 5">
             <a:extLst>
               <a:ext uri="{FF2B5EF4-FFF2-40B4-BE49-F238E27FC236}">
-                <a16:creationId xmlns:a16="http://schemas.microsoft.com/office/drawing/2014/main" id="{B4081AC7-A0AB-888A-E05C-7ECA761AF4F1}"/>
+                <a16:creationId xmlns:a16="http://schemas.microsoft.com/office/drawing/2014/main" id="{45D29DFD-EEEC-EF7B-F19B-B09E23A5FE86}"/>
               </a:ext>
             </a:extLst>
           </p:cNvPr>
-          <p:cNvSpPr>
-            <a:spLocks noGrp="1"/>
-          </p:cNvSpPr>
-          <p:nvPr>
-            <p:ph type="subTitle" idx="1"/>
-          </p:nvPr>
-        </p:nvSpPr>
-        <p:spPr>
-          <a:xfrm>
-            <a:off x="0" y="1655762"/>
-            <a:ext cx="9144000" cy="5202238"/>
-          </a:xfrm>
-        </p:spPr>
-        <p:txBody>
-          <a:bodyPr/>
-          <a:lstStyle/>
-          <a:p>
-            <a:pPr algn="l"/>
-            <a:r>
-              <a:rPr lang="pl-PL" sz="1800" dirty="0">
-                <a:effectLst/>
-                <a:latin typeface="Aptos" panose="020B0004020202020204" pitchFamily="34" charset="0"/>
-                <a:ea typeface="Aptos" panose="020B0004020202020204" pitchFamily="34" charset="0"/>
-                <a:cs typeface="Arial" panose="020B0604020202020204" pitchFamily="34" charset="0"/>
-              </a:rPr>
-              <a:t>Sektor MSP:</a:t>
-            </a:r>
-          </a:p>
-          <a:p>
-            <a:pPr marL="285750" indent="-285750" algn="l">
-              <a:buFont typeface="Arial" panose="020B0604020202020204" pitchFamily="34" charset="0"/>
-              <a:buChar char="•"/>
-            </a:pPr>
-            <a:r>
-              <a:rPr lang="pl-PL" sz="1800" dirty="0">
-                <a:effectLst/>
-                <a:latin typeface="Aptos" panose="020B0004020202020204" pitchFamily="34" charset="0"/>
-                <a:ea typeface="Aptos" panose="020B0004020202020204" pitchFamily="34" charset="0"/>
-                <a:cs typeface="Arial" panose="020B0604020202020204" pitchFamily="34" charset="0"/>
-              </a:rPr>
-              <a:t>Usługi 53,9%</a:t>
-            </a:r>
-          </a:p>
-          <a:p>
-            <a:pPr marL="285750" indent="-285750" algn="l">
-              <a:buFont typeface="Arial" panose="020B0604020202020204" pitchFamily="34" charset="0"/>
-              <a:buChar char="•"/>
-            </a:pPr>
-            <a:r>
-              <a:rPr lang="pl-PL" sz="1800" dirty="0">
-                <a:effectLst/>
-                <a:latin typeface="Aptos" panose="020B0004020202020204" pitchFamily="34" charset="0"/>
-                <a:ea typeface="Aptos" panose="020B0004020202020204" pitchFamily="34" charset="0"/>
-                <a:cs typeface="Arial" panose="020B0604020202020204" pitchFamily="34" charset="0"/>
-              </a:rPr>
-              <a:t>Handel 20,9%</a:t>
-            </a:r>
-          </a:p>
-          <a:p>
-            <a:pPr marL="285750" indent="-285750" algn="l">
-              <a:buFont typeface="Arial" panose="020B0604020202020204" pitchFamily="34" charset="0"/>
-              <a:buChar char="•"/>
-            </a:pPr>
-            <a:r>
-              <a:rPr lang="pl-PL" sz="1800" dirty="0">
-                <a:effectLst/>
-                <a:latin typeface="Aptos" panose="020B0004020202020204" pitchFamily="34" charset="0"/>
-                <a:ea typeface="Aptos" panose="020B0004020202020204" pitchFamily="34" charset="0"/>
-                <a:cs typeface="Arial" panose="020B0604020202020204" pitchFamily="34" charset="0"/>
-              </a:rPr>
-              <a:t>Budownictwo 15,6%</a:t>
-            </a:r>
-          </a:p>
-          <a:p>
-            <a:pPr marL="285750" indent="-285750" algn="l">
-              <a:buFont typeface="Arial" panose="020B0604020202020204" pitchFamily="34" charset="0"/>
-              <a:buChar char="•"/>
-            </a:pPr>
-            <a:r>
-              <a:rPr lang="pl-PL" sz="1800" dirty="0">
-                <a:effectLst/>
-                <a:latin typeface="Aptos" panose="020B0004020202020204" pitchFamily="34" charset="0"/>
-                <a:ea typeface="Aptos" panose="020B0004020202020204" pitchFamily="34" charset="0"/>
-                <a:cs typeface="Arial" panose="020B0604020202020204" pitchFamily="34" charset="0"/>
-              </a:rPr>
-              <a:t>Przemysł 9,6%</a:t>
-            </a:r>
-          </a:p>
-          <a:p>
-            <a:pPr algn="l"/>
-            <a:r>
-              <a:rPr lang="pl-PL" sz="1800" dirty="0">
-                <a:effectLst/>
-                <a:latin typeface="Aptos" panose="020B0004020202020204" pitchFamily="34" charset="0"/>
-                <a:ea typeface="Aptos" panose="020B0004020202020204" pitchFamily="34" charset="0"/>
-                <a:cs typeface="Arial" panose="020B0604020202020204" pitchFamily="34" charset="0"/>
-              </a:rPr>
-              <a:t>Dla porównania, duże firmy:</a:t>
-            </a:r>
-          </a:p>
-          <a:p>
-            <a:pPr marL="285750" indent="-285750" algn="l">
-              <a:buFont typeface="Arial" panose="020B0604020202020204" pitchFamily="34" charset="0"/>
-              <a:buChar char="•"/>
-            </a:pPr>
-            <a:r>
-              <a:rPr lang="pl-PL" sz="1800" dirty="0">
-                <a:latin typeface="Aptos" panose="020B0004020202020204" pitchFamily="34" charset="0"/>
-                <a:ea typeface="Aptos" panose="020B0004020202020204" pitchFamily="34" charset="0"/>
-                <a:cs typeface="Arial" panose="020B0604020202020204" pitchFamily="34" charset="0"/>
-              </a:rPr>
-              <a:t>Przemysł 51,1%</a:t>
-            </a:r>
-          </a:p>
-          <a:p>
-            <a:pPr marL="285750" indent="-285750" algn="l">
-              <a:buFont typeface="Arial" panose="020B0604020202020204" pitchFamily="34" charset="0"/>
-              <a:buChar char="•"/>
-            </a:pPr>
-            <a:r>
-              <a:rPr lang="pl-PL" sz="1800" dirty="0">
-                <a:effectLst/>
-                <a:latin typeface="Aptos" panose="020B0004020202020204" pitchFamily="34" charset="0"/>
-                <a:ea typeface="Aptos" panose="020B0004020202020204" pitchFamily="34" charset="0"/>
-                <a:cs typeface="Arial" panose="020B0604020202020204" pitchFamily="34" charset="0"/>
-              </a:rPr>
-              <a:t>Usługi 32%</a:t>
-            </a:r>
-          </a:p>
-          <a:p>
-            <a:pPr marL="285750" indent="-285750" algn="l">
-              <a:buFont typeface="Arial" panose="020B0604020202020204" pitchFamily="34" charset="0"/>
-              <a:buChar char="•"/>
-            </a:pPr>
-            <a:r>
-              <a:rPr lang="pl-PL" sz="1800" dirty="0">
-                <a:effectLst/>
-                <a:latin typeface="Aptos" panose="020B0004020202020204" pitchFamily="34" charset="0"/>
-                <a:ea typeface="Aptos" panose="020B0004020202020204" pitchFamily="34" charset="0"/>
-                <a:cs typeface="Arial" panose="020B0604020202020204" pitchFamily="34" charset="0"/>
-              </a:rPr>
-              <a:t>Handel 13,6%</a:t>
-            </a:r>
-          </a:p>
-          <a:p>
-            <a:pPr marL="285750" indent="-285750" algn="l">
-              <a:buFont typeface="Arial" panose="020B0604020202020204" pitchFamily="34" charset="0"/>
-              <a:buChar char="•"/>
-            </a:pPr>
-            <a:r>
-              <a:rPr lang="pl-PL" sz="1800" dirty="0">
-                <a:effectLst/>
-                <a:latin typeface="Aptos" panose="020B0004020202020204" pitchFamily="34" charset="0"/>
-                <a:ea typeface="Aptos" panose="020B0004020202020204" pitchFamily="34" charset="0"/>
-                <a:cs typeface="Arial" panose="020B0604020202020204" pitchFamily="34" charset="0"/>
-              </a:rPr>
-              <a:t>Budownictwo 3,3%</a:t>
-            </a:r>
-          </a:p>
-          <a:p>
-            <a:pPr marL="342900" indent="-342900" algn="l">
-              <a:buFont typeface="Arial" panose="020B0604020202020204" pitchFamily="34" charset="0"/>
-              <a:buChar char="•"/>
-            </a:pPr>
-            <a:endParaRPr lang="pl-PL" dirty="0"/>
-          </a:p>
-        </p:txBody>
-      </p:sp>
+          <p:cNvGraphicFramePr/>
+          <p:nvPr>
+            <p:extLst>
+              <p:ext uri="{D42A27DB-BD31-4B8C-83A1-F6EECF244321}">
+                <p14:modId xmlns:p14="http://schemas.microsoft.com/office/powerpoint/2010/main" val="2743878987"/>
+              </p:ext>
+            </p:extLst>
+          </p:nvPr>
+        </p:nvGraphicFramePr>
+        <p:xfrm>
+          <a:off x="316033" y="1655762"/>
+          <a:ext cx="5779967" cy="4309533"/>
+        </p:xfrm>
+        <a:graphic>
+          <a:graphicData uri="http://schemas.openxmlformats.org/drawingml/2006/chart">
+            <c:chart xmlns:c="http://schemas.openxmlformats.org/drawingml/2006/chart" xmlns:r="http://schemas.openxmlformats.org/officeDocument/2006/relationships" r:id="rId2"/>
+          </a:graphicData>
+        </a:graphic>
+      </p:graphicFrame>
+      <p:graphicFrame>
+        <p:nvGraphicFramePr>
+          <p:cNvPr id="7" name="Wykres 6">
+            <a:extLst>
+              <a:ext uri="{FF2B5EF4-FFF2-40B4-BE49-F238E27FC236}">
+                <a16:creationId xmlns:a16="http://schemas.microsoft.com/office/drawing/2014/main" id="{58BC6D40-1A96-197C-154D-1B7F186C694D}"/>
+              </a:ext>
+            </a:extLst>
+          </p:cNvPr>
+          <p:cNvGraphicFramePr/>
+          <p:nvPr>
+            <p:extLst>
+              <p:ext uri="{D42A27DB-BD31-4B8C-83A1-F6EECF244321}">
+                <p14:modId xmlns:p14="http://schemas.microsoft.com/office/powerpoint/2010/main" val="1702627725"/>
+              </p:ext>
+            </p:extLst>
+          </p:nvPr>
+        </p:nvGraphicFramePr>
+        <p:xfrm>
+          <a:off x="6096000" y="1655762"/>
+          <a:ext cx="5779967" cy="4309533"/>
+        </p:xfrm>
+        <a:graphic>
+          <a:graphicData uri="http://schemas.openxmlformats.org/drawingml/2006/chart">
+            <c:chart xmlns:c="http://schemas.openxmlformats.org/drawingml/2006/chart" xmlns:r="http://schemas.openxmlformats.org/officeDocument/2006/relationships" r:id="rId3"/>
+          </a:graphicData>
+        </a:graphic>
+      </p:graphicFrame>
     </p:spTree>
     <p:extLst>
       <p:ext uri="{BB962C8B-B14F-4D97-AF65-F5344CB8AC3E}">

</xml_diff>